<commit_message>
Updating current project details
</commit_message>
<xml_diff>
--- a/Samir_Prakash.pptx
+++ b/Samir_Prakash.pptx
@@ -7,11 +7,12 @@
     <p:sldMasterId id="2147483816" r:id="rId6"/>
   </p:sldMasterIdLst>
   <p:notesMasterIdLst>
-    <p:notesMasterId r:id="rId9"/>
+    <p:notesMasterId r:id="rId10"/>
   </p:notesMasterIdLst>
   <p:sldIdLst>
     <p:sldId id="584" r:id="rId7"/>
-    <p:sldId id="585" r:id="rId8"/>
+    <p:sldId id="586" r:id="rId8"/>
+    <p:sldId id="585" r:id="rId9"/>
   </p:sldIdLst>
   <p:sldSz cx="9144000" cy="5143500" type="screen16x9"/>
   <p:notesSz cx="6797675" cy="9928225"/>
@@ -232,7 +233,7 @@
             <a:fld id="{26F8D926-C1B7-448A-BC5F-CA36093C4DF9}" type="datetimeFigureOut">
               <a:rPr lang="en-US" smtClean="0"/>
               <a:pPr/>
-              <a:t>5/28/2016</a:t>
+              <a:t>9/14/18</a:t>
             </a:fld>
             <a:endParaRPr lang="en-US" dirty="0"/>
           </a:p>
@@ -298,38 +299,37 @@
           <a:p>
             <a:pPr lvl="0"/>
             <a:r>
-              <a:rPr lang="en-US" smtClean="0"/>
+              <a:rPr lang="en-US"/>
               <a:t>Click to edit Master text styles</a:t>
             </a:r>
           </a:p>
           <a:p>
             <a:pPr lvl="1"/>
             <a:r>
-              <a:rPr lang="en-US" smtClean="0"/>
+              <a:rPr lang="en-US"/>
               <a:t>Second level</a:t>
             </a:r>
           </a:p>
           <a:p>
             <a:pPr lvl="2"/>
             <a:r>
-              <a:rPr lang="en-US" smtClean="0"/>
+              <a:rPr lang="en-US"/>
               <a:t>Third level</a:t>
             </a:r>
           </a:p>
           <a:p>
             <a:pPr lvl="3"/>
             <a:r>
-              <a:rPr lang="en-US" smtClean="0"/>
+              <a:rPr lang="en-US"/>
               <a:t>Fourth level</a:t>
             </a:r>
           </a:p>
           <a:p>
             <a:pPr lvl="4"/>
             <a:r>
-              <a:rPr lang="en-US" smtClean="0"/>
+              <a:rPr lang="en-US"/>
               <a:t>Fifth level</a:t>
             </a:r>
-            <a:endParaRPr lang="en-US"/>
           </a:p>
         </p:txBody>
       </p:sp>
@@ -687,7 +687,7 @@
           <a:lstStyle/>
           <a:p>
             <a:pPr eaLnBrk="1" hangingPunct="1"/>
-            <a:endParaRPr lang="en-GB" dirty="0" smtClean="0">
+            <a:endParaRPr lang="en-GB" dirty="0">
               <a:latin typeface="Arial" pitchFamily="34" charset="0"/>
             </a:endParaRPr>
           </a:p>
@@ -832,7 +832,152 @@
           <a:lstStyle/>
           <a:p>
             <a:pPr eaLnBrk="1" hangingPunct="1"/>
-            <a:endParaRPr lang="en-GB" dirty="0" smtClean="0">
+            <a:endParaRPr lang="en-GB" dirty="0">
+              <a:latin typeface="Arial" pitchFamily="34" charset="0"/>
+            </a:endParaRPr>
+          </a:p>
+        </p:txBody>
+      </p:sp>
+    </p:spTree>
+    <p:extLst>
+      <p:ext uri="{BB962C8B-B14F-4D97-AF65-F5344CB8AC3E}">
+        <p14:creationId xmlns:p14="http://schemas.microsoft.com/office/powerpoint/2010/main" val="2888033"/>
+      </p:ext>
+    </p:extLst>
+  </p:cSld>
+  <p:clrMapOvr>
+    <a:masterClrMapping/>
+  </p:clrMapOvr>
+</p:notes>
+</file>
+
+<file path=ppt/notesSlides/notesSlide3.xml><?xml version="1.0" encoding="utf-8"?>
+<p:notes xmlns:a="http://schemas.openxmlformats.org/drawingml/2006/main" xmlns:r="http://schemas.openxmlformats.org/officeDocument/2006/relationships" xmlns:p="http://schemas.openxmlformats.org/presentationml/2006/main">
+  <p:cSld>
+    <p:spTree>
+      <p:nvGrpSpPr>
+        <p:cNvPr id="1" name=""/>
+        <p:cNvGrpSpPr/>
+        <p:nvPr/>
+      </p:nvGrpSpPr>
+      <p:grpSpPr>
+        <a:xfrm>
+          <a:off x="0" y="0"/>
+          <a:ext cx="0" cy="0"/>
+          <a:chOff x="0" y="0"/>
+          <a:chExt cx="0" cy="0"/>
+        </a:xfrm>
+      </p:grpSpPr>
+      <p:sp>
+        <p:nvSpPr>
+          <p:cNvPr id="25602" name="Rectangle 7"/>
+          <p:cNvSpPr txBox="1">
+            <a:spLocks noGrp="1" noChangeArrowheads="1"/>
+          </p:cNvSpPr>
+          <p:nvPr/>
+        </p:nvSpPr>
+        <p:spPr bwMode="auto">
+          <a:xfrm>
+            <a:off x="3852016" y="9433538"/>
+            <a:ext cx="2945659" cy="494687"/>
+          </a:xfrm>
+          <a:prstGeom prst="rect">
+            <a:avLst/>
+          </a:prstGeom>
+          <a:noFill/>
+          <a:ln w="9525">
+            <a:noFill/>
+            <a:miter lim="800000"/>
+            <a:headEnd/>
+            <a:tailEnd/>
+          </a:ln>
+        </p:spPr>
+        <p:txBody>
+          <a:bodyPr lIns="98116" tIns="49059" rIns="98116" bIns="49059" anchor="b"/>
+          <a:lstStyle/>
+          <a:p>
+            <a:pPr algn="r" defTabSz="981429" eaLnBrk="0" fontAlgn="base" hangingPunct="0">
+              <a:spcBef>
+                <a:spcPct val="25000"/>
+              </a:spcBef>
+              <a:spcAft>
+                <a:spcPct val="0"/>
+              </a:spcAft>
+              <a:buFont typeface="Arial" pitchFamily="34" charset="0"/>
+              <a:buChar char="•"/>
+            </a:pPr>
+            <a:fld id="{3B46BCA0-6E0B-4362-81F8-3BC711370199}" type="slidenum">
+              <a:rPr lang="en-US" sz="1200">
+                <a:solidFill>
+                  <a:srgbClr val="FFFFFF"/>
+                </a:solidFill>
+                <a:latin typeface="Arial" charset="0"/>
+                <a:cs typeface="Arial" charset="0"/>
+              </a:rPr>
+              <a:pPr algn="r" defTabSz="981429" eaLnBrk="0" fontAlgn="base" hangingPunct="0">
+                <a:spcBef>
+                  <a:spcPct val="25000"/>
+                </a:spcBef>
+                <a:spcAft>
+                  <a:spcPct val="0"/>
+                </a:spcAft>
+                <a:buFont typeface="Arial" pitchFamily="34" charset="0"/>
+                <a:buChar char="•"/>
+              </a:pPr>
+              <a:t>3</a:t>
+            </a:fld>
+            <a:endParaRPr lang="en-US" sz="1200" dirty="0">
+              <a:solidFill>
+                <a:srgbClr val="FFFFFF"/>
+              </a:solidFill>
+              <a:latin typeface="Arial" charset="0"/>
+              <a:cs typeface="Arial" charset="0"/>
+            </a:endParaRPr>
+          </a:p>
+        </p:txBody>
+      </p:sp>
+      <p:sp>
+        <p:nvSpPr>
+          <p:cNvPr id="25603" name="Rectangle 2"/>
+          <p:cNvSpPr>
+            <a:spLocks noGrp="1" noRot="1" noChangeAspect="1" noChangeArrowheads="1" noTextEdit="1"/>
+          </p:cNvSpPr>
+          <p:nvPr>
+            <p:ph type="sldImg"/>
+          </p:nvPr>
+        </p:nvSpPr>
+        <p:spPr>
+          <a:xfrm>
+            <a:off x="90488" y="746125"/>
+            <a:ext cx="6616700" cy="3722688"/>
+          </a:xfrm>
+          <a:ln/>
+        </p:spPr>
+      </p:sp>
+      <p:sp>
+        <p:nvSpPr>
+          <p:cNvPr id="25604" name="Rectangle 3"/>
+          <p:cNvSpPr>
+            <a:spLocks noGrp="1" noChangeArrowheads="1"/>
+          </p:cNvSpPr>
+          <p:nvPr>
+            <p:ph type="body" idx="1"/>
+          </p:nvPr>
+        </p:nvSpPr>
+        <p:spPr>
+          <a:xfrm>
+            <a:off x="679768" y="4715909"/>
+            <a:ext cx="5438140" cy="4465978"/>
+          </a:xfrm>
+          <a:noFill/>
+          <a:ln/>
+        </p:spPr>
+        <p:txBody>
+          <a:bodyPr lIns="98116" tIns="49059" rIns="98116" bIns="49059"/>
+          <a:lstStyle/>
+          <a:p>
+            <a:pPr eaLnBrk="1" hangingPunct="1"/>
+            <a:endParaRPr lang="en-GB" dirty="0">
               <a:latin typeface="Arial" pitchFamily="34" charset="0"/>
             </a:endParaRPr>
           </a:p>
@@ -899,7 +1044,7 @@
           </a:lstStyle>
           <a:p>
             <a:r>
-              <a:rPr lang="en-US" smtClean="0"/>
+              <a:rPr lang="en-US"/>
               <a:t>Click to edit Master title style</a:t>
             </a:r>
             <a:endParaRPr lang="en-GB" dirty="0"/>
@@ -1018,7 +1163,7 @@
           </a:lstStyle>
           <a:p>
             <a:r>
-              <a:rPr lang="en-US" smtClean="0"/>
+              <a:rPr lang="en-US"/>
               <a:t>Click to edit Master subtitle style</a:t>
             </a:r>
             <a:endParaRPr lang="en-GB" dirty="0"/>
@@ -1092,13 +1237,6 @@
     <a:masterClrMapping/>
   </p:clrMapOvr>
   <p:transition/>
-  <p:timing>
-    <p:tnLst>
-      <p:par>
-        <p:cTn id="1" dur="indefinite" restart="never" nodeType="tmRoot"/>
-      </p:par>
-    </p:tnLst>
-  </p:timing>
 </p:sldLayout>
 </file>
 
@@ -1188,10 +1326,9 @@
           </a:lstStyle>
           <a:p>
             <a:r>
-              <a:rPr lang="en-US" dirty="0" smtClean="0"/>
+              <a:rPr lang="en-US" dirty="0"/>
               <a:t>Click to edit Master title style</a:t>
             </a:r>
-            <a:endParaRPr lang="en-US" dirty="0"/>
           </a:p>
         </p:txBody>
       </p:sp>
@@ -1316,10 +1453,9 @@
           </a:lstStyle>
           <a:p>
             <a:r>
-              <a:rPr lang="en-US" dirty="0" smtClean="0"/>
+              <a:rPr lang="en-US" dirty="0"/>
               <a:t>Click to edit Master subtitle style</a:t>
             </a:r>
-            <a:endParaRPr lang="en-US" dirty="0"/>
           </a:p>
         </p:txBody>
       </p:sp>
@@ -1399,10 +1535,9 @@
           <a:lstStyle/>
           <a:p>
             <a:r>
-              <a:rPr lang="en-US" smtClean="0"/>
+              <a:rPr lang="en-US"/>
               <a:t>Click to edit Master title style</a:t>
             </a:r>
-            <a:endParaRPr lang="en-US"/>
           </a:p>
         </p:txBody>
       </p:sp>
@@ -1423,38 +1558,37 @@
           <a:p>
             <a:pPr lvl="0"/>
             <a:r>
-              <a:rPr lang="en-US" smtClean="0"/>
+              <a:rPr lang="en-US"/>
               <a:t>Click to edit Master text styles</a:t>
             </a:r>
           </a:p>
           <a:p>
             <a:pPr lvl="1"/>
             <a:r>
-              <a:rPr lang="en-US" smtClean="0"/>
+              <a:rPr lang="en-US"/>
               <a:t>Second level</a:t>
             </a:r>
           </a:p>
           <a:p>
             <a:pPr lvl="2"/>
             <a:r>
-              <a:rPr lang="en-US" smtClean="0"/>
+              <a:rPr lang="en-US"/>
               <a:t>Third level</a:t>
             </a:r>
           </a:p>
           <a:p>
             <a:pPr lvl="3"/>
             <a:r>
-              <a:rPr lang="en-US" smtClean="0"/>
+              <a:rPr lang="en-US"/>
               <a:t>Fourth level</a:t>
             </a:r>
           </a:p>
           <a:p>
             <a:pPr lvl="4"/>
             <a:r>
-              <a:rPr lang="en-US" smtClean="0"/>
+              <a:rPr lang="en-US"/>
               <a:t>Fifth level</a:t>
             </a:r>
-            <a:endParaRPr lang="en-US"/>
           </a:p>
         </p:txBody>
       </p:sp>
@@ -1480,7 +1614,7 @@
                 </a:solidFill>
               </a:rPr>
               <a:pPr/>
-              <a:t>5/28/2016</a:t>
+              <a:t>9/14/18</a:t>
             </a:fld>
             <a:endParaRPr lang="en-US">
               <a:solidFill>
@@ -1644,10 +1778,9 @@
           </a:lstStyle>
           <a:p>
             <a:r>
-              <a:rPr lang="en-US" dirty="0" smtClean="0"/>
+              <a:rPr lang="en-US" dirty="0"/>
               <a:t>Click To Edit Master Title Style</a:t>
             </a:r>
-            <a:endParaRPr lang="en-US" dirty="0"/>
           </a:p>
         </p:txBody>
       </p:sp>
@@ -1877,7 +2010,7 @@
               </a:buClr>
             </a:pPr>
             <a:r>
-              <a:rPr lang="en-US" dirty="0" smtClean="0">
+              <a:rPr lang="en-US" dirty="0">
                 <a:solidFill>
                   <a:prstClr val="white"/>
                 </a:solidFill>
@@ -1891,7 +2024,7 @@
                 <a:srgbClr val="007CC3"/>
               </a:buClr>
             </a:pPr>
-            <a:endParaRPr lang="en-US" dirty="0" smtClean="0">
+            <a:endParaRPr lang="en-US" dirty="0">
               <a:solidFill>
                 <a:prstClr val="white"/>
               </a:solidFill>
@@ -2040,10 +2173,9 @@
           </a:lstStyle>
           <a:p>
             <a:r>
-              <a:rPr lang="en-US" dirty="0" smtClean="0"/>
+              <a:rPr lang="en-US" dirty="0"/>
               <a:t>Click To Edit Master Title Style</a:t>
             </a:r>
-            <a:endParaRPr lang="en-US" dirty="0"/>
           </a:p>
         </p:txBody>
       </p:sp>
@@ -2093,10 +2225,9 @@
           <a:lstStyle/>
           <a:p>
             <a:r>
-              <a:rPr lang="en-US" smtClean="0"/>
+              <a:rPr lang="en-US"/>
               <a:t>Click to edit Master title style</a:t>
             </a:r>
-            <a:endParaRPr lang="en-US"/>
           </a:p>
         </p:txBody>
       </p:sp>
@@ -2152,38 +2283,37 @@
           <a:p>
             <a:pPr lvl="0"/>
             <a:r>
-              <a:rPr lang="en-US" dirty="0" smtClean="0"/>
+              <a:rPr lang="en-US" dirty="0"/>
               <a:t>Click to edit Master text styles</a:t>
             </a:r>
           </a:p>
           <a:p>
             <a:pPr lvl="1"/>
             <a:r>
-              <a:rPr lang="en-US" dirty="0" smtClean="0"/>
+              <a:rPr lang="en-US" dirty="0"/>
               <a:t>Second level</a:t>
             </a:r>
           </a:p>
           <a:p>
             <a:pPr lvl="2"/>
             <a:r>
-              <a:rPr lang="en-US" dirty="0" smtClean="0"/>
+              <a:rPr lang="en-US" dirty="0"/>
               <a:t>Third level</a:t>
             </a:r>
           </a:p>
           <a:p>
             <a:pPr lvl="3"/>
             <a:r>
-              <a:rPr lang="en-US" dirty="0" smtClean="0"/>
+              <a:rPr lang="en-US" dirty="0"/>
               <a:t>Fourth level</a:t>
             </a:r>
           </a:p>
           <a:p>
             <a:pPr lvl="4"/>
             <a:r>
-              <a:rPr lang="en-US" dirty="0" smtClean="0"/>
+              <a:rPr lang="en-US" dirty="0"/>
               <a:t>Fifth level</a:t>
             </a:r>
-            <a:endParaRPr lang="en-US" dirty="0"/>
           </a:p>
         </p:txBody>
       </p:sp>
@@ -2239,38 +2369,37 @@
           <a:p>
             <a:pPr lvl="0"/>
             <a:r>
-              <a:rPr lang="en-US" dirty="0" smtClean="0"/>
+              <a:rPr lang="en-US" dirty="0"/>
               <a:t>Click to edit Master text styles</a:t>
             </a:r>
           </a:p>
           <a:p>
             <a:pPr lvl="1"/>
             <a:r>
-              <a:rPr lang="en-US" dirty="0" smtClean="0"/>
+              <a:rPr lang="en-US" dirty="0"/>
               <a:t>Second level</a:t>
             </a:r>
           </a:p>
           <a:p>
             <a:pPr lvl="2"/>
             <a:r>
-              <a:rPr lang="en-US" dirty="0" smtClean="0"/>
+              <a:rPr lang="en-US" dirty="0"/>
               <a:t>Third level</a:t>
             </a:r>
           </a:p>
           <a:p>
             <a:pPr lvl="3"/>
             <a:r>
-              <a:rPr lang="en-US" dirty="0" smtClean="0"/>
+              <a:rPr lang="en-US" dirty="0"/>
               <a:t>Fourth level</a:t>
             </a:r>
           </a:p>
           <a:p>
             <a:pPr lvl="4"/>
             <a:r>
-              <a:rPr lang="en-US" dirty="0" smtClean="0"/>
+              <a:rPr lang="en-US" dirty="0"/>
               <a:t>Fifth level</a:t>
             </a:r>
-            <a:endParaRPr lang="en-US" dirty="0"/>
           </a:p>
         </p:txBody>
       </p:sp>
@@ -2296,7 +2425,7 @@
                 </a:solidFill>
               </a:rPr>
               <a:pPr/>
-              <a:t>5/28/2016</a:t>
+              <a:t>9/14/18</a:t>
             </a:fld>
             <a:endParaRPr lang="en-US">
               <a:solidFill>
@@ -2411,10 +2540,9 @@
           </a:lstStyle>
           <a:p>
             <a:r>
-              <a:rPr lang="en-US" smtClean="0"/>
+              <a:rPr lang="en-US"/>
               <a:t>Click to edit Master title style</a:t>
             </a:r>
-            <a:endParaRPr lang="en-US"/>
           </a:p>
         </p:txBody>
       </p:sp>
@@ -2483,7 +2611,7 @@
           <a:p>
             <a:pPr lvl="0"/>
             <a:r>
-              <a:rPr lang="en-US" dirty="0" smtClean="0"/>
+              <a:rPr lang="en-US" dirty="0"/>
               <a:t>Click to edit Master text styles</a:t>
             </a:r>
           </a:p>
@@ -2541,38 +2669,37 @@
           <a:p>
             <a:pPr lvl="0"/>
             <a:r>
-              <a:rPr lang="en-US" dirty="0" smtClean="0"/>
+              <a:rPr lang="en-US" dirty="0"/>
               <a:t>Click to edit Master text styles</a:t>
             </a:r>
           </a:p>
           <a:p>
             <a:pPr lvl="1"/>
             <a:r>
-              <a:rPr lang="en-US" dirty="0" smtClean="0"/>
+              <a:rPr lang="en-US" dirty="0"/>
               <a:t>Second level</a:t>
             </a:r>
           </a:p>
           <a:p>
             <a:pPr lvl="2"/>
             <a:r>
-              <a:rPr lang="en-US" dirty="0" smtClean="0"/>
+              <a:rPr lang="en-US" dirty="0"/>
               <a:t>Third level</a:t>
             </a:r>
           </a:p>
           <a:p>
             <a:pPr lvl="3"/>
             <a:r>
-              <a:rPr lang="en-US" dirty="0" smtClean="0"/>
+              <a:rPr lang="en-US" dirty="0"/>
               <a:t>Fourth level</a:t>
             </a:r>
           </a:p>
           <a:p>
             <a:pPr lvl="4"/>
             <a:r>
-              <a:rPr lang="en-US" dirty="0" smtClean="0"/>
+              <a:rPr lang="en-US" dirty="0"/>
               <a:t>Fifth level</a:t>
             </a:r>
-            <a:endParaRPr lang="en-US" dirty="0"/>
           </a:p>
         </p:txBody>
       </p:sp>
@@ -2641,7 +2768,7 @@
           <a:p>
             <a:pPr lvl="0"/>
             <a:r>
-              <a:rPr lang="en-US" dirty="0" smtClean="0"/>
+              <a:rPr lang="en-US" dirty="0"/>
               <a:t>Click to edit Master text styles</a:t>
             </a:r>
           </a:p>
@@ -2699,38 +2826,37 @@
           <a:p>
             <a:pPr lvl="0"/>
             <a:r>
-              <a:rPr lang="en-US" smtClean="0"/>
+              <a:rPr lang="en-US"/>
               <a:t>Click to edit Master text styles</a:t>
             </a:r>
           </a:p>
           <a:p>
             <a:pPr lvl="1"/>
             <a:r>
-              <a:rPr lang="en-US" smtClean="0"/>
+              <a:rPr lang="en-US"/>
               <a:t>Second level</a:t>
             </a:r>
           </a:p>
           <a:p>
             <a:pPr lvl="2"/>
             <a:r>
-              <a:rPr lang="en-US" smtClean="0"/>
+              <a:rPr lang="en-US"/>
               <a:t>Third level</a:t>
             </a:r>
           </a:p>
           <a:p>
             <a:pPr lvl="3"/>
             <a:r>
-              <a:rPr lang="en-US" smtClean="0"/>
+              <a:rPr lang="en-US"/>
               <a:t>Fourth level</a:t>
             </a:r>
           </a:p>
           <a:p>
             <a:pPr lvl="4"/>
             <a:r>
-              <a:rPr lang="en-US" smtClean="0"/>
+              <a:rPr lang="en-US"/>
               <a:t>Fifth level</a:t>
             </a:r>
-            <a:endParaRPr lang="en-US"/>
           </a:p>
         </p:txBody>
       </p:sp>
@@ -2756,7 +2882,7 @@
                 </a:solidFill>
               </a:rPr>
               <a:pPr/>
-              <a:t>5/28/2016</a:t>
+              <a:t>9/14/18</a:t>
             </a:fld>
             <a:endParaRPr lang="en-US">
               <a:solidFill>
@@ -2867,10 +2993,9 @@
           <a:lstStyle/>
           <a:p>
             <a:r>
-              <a:rPr lang="en-US" smtClean="0"/>
+              <a:rPr lang="en-US"/>
               <a:t>Click to edit Master title style</a:t>
             </a:r>
-            <a:endParaRPr lang="en-US"/>
           </a:p>
         </p:txBody>
       </p:sp>
@@ -2896,7 +3021,7 @@
                 </a:solidFill>
               </a:rPr>
               <a:pPr/>
-              <a:t>5/28/2016</a:t>
+              <a:t>9/14/18</a:t>
             </a:fld>
             <a:endParaRPr lang="en-US">
               <a:solidFill>
@@ -3013,7 +3138,7 @@
                 </a:solidFill>
               </a:rPr>
               <a:pPr/>
-              <a:t>5/28/2016</a:t>
+              <a:t>9/14/18</a:t>
             </a:fld>
             <a:endParaRPr lang="en-US">
               <a:solidFill>
@@ -3166,35 +3291,35 @@
           <a:p>
             <a:pPr lvl="0"/>
             <a:r>
-              <a:rPr lang="en-US" smtClean="0"/>
+              <a:rPr lang="en-US"/>
               <a:t>Click to edit Master text styles</a:t>
             </a:r>
           </a:p>
           <a:p>
             <a:pPr lvl="1"/>
             <a:r>
-              <a:rPr lang="en-US" smtClean="0"/>
+              <a:rPr lang="en-US"/>
               <a:t>Second level</a:t>
             </a:r>
           </a:p>
           <a:p>
             <a:pPr lvl="2"/>
             <a:r>
-              <a:rPr lang="en-US" smtClean="0"/>
+              <a:rPr lang="en-US"/>
               <a:t>Third level</a:t>
             </a:r>
           </a:p>
           <a:p>
             <a:pPr lvl="3"/>
             <a:r>
-              <a:rPr lang="en-US" smtClean="0"/>
+              <a:rPr lang="en-US"/>
               <a:t>Fourth level</a:t>
             </a:r>
           </a:p>
           <a:p>
             <a:pPr lvl="4"/>
             <a:r>
-              <a:rPr lang="en-US" smtClean="0"/>
+              <a:rPr lang="en-US"/>
               <a:t>Fifth level</a:t>
             </a:r>
             <a:endParaRPr lang="en-GB" dirty="0"/>
@@ -3225,7 +3350,7 @@
           </a:lstStyle>
           <a:p>
             <a:r>
-              <a:rPr lang="en-US" smtClean="0"/>
+              <a:rPr lang="en-US"/>
               <a:t>Click to edit Master title style</a:t>
             </a:r>
             <a:endParaRPr lang="en-GB" dirty="0"/>
@@ -3299,13 +3424,6 @@
     <a:masterClrMapping/>
   </p:clrMapOvr>
   <p:transition/>
-  <p:timing>
-    <p:tnLst>
-      <p:par>
-        <p:cTn id="1" dur="indefinite" restart="never" nodeType="tmRoot"/>
-      </p:par>
-    </p:tnLst>
-  </p:timing>
 </p:sldLayout>
 </file>
 
@@ -3399,35 +3517,35 @@
           <a:p>
             <a:pPr lvl="0"/>
             <a:r>
-              <a:rPr lang="en-US" smtClean="0"/>
+              <a:rPr lang="en-US"/>
               <a:t>Click to edit Master text styles</a:t>
             </a:r>
           </a:p>
           <a:p>
             <a:pPr lvl="1"/>
             <a:r>
-              <a:rPr lang="en-US" smtClean="0"/>
+              <a:rPr lang="en-US"/>
               <a:t>Second level</a:t>
             </a:r>
           </a:p>
           <a:p>
             <a:pPr lvl="2"/>
             <a:r>
-              <a:rPr lang="en-US" smtClean="0"/>
+              <a:rPr lang="en-US"/>
               <a:t>Third level</a:t>
             </a:r>
           </a:p>
           <a:p>
             <a:pPr lvl="3"/>
             <a:r>
-              <a:rPr lang="en-US" smtClean="0"/>
+              <a:rPr lang="en-US"/>
               <a:t>Fourth level</a:t>
             </a:r>
           </a:p>
           <a:p>
             <a:pPr lvl="4"/>
             <a:r>
-              <a:rPr lang="en-US" smtClean="0"/>
+              <a:rPr lang="en-US"/>
               <a:t>Fifth level</a:t>
             </a:r>
             <a:endParaRPr lang="en-GB" dirty="0"/>
@@ -3504,35 +3622,35 @@
           <a:p>
             <a:pPr lvl="0"/>
             <a:r>
-              <a:rPr lang="en-US" smtClean="0"/>
+              <a:rPr lang="en-US"/>
               <a:t>Click to edit Master text styles</a:t>
             </a:r>
           </a:p>
           <a:p>
             <a:pPr lvl="1"/>
             <a:r>
-              <a:rPr lang="en-US" smtClean="0"/>
+              <a:rPr lang="en-US"/>
               <a:t>Second level</a:t>
             </a:r>
           </a:p>
           <a:p>
             <a:pPr lvl="2"/>
             <a:r>
-              <a:rPr lang="en-US" smtClean="0"/>
+              <a:rPr lang="en-US"/>
               <a:t>Third level</a:t>
             </a:r>
           </a:p>
           <a:p>
             <a:pPr lvl="3"/>
             <a:r>
-              <a:rPr lang="en-US" smtClean="0"/>
+              <a:rPr lang="en-US"/>
               <a:t>Fourth level</a:t>
             </a:r>
           </a:p>
           <a:p>
             <a:pPr lvl="4"/>
             <a:r>
-              <a:rPr lang="en-US" smtClean="0"/>
+              <a:rPr lang="en-US"/>
               <a:t>Fifth level</a:t>
             </a:r>
             <a:endParaRPr lang="en-GB" dirty="0"/>
@@ -3559,7 +3677,7 @@
           </a:lstStyle>
           <a:p>
             <a:r>
-              <a:rPr lang="en-US" smtClean="0"/>
+              <a:rPr lang="en-US"/>
               <a:t>Click to edit Master title style</a:t>
             </a:r>
             <a:endParaRPr lang="en-GB" dirty="0"/>
@@ -3633,13 +3751,6 @@
     <a:masterClrMapping/>
   </p:clrMapOvr>
   <p:transition/>
-  <p:timing>
-    <p:tnLst>
-      <p:par>
-        <p:cTn id="1" dur="indefinite" restart="never" nodeType="tmRoot"/>
-      </p:par>
-    </p:tnLst>
-  </p:timing>
 </p:sldLayout>
 </file>
 
@@ -3712,7 +3823,7 @@
           <a:p>
             <a:pPr lvl="0"/>
             <a:r>
-              <a:rPr lang="en-US" noProof="0" smtClean="0"/>
+              <a:rPr lang="en-US" noProof="0"/>
               <a:t>Click icon to add picture</a:t>
             </a:r>
             <a:endParaRPr lang="en-GB" noProof="0" dirty="0"/>
@@ -3789,35 +3900,35 @@
           <a:p>
             <a:pPr lvl="0"/>
             <a:r>
-              <a:rPr lang="en-US" smtClean="0"/>
+              <a:rPr lang="en-US"/>
               <a:t>Click to edit Master text styles</a:t>
             </a:r>
           </a:p>
           <a:p>
             <a:pPr lvl="1"/>
             <a:r>
-              <a:rPr lang="en-US" smtClean="0"/>
+              <a:rPr lang="en-US"/>
               <a:t>Second level</a:t>
             </a:r>
           </a:p>
           <a:p>
             <a:pPr lvl="2"/>
             <a:r>
-              <a:rPr lang="en-US" smtClean="0"/>
+              <a:rPr lang="en-US"/>
               <a:t>Third level</a:t>
             </a:r>
           </a:p>
           <a:p>
             <a:pPr lvl="3"/>
             <a:r>
-              <a:rPr lang="en-US" smtClean="0"/>
+              <a:rPr lang="en-US"/>
               <a:t>Fourth level</a:t>
             </a:r>
           </a:p>
           <a:p>
             <a:pPr lvl="4"/>
             <a:r>
-              <a:rPr lang="en-US" smtClean="0"/>
+              <a:rPr lang="en-US"/>
               <a:t>Fifth level</a:t>
             </a:r>
             <a:endParaRPr lang="en-GB" dirty="0"/>
@@ -3909,7 +4020,7 @@
           </a:lstStyle>
           <a:p>
             <a:r>
-              <a:rPr lang="en-US" smtClean="0"/>
+              <a:rPr lang="en-US"/>
               <a:t>Click to edit Master title style</a:t>
             </a:r>
             <a:endParaRPr lang="en-GB" dirty="0"/>
@@ -3927,13 +4038,6 @@
     <a:masterClrMapping/>
   </p:clrMapOvr>
   <p:transition/>
-  <p:timing>
-    <p:tnLst>
-      <p:par>
-        <p:cTn id="1" dur="indefinite" restart="never" nodeType="tmRoot"/>
-      </p:par>
-    </p:tnLst>
-  </p:timing>
 </p:sldLayout>
 </file>
 
@@ -4013,7 +4117,7 @@
           <a:p>
             <a:pPr lvl="0"/>
             <a:r>
-              <a:rPr lang="en-US" smtClean="0"/>
+              <a:rPr lang="en-US"/>
               <a:t>Click to edit Master text styles</a:t>
             </a:r>
           </a:p>
@@ -4069,35 +4173,35 @@
           <a:p>
             <a:pPr lvl="0"/>
             <a:r>
-              <a:rPr lang="en-US" smtClean="0"/>
+              <a:rPr lang="en-US"/>
               <a:t>Click to edit Master text styles</a:t>
             </a:r>
           </a:p>
           <a:p>
             <a:pPr lvl="1"/>
             <a:r>
-              <a:rPr lang="en-US" smtClean="0"/>
+              <a:rPr lang="en-US"/>
               <a:t>Second level</a:t>
             </a:r>
           </a:p>
           <a:p>
             <a:pPr lvl="2"/>
             <a:r>
-              <a:rPr lang="en-US" smtClean="0"/>
+              <a:rPr lang="en-US"/>
               <a:t>Third level</a:t>
             </a:r>
           </a:p>
           <a:p>
             <a:pPr lvl="3"/>
             <a:r>
-              <a:rPr lang="en-US" smtClean="0"/>
+              <a:rPr lang="en-US"/>
               <a:t>Fourth level</a:t>
             </a:r>
           </a:p>
           <a:p>
             <a:pPr lvl="4"/>
             <a:r>
-              <a:rPr lang="en-US" smtClean="0"/>
+              <a:rPr lang="en-US"/>
               <a:t>Fifth level</a:t>
             </a:r>
             <a:endParaRPr lang="en-GB" dirty="0"/>
@@ -4163,7 +4267,7 @@
           <a:p>
             <a:pPr lvl="0"/>
             <a:r>
-              <a:rPr lang="en-US" smtClean="0"/>
+              <a:rPr lang="en-US"/>
               <a:t>Click to edit Master text styles</a:t>
             </a:r>
           </a:p>
@@ -4219,35 +4323,35 @@
           <a:p>
             <a:pPr lvl="0"/>
             <a:r>
-              <a:rPr lang="en-US" smtClean="0"/>
+              <a:rPr lang="en-US"/>
               <a:t>Click to edit Master text styles</a:t>
             </a:r>
           </a:p>
           <a:p>
             <a:pPr lvl="1"/>
             <a:r>
-              <a:rPr lang="en-US" smtClean="0"/>
+              <a:rPr lang="en-US"/>
               <a:t>Second level</a:t>
             </a:r>
           </a:p>
           <a:p>
             <a:pPr lvl="2"/>
             <a:r>
-              <a:rPr lang="en-US" smtClean="0"/>
+              <a:rPr lang="en-US"/>
               <a:t>Third level</a:t>
             </a:r>
           </a:p>
           <a:p>
             <a:pPr lvl="3"/>
             <a:r>
-              <a:rPr lang="en-US" smtClean="0"/>
+              <a:rPr lang="en-US"/>
               <a:t>Fourth level</a:t>
             </a:r>
           </a:p>
           <a:p>
             <a:pPr lvl="4"/>
             <a:r>
-              <a:rPr lang="en-US" smtClean="0"/>
+              <a:rPr lang="en-US"/>
               <a:t>Fifth level</a:t>
             </a:r>
             <a:endParaRPr lang="en-GB" dirty="0"/>
@@ -4339,7 +4443,7 @@
           </a:lstStyle>
           <a:p>
             <a:r>
-              <a:rPr lang="en-US" smtClean="0"/>
+              <a:rPr lang="en-US"/>
               <a:t>Click to edit Master title style</a:t>
             </a:r>
             <a:endParaRPr lang="en-GB" dirty="0"/>
@@ -4479,7 +4583,7 @@
           <a:p>
             <a:pPr lvl="0"/>
             <a:r>
-              <a:rPr lang="en-US" smtClean="0"/>
+              <a:rPr lang="en-US"/>
               <a:t>Click to edit Master text styles</a:t>
             </a:r>
           </a:p>
@@ -4555,35 +4659,35 @@
           <a:p>
             <a:pPr lvl="0"/>
             <a:r>
-              <a:rPr lang="en-US" smtClean="0"/>
+              <a:rPr lang="en-US"/>
               <a:t>Click to edit Master text styles</a:t>
             </a:r>
           </a:p>
           <a:p>
             <a:pPr lvl="1"/>
             <a:r>
-              <a:rPr lang="en-US" smtClean="0"/>
+              <a:rPr lang="en-US"/>
               <a:t>Second level</a:t>
             </a:r>
           </a:p>
           <a:p>
             <a:pPr lvl="2"/>
             <a:r>
-              <a:rPr lang="en-US" smtClean="0"/>
+              <a:rPr lang="en-US"/>
               <a:t>Third level</a:t>
             </a:r>
           </a:p>
           <a:p>
             <a:pPr lvl="3"/>
             <a:r>
-              <a:rPr lang="en-US" smtClean="0"/>
+              <a:rPr lang="en-US"/>
               <a:t>Fourth level</a:t>
             </a:r>
           </a:p>
           <a:p>
             <a:pPr lvl="4"/>
             <a:r>
-              <a:rPr lang="en-US" smtClean="0"/>
+              <a:rPr lang="en-US"/>
               <a:t>Fifth level</a:t>
             </a:r>
             <a:endParaRPr lang="en-GB" dirty="0"/>
@@ -4640,35 +4744,35 @@
           <a:p>
             <a:pPr lvl="0"/>
             <a:r>
-              <a:rPr lang="en-US" smtClean="0"/>
+              <a:rPr lang="en-US"/>
               <a:t>Click to edit Master text styles</a:t>
             </a:r>
           </a:p>
           <a:p>
             <a:pPr lvl="1"/>
             <a:r>
-              <a:rPr lang="en-US" smtClean="0"/>
+              <a:rPr lang="en-US"/>
               <a:t>Second level</a:t>
             </a:r>
           </a:p>
           <a:p>
             <a:pPr lvl="2"/>
             <a:r>
-              <a:rPr lang="en-US" smtClean="0"/>
+              <a:rPr lang="en-US"/>
               <a:t>Third level</a:t>
             </a:r>
           </a:p>
           <a:p>
             <a:pPr lvl="3"/>
             <a:r>
-              <a:rPr lang="en-US" smtClean="0"/>
+              <a:rPr lang="en-US"/>
               <a:t>Fourth level</a:t>
             </a:r>
           </a:p>
           <a:p>
             <a:pPr lvl="4"/>
             <a:r>
-              <a:rPr lang="en-US" smtClean="0"/>
+              <a:rPr lang="en-US"/>
               <a:t>Fifth level</a:t>
             </a:r>
             <a:endParaRPr lang="en-GB" dirty="0"/>
@@ -4724,7 +4828,7 @@
           <a:p>
             <a:pPr lvl="0"/>
             <a:r>
-              <a:rPr lang="en-US" noProof="0" smtClean="0"/>
+              <a:rPr lang="en-US" noProof="0"/>
               <a:t>Click icon to add picture</a:t>
             </a:r>
             <a:endParaRPr lang="en-GB" noProof="0" dirty="0"/>
@@ -4816,7 +4920,7 @@
           </a:lstStyle>
           <a:p>
             <a:r>
-              <a:rPr lang="en-US" smtClean="0"/>
+              <a:rPr lang="en-US"/>
               <a:t>Click to edit Master title style</a:t>
             </a:r>
             <a:endParaRPr lang="en-GB" dirty="0"/>
@@ -4902,7 +5006,7 @@
           <a:p>
             <a:pPr lvl="0"/>
             <a:r>
-              <a:rPr lang="en-US" noProof="0" smtClean="0"/>
+              <a:rPr lang="en-US" noProof="0"/>
               <a:t>Click icon to add picture</a:t>
             </a:r>
             <a:endParaRPr lang="en-GB" noProof="0" dirty="0"/>
@@ -4929,7 +5033,7 @@
           </a:lstStyle>
           <a:p>
             <a:r>
-              <a:rPr lang="en-US" smtClean="0"/>
+              <a:rPr lang="en-US"/>
               <a:t>Click to edit Master title style</a:t>
             </a:r>
             <a:endParaRPr lang="en-GB" dirty="0"/>
@@ -5003,13 +5107,6 @@
     <a:masterClrMapping/>
   </p:clrMapOvr>
   <p:transition/>
-  <p:timing>
-    <p:tnLst>
-      <p:par>
-        <p:cTn id="1" dur="indefinite" restart="never" nodeType="tmRoot"/>
-      </p:par>
-    </p:tnLst>
-  </p:timing>
 </p:sldLayout>
 </file>
 
@@ -5050,7 +5147,7 @@
           </a:lstStyle>
           <a:p>
             <a:r>
-              <a:rPr lang="en-US" smtClean="0"/>
+              <a:rPr lang="en-US"/>
               <a:t>Click to edit Master title style</a:t>
             </a:r>
             <a:endParaRPr lang="en-GB" dirty="0"/>
@@ -5124,13 +5221,6 @@
     <a:masterClrMapping/>
   </p:clrMapOvr>
   <p:transition/>
-  <p:timing>
-    <p:tnLst>
-      <p:par>
-        <p:cTn id="1" dur="indefinite" restart="never" nodeType="tmRoot"/>
-      </p:par>
-    </p:tnLst>
-  </p:timing>
 </p:sldLayout>
 </file>
 
@@ -5227,7 +5317,7 @@
           </a:lstStyle>
           <a:p>
             <a:r>
-              <a:rPr lang="en-US" dirty="0" smtClean="0"/>
+              <a:rPr lang="en-US" dirty="0"/>
               <a:t>Click to edit Master title style</a:t>
             </a:r>
             <a:endParaRPr lang="en-GB" dirty="0"/>
@@ -5325,35 +5415,35 @@
           <a:p>
             <a:pPr lvl="0"/>
             <a:r>
-              <a:rPr lang="en-US" dirty="0" smtClean="0"/>
+              <a:rPr lang="en-US" dirty="0"/>
               <a:t>Click to edit Master text styles</a:t>
             </a:r>
           </a:p>
           <a:p>
             <a:pPr lvl="1"/>
             <a:r>
-              <a:rPr lang="en-US" dirty="0" smtClean="0"/>
+              <a:rPr lang="en-US" dirty="0"/>
               <a:t>Second level</a:t>
             </a:r>
           </a:p>
           <a:p>
             <a:pPr lvl="2"/>
             <a:r>
-              <a:rPr lang="en-US" dirty="0" smtClean="0"/>
+              <a:rPr lang="en-US" dirty="0"/>
               <a:t>Third level</a:t>
             </a:r>
           </a:p>
           <a:p>
             <a:pPr lvl="3"/>
             <a:r>
-              <a:rPr lang="en-US" dirty="0" smtClean="0"/>
+              <a:rPr lang="en-US" dirty="0"/>
               <a:t>Fourth level</a:t>
             </a:r>
           </a:p>
           <a:p>
             <a:pPr lvl="4"/>
             <a:r>
-              <a:rPr lang="en-US" dirty="0" smtClean="0"/>
+              <a:rPr lang="en-US" dirty="0"/>
               <a:t>Fifth level</a:t>
             </a:r>
             <a:endParaRPr lang="en-GB" dirty="0"/>
@@ -5489,10 +5579,10 @@
           <a:p>
             <a:pPr lvl="0"/>
             <a:r>
-              <a:rPr lang="en-US" smtClean="0"/>
+              <a:rPr lang="en-US"/>
               <a:t>Click to edit Master title style</a:t>
             </a:r>
-            <a:endParaRPr lang="en-GB" smtClean="0"/>
+            <a:endParaRPr lang="en-GB"/>
           </a:p>
         </p:txBody>
       </p:sp>
@@ -5536,38 +5626,38 @@
           <a:p>
             <a:pPr lvl="0"/>
             <a:r>
-              <a:rPr lang="en-US" dirty="0" smtClean="0"/>
+              <a:rPr lang="en-US" dirty="0"/>
               <a:t>Click to edit Master text styles</a:t>
             </a:r>
           </a:p>
           <a:p>
             <a:pPr lvl="1"/>
             <a:r>
-              <a:rPr lang="en-US" dirty="0" smtClean="0"/>
+              <a:rPr lang="en-US" dirty="0"/>
               <a:t>Second level</a:t>
             </a:r>
           </a:p>
           <a:p>
             <a:pPr lvl="2"/>
             <a:r>
-              <a:rPr lang="en-US" dirty="0" smtClean="0"/>
+              <a:rPr lang="en-US" dirty="0"/>
               <a:t>Third level</a:t>
             </a:r>
           </a:p>
           <a:p>
             <a:pPr lvl="3"/>
             <a:r>
-              <a:rPr lang="en-US" dirty="0" smtClean="0"/>
+              <a:rPr lang="en-US" dirty="0"/>
               <a:t>Fourth level</a:t>
             </a:r>
           </a:p>
           <a:p>
             <a:pPr lvl="4"/>
             <a:r>
-              <a:rPr lang="en-US" dirty="0" smtClean="0"/>
+              <a:rPr lang="en-US" dirty="0"/>
               <a:t>Fifth level</a:t>
             </a:r>
-            <a:endParaRPr lang="en-GB" dirty="0" smtClean="0"/>
+            <a:endParaRPr lang="en-GB" dirty="0"/>
           </a:p>
         </p:txBody>
       </p:sp>
@@ -5774,7 +5864,7 @@
               <a:defRPr/>
             </a:pPr>
             <a:r>
-              <a:rPr lang="en-GB" sz="1000" dirty="0" smtClean="0">
+              <a:rPr lang="en-GB" sz="1000" dirty="0">
                 <a:solidFill>
                   <a:schemeClr val="bg2"/>
                 </a:solidFill>
@@ -5783,26 +5873,12 @@
               </a:rPr>
               <a:t>© 2011 Infosys Technologies Ltd.</a:t>
             </a:r>
-            <a:endParaRPr lang="en-GB" sz="1000" dirty="0">
-              <a:solidFill>
-                <a:schemeClr val="bg2"/>
-              </a:solidFill>
-              <a:latin typeface="Calibri" pitchFamily="34" charset="0"/>
-              <a:cs typeface="Calibri" pitchFamily="34" charset="0"/>
-            </a:endParaRPr>
           </a:p>
         </p:txBody>
       </p:sp>
     </p:spTree>
   </p:cSld>
   <p:clrMap bg1="lt1" tx1="dk1" bg2="lt2" tx2="dk2" accent1="accent1" accent2="accent2" accent3="accent3" accent4="accent4" accent5="accent5" accent6="accent6" hlink="hlink" folHlink="folHlink"/>
-  <p:timing>
-    <p:tnLst>
-      <p:par>
-        <p:cTn id="1" dur="indefinite" restart="never" nodeType="tmRoot"/>
-      </p:par>
-    </p:tnLst>
-  </p:timing>
   <p:hf hdr="0" ftr="0" dt="0"/>
   <p:txStyles>
     <p:titleStyle>
@@ -6281,10 +6357,10 @@
           <a:p>
             <a:pPr lvl="0"/>
             <a:r>
-              <a:rPr lang="en-US" smtClean="0"/>
+              <a:rPr lang="en-US"/>
               <a:t>Click to edit Master title style</a:t>
             </a:r>
-            <a:endParaRPr lang="en-GB" dirty="0" smtClean="0"/>
+            <a:endParaRPr lang="en-GB" dirty="0"/>
           </a:p>
         </p:txBody>
       </p:sp>
@@ -6324,38 +6400,38 @@
           <a:p>
             <a:pPr lvl="0"/>
             <a:r>
-              <a:rPr lang="en-US" smtClean="0"/>
+              <a:rPr lang="en-US"/>
               <a:t>Click to edit Master text styles</a:t>
             </a:r>
           </a:p>
           <a:p>
             <a:pPr lvl="1"/>
             <a:r>
-              <a:rPr lang="en-US" smtClean="0"/>
+              <a:rPr lang="en-US"/>
               <a:t>Second level</a:t>
             </a:r>
           </a:p>
           <a:p>
             <a:pPr lvl="2"/>
             <a:r>
-              <a:rPr lang="en-US" smtClean="0"/>
+              <a:rPr lang="en-US"/>
               <a:t>Third level</a:t>
             </a:r>
           </a:p>
           <a:p>
             <a:pPr lvl="3"/>
             <a:r>
-              <a:rPr lang="en-US" smtClean="0"/>
+              <a:rPr lang="en-US"/>
               <a:t>Fourth level</a:t>
             </a:r>
           </a:p>
           <a:p>
             <a:pPr lvl="4"/>
             <a:r>
-              <a:rPr lang="en-US" smtClean="0"/>
+              <a:rPr lang="en-US"/>
               <a:t>Fifth level</a:t>
             </a:r>
-            <a:endParaRPr lang="en-GB" dirty="0" smtClean="0"/>
+            <a:endParaRPr lang="en-GB" dirty="0"/>
           </a:p>
         </p:txBody>
       </p:sp>
@@ -6577,13 +6653,6 @@
     <p:sldLayoutId id="2147483789" r:id="rId9"/>
   </p:sldLayoutIdLst>
   <p:transition/>
-  <p:timing>
-    <p:tnLst>
-      <p:par>
-        <p:cTn id="1" dur="indefinite" restart="never" nodeType="tmRoot"/>
-      </p:par>
-    </p:tnLst>
-  </p:timing>
   <p:txStyles>
     <p:titleStyle>
       <a:lvl1pPr algn="l" rtl="0" eaLnBrk="1" fontAlgn="base" hangingPunct="1">
@@ -7078,10 +7147,9 @@
           <a:lstStyle/>
           <a:p>
             <a:r>
-              <a:rPr lang="en-US" dirty="0" smtClean="0"/>
+              <a:rPr lang="en-US" dirty="0"/>
               <a:t>Click to edit Master title style</a:t>
             </a:r>
-            <a:endParaRPr lang="en-US" dirty="0"/>
           </a:p>
         </p:txBody>
       </p:sp>
@@ -7112,38 +7180,37 @@
           <a:p>
             <a:pPr lvl="0"/>
             <a:r>
-              <a:rPr lang="en-US" dirty="0" smtClean="0"/>
+              <a:rPr lang="en-US" dirty="0"/>
               <a:t>Click to edit Master text styles</a:t>
             </a:r>
           </a:p>
           <a:p>
             <a:pPr lvl="1"/>
             <a:r>
-              <a:rPr lang="en-US" dirty="0" smtClean="0"/>
+              <a:rPr lang="en-US" dirty="0"/>
               <a:t>Second level</a:t>
             </a:r>
           </a:p>
           <a:p>
             <a:pPr lvl="2"/>
             <a:r>
-              <a:rPr lang="en-US" dirty="0" smtClean="0"/>
+              <a:rPr lang="en-US" dirty="0"/>
               <a:t>Third level</a:t>
             </a:r>
           </a:p>
           <a:p>
             <a:pPr lvl="3"/>
             <a:r>
-              <a:rPr lang="en-US" dirty="0" smtClean="0"/>
+              <a:rPr lang="en-US" dirty="0"/>
               <a:t>Fourth level</a:t>
             </a:r>
           </a:p>
           <a:p>
             <a:pPr lvl="4"/>
             <a:r>
-              <a:rPr lang="en-US" dirty="0" smtClean="0"/>
+              <a:rPr lang="en-US" dirty="0"/>
               <a:t>Fifth level</a:t>
             </a:r>
-            <a:endParaRPr lang="en-US" dirty="0"/>
           </a:p>
         </p:txBody>
       </p:sp>
@@ -7187,7 +7254,7 @@
                 </a:solidFill>
               </a:rPr>
               <a:pPr/>
-              <a:t>5/28/2016</a:t>
+              <a:t>9/14/18</a:t>
             </a:fld>
             <a:endParaRPr lang="en-US" dirty="0">
               <a:solidFill>
@@ -7752,7 +7819,7 @@
         </p:nvSpPr>
         <p:spPr>
           <a:xfrm>
-            <a:off x="381000" y="99290"/>
+            <a:off x="381000" y="137627"/>
             <a:ext cx="8229600" cy="308372"/>
           </a:xfrm>
           <a:prstGeom prst="rect">
@@ -7914,42 +7981,13 @@
               </a:spcAft>
             </a:pPr>
             <a:r>
-              <a:rPr lang="en-US" sz="2000" dirty="0" smtClean="0">
+              <a:rPr lang="en-US" sz="2000" dirty="0">
                 <a:solidFill>
                   <a:srgbClr val="000000"/>
                 </a:solidFill>
               </a:rPr>
-              <a:t>Samir Prakash </a:t>
-            </a:r>
-            <a:r>
-              <a:rPr lang="en-US" sz="2000" dirty="0" smtClean="0">
-                <a:solidFill>
-                  <a:srgbClr val="000000"/>
-                </a:solidFill>
-              </a:rPr>
-              <a:t>– </a:t>
-            </a:r>
-            <a:r>
-              <a:rPr lang="en-US" sz="2000" dirty="0">
-                <a:solidFill>
-                  <a:srgbClr val="000000"/>
-                </a:solidFill>
-              </a:rPr>
-              <a:t>Technology </a:t>
-            </a:r>
-            <a:r>
-              <a:rPr lang="en-US" sz="2000" dirty="0" smtClean="0">
-                <a:solidFill>
-                  <a:srgbClr val="000000"/>
-                </a:solidFill>
-              </a:rPr>
-              <a:t>Lead</a:t>
-            </a:r>
-            <a:endParaRPr lang="en-US" sz="2000" dirty="0">
-              <a:solidFill>
-                <a:srgbClr val="000000"/>
-              </a:solidFill>
-            </a:endParaRPr>
+              <a:t>Samir Prakash – Technology Architect (US)</a:t>
+            </a:r>
           </a:p>
           <a:p>
             <a:pPr fontAlgn="base">
@@ -8063,67 +8101,7 @@
                 <a:latin typeface="Cambria" pitchFamily="18" charset="0"/>
                 <a:ea typeface="+mn-ea"/>
               </a:rPr>
-              <a:t>Samir Prakash </a:t>
-            </a:r>
-            <a:r>
-              <a:rPr lang="en-US" sz="1000" b="0" dirty="0">
-                <a:solidFill>
-                  <a:schemeClr val="tx1"/>
-                </a:solidFill>
-                <a:latin typeface="Cambria" pitchFamily="18" charset="0"/>
-                <a:ea typeface="+mn-ea"/>
-              </a:rPr>
-              <a:t>has </a:t>
-            </a:r>
-            <a:r>
-              <a:rPr lang="en-US" sz="1000" b="0" dirty="0">
-                <a:solidFill>
-                  <a:schemeClr val="tx1"/>
-                </a:solidFill>
-                <a:latin typeface="Cambria" pitchFamily="18" charset="0"/>
-                <a:ea typeface="+mn-ea"/>
-              </a:rPr>
-              <a:t>11 </a:t>
-            </a:r>
-            <a:r>
-              <a:rPr lang="en-US" sz="1000" b="0" dirty="0">
-                <a:solidFill>
-                  <a:schemeClr val="tx1"/>
-                </a:solidFill>
-                <a:latin typeface="Cambria" pitchFamily="18" charset="0"/>
-                <a:ea typeface="+mn-ea"/>
-              </a:rPr>
-              <a:t>years of experience in software </a:t>
-            </a:r>
-            <a:r>
-              <a:rPr lang="en-US" sz="1000" b="0" dirty="0">
-                <a:solidFill>
-                  <a:schemeClr val="tx1"/>
-                </a:solidFill>
-                <a:latin typeface="Cambria" pitchFamily="18" charset="0"/>
-                <a:ea typeface="+mn-ea"/>
-              </a:rPr>
-              <a:t>design, development on </a:t>
-            </a:r>
-            <a:r>
-              <a:rPr lang="en-US" sz="1000" b="0" dirty="0">
-                <a:solidFill>
-                  <a:schemeClr val="tx1"/>
-                </a:solidFill>
-                <a:latin typeface="Cambria" pitchFamily="18" charset="0"/>
-                <a:ea typeface="+mn-ea"/>
-              </a:rPr>
-              <a:t>Windows and Unix environment</a:t>
-            </a:r>
-            <a:r>
-              <a:rPr lang="en-US" sz="1000" b="0" dirty="0">
-                <a:solidFill>
-                  <a:schemeClr val="tx1"/>
-                </a:solidFill>
-                <a:latin typeface="Cambria" pitchFamily="18" charset="0"/>
-                <a:ea typeface="+mn-ea"/>
-              </a:rPr>
-              <a:t>.</a:t>
+              <a:t>Samir Prakash has 13+ years of experience in software design, development on Windows and Unix environment.</a:t>
             </a:r>
           </a:p>
           <a:p>
@@ -8148,27 +8126,7 @@
                 <a:latin typeface="Cambria" pitchFamily="18" charset="0"/>
                 <a:ea typeface="+mn-ea"/>
               </a:rPr>
-              <a:t>Experienced </a:t>
-            </a:r>
-            <a:r>
-              <a:rPr lang="en-US" sz="1000" b="0" dirty="0">
-                <a:solidFill>
-                  <a:schemeClr val="tx1"/>
-                </a:solidFill>
-                <a:latin typeface="Cambria" pitchFamily="18" charset="0"/>
-                <a:ea typeface="+mn-ea"/>
-              </a:rPr>
-              <a:t>in application development using </a:t>
-            </a:r>
-            <a:r>
-              <a:rPr lang="en-US" sz="1000" b="0" dirty="0">
-                <a:solidFill>
-                  <a:schemeClr val="tx1"/>
-                </a:solidFill>
-                <a:latin typeface="Cambria" pitchFamily="18" charset="0"/>
-                <a:ea typeface="+mn-ea"/>
-              </a:rPr>
-              <a:t>Java, HTML5, JavaScript, Android on Web and distributed platforms.</a:t>
+              <a:t>Experienced in application development using Golang, Python, Java, HTML5/CSS3 and JavaScript on Web and distributed platforms.</a:t>
             </a:r>
           </a:p>
           <a:p>
@@ -8193,17 +8151,7 @@
                 <a:latin typeface="Cambria" pitchFamily="18" charset="0"/>
                 <a:ea typeface="+mn-ea"/>
               </a:rPr>
-              <a:t>End to end development, delivery and maintenance of production ready application using latest client/server technologies</a:t>
-            </a:r>
-            <a:r>
-              <a:rPr lang="en-US" sz="1000" b="0" dirty="0" smtClean="0">
-                <a:solidFill>
-                  <a:schemeClr val="tx1"/>
-                </a:solidFill>
-                <a:latin typeface="Cambria" pitchFamily="18" charset="0"/>
-                <a:ea typeface="+mn-ea"/>
-              </a:rPr>
-              <a:t>.</a:t>
+              <a:t>End to end development, delivery and maintenance of production ready application using current client/server technologies.</a:t>
             </a:r>
           </a:p>
           <a:p>
@@ -8268,7 +8216,7 @@
                 <a:latin typeface="Cambria" pitchFamily="18" charset="0"/>
                 <a:ea typeface="+mn-ea"/>
               </a:rPr>
-              <a:t>Has very good understanding and hands-on knowledge of core Java and JavaScript (Client/Server), HTML5 and CSS3.</a:t>
+              <a:t>Has very good understanding and hands-on knowledge of Golang, Python, Java, JavaScript (Client/Server), HTML5 and CSS3.</a:t>
             </a:r>
           </a:p>
           <a:p>
@@ -8316,7 +8264,47 @@
                 <a:latin typeface="Cambria" pitchFamily="18" charset="0"/>
                 <a:ea typeface="+mn-ea"/>
               </a:rPr>
-              <a:t>Good understanding of the Car Infotainment system development.</a:t>
+              <a:t>Practical experience implementing software for </a:t>
+            </a:r>
+            <a:r>
+              <a:rPr lang="en-US" sz="1000" b="0" i="1" dirty="0">
+                <a:solidFill>
+                  <a:schemeClr val="tx1"/>
+                </a:solidFill>
+                <a:latin typeface="Cambria" pitchFamily="18" charset="0"/>
+                <a:ea typeface="+mn-ea"/>
+              </a:rPr>
+              <a:t>Telematics</a:t>
+            </a:r>
+            <a:r>
+              <a:rPr lang="en-US" sz="1000" b="0" dirty="0">
+                <a:solidFill>
+                  <a:schemeClr val="tx1"/>
+                </a:solidFill>
+                <a:latin typeface="Cambria" pitchFamily="18" charset="0"/>
+                <a:ea typeface="+mn-ea"/>
+              </a:rPr>
+              <a:t> domain and </a:t>
+            </a:r>
+            <a:r>
+              <a:rPr lang="en-US" sz="1000" b="0" i="1" dirty="0">
+                <a:solidFill>
+                  <a:schemeClr val="tx1"/>
+                </a:solidFill>
+                <a:latin typeface="Cambria" pitchFamily="18" charset="0"/>
+                <a:ea typeface="+mn-ea"/>
+              </a:rPr>
+              <a:t>Connected Car </a:t>
+            </a:r>
+            <a:r>
+              <a:rPr lang="en-US" sz="1000" b="0" dirty="0">
+                <a:solidFill>
+                  <a:schemeClr val="tx1"/>
+                </a:solidFill>
+                <a:latin typeface="Cambria" pitchFamily="18" charset="0"/>
+                <a:ea typeface="+mn-ea"/>
+              </a:rPr>
+              <a:t>technologies.</a:t>
             </a:r>
           </a:p>
           <a:p>
@@ -8332,7 +8320,7 @@
                 <a:latin typeface="Cambria" pitchFamily="18" charset="0"/>
                 <a:ea typeface="+mn-ea"/>
               </a:rPr>
-              <a:t>5 years of experience in using Agile based product development.</a:t>
+              <a:t>7+ years of experience in using Agile based product development.</a:t>
             </a:r>
           </a:p>
           <a:p>
@@ -8364,25 +8352,8 @@
                 <a:latin typeface="Cambria" pitchFamily="18" charset="0"/>
                 <a:ea typeface="+mn-ea"/>
               </a:rPr>
-              <a:t>Efficient in analysis and contributions to open source </a:t>
-            </a:r>
-            <a:r>
-              <a:rPr lang="en-US" sz="1000" b="0" dirty="0" smtClean="0">
-                <a:solidFill>
-                  <a:schemeClr val="tx1"/>
-                </a:solidFill>
-                <a:latin typeface="Cambria" pitchFamily="18" charset="0"/>
-                <a:ea typeface="+mn-ea"/>
-              </a:rPr>
-              <a:t>libraries</a:t>
-            </a:r>
-            <a:endParaRPr lang="en-US" sz="1000" b="0" dirty="0">
-              <a:solidFill>
-                <a:schemeClr val="tx1"/>
-              </a:solidFill>
-              <a:latin typeface="Cambria" pitchFamily="18" charset="0"/>
-              <a:ea typeface="+mn-ea"/>
-            </a:endParaRPr>
+              <a:t>Efficient in analysis and contributions to open source libraries</a:t>
+            </a:r>
           </a:p>
         </p:txBody>
       </p:sp>
@@ -8488,7 +8459,7 @@
         <p:spPr>
           <a:xfrm>
             <a:off x="4201787" y="534603"/>
-            <a:ext cx="4572000" cy="4031873"/>
+            <a:ext cx="4572000" cy="4168770"/>
           </a:xfrm>
           <a:prstGeom prst="rect">
             <a:avLst/>
@@ -8531,17 +8502,8 @@
               <a:rPr lang="en-US" sz="1000" dirty="0">
                 <a:latin typeface="Cambria" pitchFamily="18" charset="0"/>
               </a:rPr>
-              <a:t>Languages:  </a:t>
-            </a:r>
-            <a:r>
-              <a:rPr lang="en-US" sz="1000" dirty="0" smtClean="0">
-                <a:latin typeface="Cambria" pitchFamily="18" charset="0"/>
-              </a:rPr>
-              <a:t>Java/JS/HTML5/CSS3/Node JS</a:t>
-            </a:r>
-            <a:endParaRPr lang="en-US" sz="1000" dirty="0">
-              <a:latin typeface="Cambria" pitchFamily="18" charset="0"/>
-            </a:endParaRPr>
+              <a:t>Languages:  Golang/Python/Java/JS/HTML5/CSS3/Node JS</a:t>
+            </a:r>
           </a:p>
           <a:p>
             <a:pPr marL="171450" indent="-171450">
@@ -8564,19 +8526,7 @@
               <a:rPr lang="en-US" sz="1000" dirty="0">
                 <a:latin typeface="Cambria" pitchFamily="18" charset="0"/>
               </a:rPr>
-              <a:t>, </a:t>
-            </a:r>
-            <a:r>
-              <a:rPr lang="en-US" sz="1000" dirty="0" smtClean="0">
-                <a:latin typeface="Cambria" pitchFamily="18" charset="0"/>
-              </a:rPr>
-              <a:t>Node JS</a:t>
-            </a:r>
-            <a:r>
-              <a:rPr lang="en-US" sz="1000" dirty="0">
-                <a:latin typeface="Cambria" pitchFamily="18" charset="0"/>
-              </a:rPr>
-              <a:t>, JIRA, Stash, Bamboo</a:t>
+              <a:t>, Node JS, JIRA, Stash, Bamboo</a:t>
             </a:r>
           </a:p>
           <a:p>
@@ -8588,43 +8538,7 @@
               <a:rPr lang="en-US" sz="1000" dirty="0">
                 <a:latin typeface="Cambria" pitchFamily="18" charset="0"/>
               </a:rPr>
-              <a:t>Frameworks: </a:t>
-            </a:r>
-            <a:r>
-              <a:rPr lang="en-US" sz="1000" dirty="0" smtClean="0">
-                <a:latin typeface="Cambria" pitchFamily="18" charset="0"/>
-              </a:rPr>
-              <a:t>Backbone JS</a:t>
-            </a:r>
-            <a:r>
-              <a:rPr lang="en-US" sz="1000" dirty="0">
-                <a:latin typeface="Cambria" pitchFamily="18" charset="0"/>
-              </a:rPr>
-              <a:t>, </a:t>
-            </a:r>
-            <a:r>
-              <a:rPr lang="en-US" sz="1000" dirty="0" smtClean="0">
-                <a:latin typeface="Cambria" pitchFamily="18" charset="0"/>
-              </a:rPr>
-              <a:t>Angular JS</a:t>
-            </a:r>
-            <a:r>
-              <a:rPr lang="en-US" sz="1000" dirty="0">
-                <a:latin typeface="Cambria" pitchFamily="18" charset="0"/>
-              </a:rPr>
-              <a:t>, </a:t>
-            </a:r>
-            <a:r>
-              <a:rPr lang="en-US" sz="1000" dirty="0" smtClean="0">
-                <a:latin typeface="Cambria" pitchFamily="18" charset="0"/>
-              </a:rPr>
-              <a:t>React JS</a:t>
-            </a:r>
-            <a:r>
-              <a:rPr lang="en-US" sz="1000" dirty="0">
-                <a:latin typeface="Cambria" pitchFamily="18" charset="0"/>
-              </a:rPr>
-              <a:t>, Spring/Hibernate</a:t>
+              <a:t>Frameworks: Backbone JS, Angular JS, React JS, Spring/Hibernate</a:t>
             </a:r>
           </a:p>
           <a:p>
@@ -8636,16 +8550,10 @@
               <a:rPr lang="en-US" sz="1000" dirty="0">
                 <a:latin typeface="Cambria" pitchFamily="18" charset="0"/>
               </a:rPr>
-              <a:t>Versioning System:  GIT, SVN, </a:t>
-            </a:r>
-            <a:r>
-              <a:rPr lang="en-US" sz="1000" dirty="0" smtClean="0">
-                <a:latin typeface="Cambria" pitchFamily="18" charset="0"/>
-              </a:rPr>
-              <a:t>IBM </a:t>
-            </a:r>
-            <a:r>
-              <a:rPr lang="en-US" sz="1000" dirty="0" err="1" smtClean="0">
+              <a:t>Versioning System:  GIT, SVN, IBM </a:t>
+            </a:r>
+            <a:r>
+              <a:rPr lang="en-US" sz="1000" dirty="0" err="1">
                 <a:latin typeface="Cambria" pitchFamily="18" charset="0"/>
               </a:rPr>
               <a:t>ClearCase</a:t>
@@ -8675,7 +8583,7 @@
               <a:rPr lang="en-US" sz="1000" dirty="0">
                 <a:latin typeface="Cambria" pitchFamily="18" charset="0"/>
               </a:rPr>
-              <a:t>Cloud: AWS, Heroku</a:t>
+              <a:t>Cloud: AWS, Heroku, Azure</a:t>
             </a:r>
           </a:p>
           <a:p>
@@ -8687,22 +8595,16 @@
               <a:rPr lang="en-US" sz="1000" dirty="0">
                 <a:latin typeface="Cambria" pitchFamily="18" charset="0"/>
               </a:rPr>
-              <a:t>CMS: Tridion </a:t>
-            </a:r>
-            <a:r>
-              <a:rPr lang="en-US" sz="1000" dirty="0" smtClean="0">
+              <a:t>CMS: Tridion 2012/JOOMLA/</a:t>
+            </a:r>
+            <a:r>
+              <a:rPr lang="en-US" sz="1000" dirty="0" err="1">
                 <a:latin typeface="Cambria" pitchFamily="18" charset="0"/>
               </a:rPr>
-              <a:t>2012/JOOMLA/</a:t>
-            </a:r>
-            <a:r>
-              <a:rPr lang="en-US" sz="1000" dirty="0" err="1" smtClean="0">
-                <a:latin typeface="Cambria" pitchFamily="18" charset="0"/>
-              </a:rPr>
               <a:t>Wordpress</a:t>
             </a:r>
             <a:r>
-              <a:rPr lang="en-US" sz="1000" dirty="0" smtClean="0">
+              <a:rPr lang="en-US" sz="1000" dirty="0">
                 <a:latin typeface="Cambria" pitchFamily="18" charset="0"/>
               </a:rPr>
               <a:t>/Jekyll</a:t>
@@ -8714,7 +8616,7 @@
               <a:buChar char="•"/>
             </a:pPr>
             <a:r>
-              <a:rPr lang="en-US" sz="1000" dirty="0" smtClean="0">
+              <a:rPr lang="en-US" sz="1000" dirty="0">
                 <a:latin typeface="Cambria" pitchFamily="18" charset="0"/>
               </a:rPr>
               <a:t>Domains: </a:t>
@@ -8726,13 +8628,13 @@
               <a:buChar char="•"/>
             </a:pPr>
             <a:r>
-              <a:rPr lang="en-US" sz="1000" b="1" dirty="0" smtClean="0">
+              <a:rPr lang="en-US" sz="1000" b="1" dirty="0">
                 <a:latin typeface="Cambria" pitchFamily="18" charset="0"/>
               </a:rPr>
               <a:t>Insurance </a:t>
             </a:r>
             <a:r>
-              <a:rPr lang="en-US" sz="1000" dirty="0" smtClean="0">
+              <a:rPr lang="en-US" sz="1000" dirty="0">
                 <a:latin typeface="Cambria" pitchFamily="18" charset="0"/>
               </a:rPr>
               <a:t>– worked for CHUBB insurance, UK of their client oriented application and admin application for monitoring, sales and settlements of  insurance for a period of 2 years as software engineer</a:t>
@@ -8744,25 +8646,25 @@
               <a:buChar char="•"/>
             </a:pPr>
             <a:r>
-              <a:rPr lang="en-US" sz="1000" b="1" dirty="0" smtClean="0">
+              <a:rPr lang="en-US" sz="1000" b="1" dirty="0">
                 <a:latin typeface="Cambria" pitchFamily="18" charset="0"/>
               </a:rPr>
               <a:t>Security</a:t>
             </a:r>
             <a:r>
-              <a:rPr lang="en-US" sz="1000" dirty="0" smtClean="0">
+              <a:rPr lang="en-US" sz="1000" dirty="0">
                 <a:latin typeface="Cambria" pitchFamily="18" charset="0"/>
               </a:rPr>
               <a:t> – worked for CA Inc. for development of </a:t>
             </a:r>
             <a:r>
-              <a:rPr lang="en-US" sz="1000" dirty="0" err="1" smtClean="0">
+              <a:rPr lang="en-US" sz="1000" dirty="0" err="1">
                 <a:latin typeface="Cambria" pitchFamily="18" charset="0"/>
               </a:rPr>
               <a:t>siteminder</a:t>
             </a:r>
             <a:r>
-              <a:rPr lang="en-US" sz="1000" dirty="0" smtClean="0">
+              <a:rPr lang="en-US" sz="1000" dirty="0">
                 <a:latin typeface="Cambria" pitchFamily="18" charset="0"/>
               </a:rPr>
               <a:t> admin portal using Identity and Access management framework developed in-house for a period of 2 years.</a:t>
@@ -8774,13 +8676,13 @@
               <a:buChar char="•"/>
             </a:pPr>
             <a:r>
-              <a:rPr lang="en-US" sz="1000" b="1" dirty="0" smtClean="0">
+              <a:rPr lang="en-US" sz="1000" b="1" dirty="0">
                 <a:latin typeface="Cambria" pitchFamily="18" charset="0"/>
               </a:rPr>
-              <a:t>Telematics</a:t>
-            </a:r>
-            <a:r>
-              <a:rPr lang="en-US" sz="1000" dirty="0" smtClean="0">
+              <a:t>Telematics/Connected Car</a:t>
+            </a:r>
+            <a:r>
+              <a:rPr lang="en-US" sz="1000" dirty="0">
                 <a:latin typeface="Cambria" pitchFamily="18" charset="0"/>
               </a:rPr>
               <a:t> – worked on a collaboration of vehicular technologies, road transportation,  road safety, instrumentation, wireless technologies for Toyota Motors Europe to develop and maintain Telematics services for Toyota and Lexus navigation devices.</a:t>
@@ -8792,13 +8694,13 @@
               <a:buChar char="•"/>
             </a:pPr>
             <a:r>
-              <a:rPr lang="en-US" sz="1000" b="1" dirty="0" smtClean="0">
+              <a:rPr lang="en-US" sz="1000" b="1" dirty="0">
                 <a:latin typeface="Cambria" pitchFamily="18" charset="0"/>
               </a:rPr>
               <a:t>UX/UI</a:t>
             </a:r>
             <a:r>
-              <a:rPr lang="en-US" sz="1000" dirty="0" smtClean="0">
+              <a:rPr lang="en-US" sz="1000" dirty="0">
                 <a:latin typeface="Cambria" pitchFamily="18" charset="0"/>
               </a:rPr>
               <a:t> – worked on development and maintenance of client facing mobile and web applications for Toyota Motors Europe for their consumers of Lexus and Toyota vehicles across EU.</a:t>
@@ -8833,14 +8735,7 @@
                 <a:ea typeface="Segoe UI" panose="020B0502040204020203" pitchFamily="34" charset="0"/>
                 <a:cs typeface="Segoe UI" panose="020B0502040204020203" pitchFamily="34" charset="0"/>
               </a:rPr>
-              <a:t>Academic </a:t>
-            </a:r>
-            <a:r>
-              <a:rPr lang="en-US" sz="1000" b="1" dirty="0" smtClean="0">
-                <a:ea typeface="Segoe UI" panose="020B0502040204020203" pitchFamily="34" charset="0"/>
-                <a:cs typeface="Segoe UI" panose="020B0502040204020203" pitchFamily="34" charset="0"/>
-              </a:rPr>
-              <a:t>Qualifications</a:t>
+              <a:t>Academic Qualifications</a:t>
             </a:r>
           </a:p>
           <a:p>
@@ -8864,27 +8759,13 @@
                 <a:ea typeface="Segoe UI" panose="020B0502040204020203" pitchFamily="34" charset="0"/>
                 <a:cs typeface="Segoe UI" panose="020B0502040204020203" pitchFamily="34" charset="0"/>
               </a:rPr>
-              <a:t> </a:t>
-            </a:r>
-            <a:r>
-              <a:rPr lang="en-US" sz="1000" b="1" dirty="0" smtClean="0">
-                <a:latin typeface="Cambria" pitchFamily="18" charset="0"/>
-                <a:ea typeface="Segoe UI" panose="020B0502040204020203" pitchFamily="34" charset="0"/>
-                <a:cs typeface="Segoe UI" panose="020B0502040204020203" pitchFamily="34" charset="0"/>
-              </a:rPr>
-              <a:t>- </a:t>
-            </a:r>
-            <a:r>
-              <a:rPr lang="en-US" sz="1000" dirty="0" smtClean="0">
-                <a:latin typeface="Cambria" pitchFamily="18" charset="0"/>
-              </a:rPr>
-              <a:t>Bachelors </a:t>
+              <a:t> - </a:t>
             </a:r>
             <a:r>
               <a:rPr lang="en-US" sz="1000" dirty="0">
                 <a:latin typeface="Cambria" pitchFamily="18" charset="0"/>
               </a:rPr>
-              <a:t>of Technology in Computer Engineering.</a:t>
+              <a:t>Bachelors of Technology in Computer Engineering.</a:t>
             </a:r>
           </a:p>
         </p:txBody>
@@ -8899,21 +8780,6 @@
   <p:clrMapOvr>
     <a:masterClrMapping/>
   </p:clrMapOvr>
-  <mc:AlternateContent xmlns:mc="http://schemas.openxmlformats.org/markup-compatibility/2006" xmlns:p14="http://schemas.microsoft.com/office/powerpoint/2010/main">
-    <mc:Choice Requires="p14">
-      <p:transition spd="slow" p14:dur="2000"/>
-    </mc:Choice>
-    <mc:Fallback xmlns="">
-      <p:transition spd="slow"/>
-    </mc:Fallback>
-  </mc:AlternateContent>
-  <p:timing>
-    <p:tnLst>
-      <p:par>
-        <p:cTn id="1" dur="indefinite" restart="never" nodeType="tmRoot"/>
-      </p:par>
-    </p:tnLst>
-  </p:timing>
 </p:sld>
 </file>
 
@@ -9146,18 +9012,13 @@
               </a:spcAft>
             </a:pPr>
             <a:r>
-              <a:rPr lang="en-US" sz="2000" dirty="0" smtClean="0">
+              <a:rPr lang="en-US" sz="2000" dirty="0">
                 <a:solidFill>
                   <a:srgbClr val="000000"/>
                 </a:solidFill>
               </a:rPr>
-              <a:t>Samir Prakash – Technology Lead</a:t>
-            </a:r>
-            <a:endParaRPr lang="en-US" sz="2000" dirty="0">
-              <a:solidFill>
-                <a:srgbClr val="000000"/>
-              </a:solidFill>
-            </a:endParaRPr>
+              <a:t>Samir Prakash – Technology Architect (US)</a:t>
+            </a:r>
           </a:p>
         </p:txBody>
       </p:sp>
@@ -9226,7 +9087,7 @@
               </a:buClr>
             </a:pPr>
             <a:r>
-              <a:rPr lang="en-US" dirty="0" smtClean="0">
+              <a:rPr lang="en-US" dirty="0">
                 <a:solidFill>
                   <a:schemeClr val="tx1"/>
                 </a:solidFill>
@@ -9264,49 +9125,45 @@
           <a:p>
             <a:pPr eaLnBrk="0" hangingPunct="0"/>
             <a:r>
-              <a:rPr lang="en-US" sz="1050" dirty="0" smtClean="0">
+              <a:rPr lang="en-US" sz="1050" dirty="0">
                 <a:solidFill>
                   <a:schemeClr val="tx1"/>
                 </a:solidFill>
                 <a:latin typeface="Cambria" pitchFamily="18" charset="0"/>
                 <a:ea typeface="+mn-ea"/>
               </a:rPr>
-              <a:t>Toyota </a:t>
-            </a:r>
-            <a:r>
-              <a:rPr lang="en-US" sz="1050" dirty="0">
+              <a:t>PG DevOps</a:t>
+            </a:r>
+          </a:p>
+          <a:p>
+            <a:pPr eaLnBrk="0" hangingPunct="0"/>
+            <a:r>
+              <a:rPr lang="en-US" sz="1000" b="0" dirty="0">
                 <a:solidFill>
                   <a:schemeClr val="tx1"/>
                 </a:solidFill>
                 <a:latin typeface="Cambria" pitchFamily="18" charset="0"/>
                 <a:ea typeface="+mn-ea"/>
               </a:rPr>
-              <a:t>One Customer Portal</a:t>
+              <a:t>Product Development :  </a:t>
             </a:r>
           </a:p>
           <a:p>
             <a:pPr eaLnBrk="0" hangingPunct="0"/>
             <a:r>
-              <a:rPr lang="en-US" sz="1000" b="0" dirty="0" smtClean="0">
+              <a:rPr lang="en-US" sz="1000" i="1" dirty="0">
                 <a:solidFill>
                   <a:schemeClr val="tx1"/>
                 </a:solidFill>
                 <a:latin typeface="Cambria" pitchFamily="18" charset="0"/>
                 <a:ea typeface="+mn-ea"/>
               </a:rPr>
-              <a:t>Product </a:t>
-            </a:r>
-            <a:r>
-              <a:rPr lang="en-US" sz="1000" b="0" dirty="0">
-                <a:solidFill>
-                  <a:schemeClr val="tx1"/>
-                </a:solidFill>
-                <a:latin typeface="Cambria" pitchFamily="18" charset="0"/>
-                <a:ea typeface="+mn-ea"/>
-              </a:rPr>
-              <a:t>Development : </a:t>
-            </a:r>
-            <a:endParaRPr lang="en-US" sz="1000" b="0" dirty="0" smtClean="0">
+              <a:t>(TCNA, Plano– DevOps Engineer)</a:t>
+            </a:r>
+          </a:p>
+          <a:p>
+            <a:pPr eaLnBrk="0" hangingPunct="0"/>
+            <a:endParaRPr lang="en-US" sz="1000" i="1" dirty="0">
               <a:solidFill>
                 <a:schemeClr val="tx1"/>
               </a:solidFill>
@@ -9315,69 +9172,6 @@
             </a:endParaRPr>
           </a:p>
           <a:p>
-            <a:pPr eaLnBrk="0" hangingPunct="0"/>
-            <a:r>
-              <a:rPr lang="en-US" sz="1000" b="0" dirty="0" smtClean="0">
-                <a:solidFill>
-                  <a:schemeClr val="tx1"/>
-                </a:solidFill>
-                <a:latin typeface="Cambria" pitchFamily="18" charset="0"/>
-                <a:ea typeface="+mn-ea"/>
-              </a:rPr>
-              <a:t>(</a:t>
-            </a:r>
-            <a:r>
-              <a:rPr lang="en-US" sz="1000" b="0" dirty="0">
-                <a:solidFill>
-                  <a:schemeClr val="tx1"/>
-                </a:solidFill>
-                <a:latin typeface="Cambria" pitchFamily="18" charset="0"/>
-                <a:ea typeface="+mn-ea"/>
-              </a:rPr>
-              <a:t>TME, </a:t>
-            </a:r>
-            <a:r>
-              <a:rPr lang="en-US" sz="1000" b="0" dirty="0" smtClean="0">
-                <a:solidFill>
-                  <a:schemeClr val="tx1"/>
-                </a:solidFill>
-                <a:latin typeface="Cambria" pitchFamily="18" charset="0"/>
-                <a:ea typeface="+mn-ea"/>
-              </a:rPr>
-              <a:t>Brussels</a:t>
-            </a:r>
-            <a:r>
-              <a:rPr lang="en-US" sz="1000" b="0" dirty="0">
-                <a:solidFill>
-                  <a:schemeClr val="tx1"/>
-                </a:solidFill>
-                <a:latin typeface="Cambria" pitchFamily="18" charset="0"/>
-                <a:ea typeface="+mn-ea"/>
-              </a:rPr>
-              <a:t> </a:t>
-            </a:r>
-            <a:r>
-              <a:rPr lang="en-US" sz="1000" b="0" dirty="0" smtClean="0">
-                <a:solidFill>
-                  <a:schemeClr val="tx1"/>
-                </a:solidFill>
-                <a:latin typeface="Cambria" pitchFamily="18" charset="0"/>
-                <a:ea typeface="+mn-ea"/>
-              </a:rPr>
-              <a:t>– </a:t>
-            </a:r>
-            <a:r>
-              <a:rPr lang="en-US" sz="1000" b="0" dirty="0">
-                <a:solidFill>
-                  <a:schemeClr val="tx1"/>
-                </a:solidFill>
-                <a:latin typeface="Cambria" pitchFamily="18" charset="0"/>
-                <a:ea typeface="+mn-ea"/>
-              </a:rPr>
-              <a:t>Lead Architect/Developer)</a:t>
-            </a:r>
-          </a:p>
-          <a:p>
             <a:pPr marL="171450" indent="-171450" eaLnBrk="0" hangingPunct="0">
               <a:buFont typeface="Arial" panose="020B0604020202020204" pitchFamily="34" charset="0"/>
               <a:buChar char="•"/>
@@ -9390,26 +9184,8 @@
                 <a:latin typeface="Cambria" pitchFamily="18" charset="0"/>
                 <a:ea typeface="+mn-ea"/>
               </a:rPr>
-              <a:t>Pan-European website for customer facing services: </a:t>
-            </a:r>
-            <a:r>
-              <a:rPr lang="en-US" sz="1000" b="0" dirty="0">
-                <a:solidFill>
-                  <a:schemeClr val="tx1"/>
-                </a:solidFill>
-                <a:latin typeface="Cambria" pitchFamily="18" charset="0"/>
-                <a:ea typeface="+mn-ea"/>
-                <a:hlinkClick r:id="rId3"/>
-              </a:rPr>
-              <a:t>www.toyota.co.uk</a:t>
-            </a:r>
-            <a:endParaRPr lang="en-US" sz="1000" b="0" dirty="0">
-              <a:solidFill>
-                <a:schemeClr val="tx1"/>
-              </a:solidFill>
-              <a:latin typeface="Cambria" pitchFamily="18" charset="0"/>
-              <a:ea typeface="+mn-ea"/>
-            </a:endParaRPr>
+              <a:t>Enabling development teams to deliver faster and better by implementing DevOps practices</a:t>
+            </a:r>
           </a:p>
           <a:p>
             <a:pPr marL="171450" indent="-171450" eaLnBrk="0" hangingPunct="0">
@@ -9417,24 +9193,34 @@
               <a:buChar char="•"/>
             </a:pPr>
             <a:r>
-              <a:rPr lang="en-US" sz="1000" b="0" dirty="0" smtClean="0">
+              <a:rPr lang="en-US" sz="1000" b="0" dirty="0">
                 <a:solidFill>
                   <a:schemeClr val="tx1"/>
                 </a:solidFill>
                 <a:latin typeface="Cambria" pitchFamily="18" charset="0"/>
                 <a:ea typeface="+mn-ea"/>
               </a:rPr>
-              <a:t>Live </a:t>
-            </a:r>
-            <a:r>
-              <a:rPr lang="en-US" sz="1000" b="0" dirty="0">
+              <a:t>Creating and maintaining CI/CD pipeline for development teams using Jenkins/Semaphore/</a:t>
+            </a:r>
+            <a:r>
+              <a:rPr lang="en-US" sz="1000" b="0" dirty="0" err="1">
                 <a:solidFill>
                   <a:schemeClr val="tx1"/>
                 </a:solidFill>
                 <a:latin typeface="Cambria" pitchFamily="18" charset="0"/>
                 <a:ea typeface="+mn-ea"/>
               </a:rPr>
-              <a:t>website and web apps for 28 countries over 46 languages for Toyota/Lexus using latest open source client/server technologies like Backbone/React/Node/Express/Angular/Spring/Hibernate</a:t>
+              <a:t>Wercker</a:t>
+            </a:r>
+            <a:r>
+              <a:rPr lang="en-US" sz="1000" b="0" dirty="0">
+                <a:solidFill>
+                  <a:schemeClr val="tx1"/>
+                </a:solidFill>
+                <a:latin typeface="Cambria" pitchFamily="18" charset="0"/>
+                <a:ea typeface="+mn-ea"/>
+              </a:rPr>
+              <a:t>/Visual Studio Team Services </a:t>
             </a:r>
           </a:p>
           <a:p>
@@ -9443,24 +9229,14 @@
               <a:buChar char="•"/>
             </a:pPr>
             <a:r>
-              <a:rPr lang="en-US" sz="1000" b="0" dirty="0" smtClean="0">
+              <a:rPr lang="en-US" sz="1000" b="0" dirty="0">
                 <a:solidFill>
                   <a:schemeClr val="tx1"/>
                 </a:solidFill>
                 <a:latin typeface="Cambria" pitchFamily="18" charset="0"/>
                 <a:ea typeface="+mn-ea"/>
               </a:rPr>
-              <a:t>Integration </a:t>
-            </a:r>
-            <a:r>
-              <a:rPr lang="en-US" sz="1000" b="0" dirty="0">
-                <a:solidFill>
-                  <a:schemeClr val="tx1"/>
-                </a:solidFill>
-                <a:latin typeface="Cambria" pitchFamily="18" charset="0"/>
-                <a:ea typeface="+mn-ea"/>
-              </a:rPr>
-              <a:t>with In-Car navigation devices using Telematics services</a:t>
+              <a:t>Infrastructure as a Code using Terraform and Ansible</a:t>
             </a:r>
           </a:p>
           <a:p>
@@ -9469,24 +9245,14 @@
               <a:buChar char="•"/>
             </a:pPr>
             <a:r>
-              <a:rPr lang="en-US" sz="1000" b="0" dirty="0" smtClean="0">
+              <a:rPr lang="en-US" sz="1000" b="0" dirty="0">
                 <a:solidFill>
                   <a:schemeClr val="tx1"/>
                 </a:solidFill>
                 <a:latin typeface="Cambria" pitchFamily="18" charset="0"/>
                 <a:ea typeface="+mn-ea"/>
               </a:rPr>
-              <a:t>Cloud </a:t>
-            </a:r>
-            <a:r>
-              <a:rPr lang="en-US" sz="1000" b="0" dirty="0">
-                <a:solidFill>
-                  <a:schemeClr val="tx1"/>
-                </a:solidFill>
-                <a:latin typeface="Cambria" pitchFamily="18" charset="0"/>
-                <a:ea typeface="+mn-ea"/>
-              </a:rPr>
-              <a:t>based deployment using AWS and Heroku</a:t>
+              <a:t>Create and maintain multiple development and deployment environments</a:t>
             </a:r>
           </a:p>
           <a:p>
@@ -9495,24 +9261,14 @@
               <a:buChar char="•"/>
             </a:pPr>
             <a:r>
-              <a:rPr lang="en-US" sz="1000" b="0" dirty="0" smtClean="0">
+              <a:rPr lang="en-US" sz="1000" b="0" dirty="0">
                 <a:solidFill>
                   <a:schemeClr val="tx1"/>
                 </a:solidFill>
                 <a:latin typeface="Cambria" pitchFamily="18" charset="0"/>
                 <a:ea typeface="+mn-ea"/>
               </a:rPr>
-              <a:t>Continuous </a:t>
-            </a:r>
-            <a:r>
-              <a:rPr lang="en-US" sz="1000" b="0" dirty="0">
-                <a:solidFill>
-                  <a:schemeClr val="tx1"/>
-                </a:solidFill>
-                <a:latin typeface="Cambria" pitchFamily="18" charset="0"/>
-                <a:ea typeface="+mn-ea"/>
-              </a:rPr>
-              <a:t>integration and deployment process for faster roll-outs</a:t>
+              <a:t>Testing, finalizing and promoting builds over multiple environments based on pre-defined strategies and policies</a:t>
             </a:r>
           </a:p>
           <a:p>
@@ -9521,44 +9277,14 @@
               <a:buChar char="•"/>
             </a:pPr>
             <a:r>
-              <a:rPr lang="en-US" sz="1000" b="0" dirty="0" smtClean="0">
+              <a:rPr lang="en-US" sz="1000" b="0" dirty="0">
                 <a:solidFill>
                   <a:schemeClr val="tx1"/>
                 </a:solidFill>
                 <a:latin typeface="Cambria" pitchFamily="18" charset="0"/>
                 <a:ea typeface="+mn-ea"/>
               </a:rPr>
-              <a:t>On </a:t>
-            </a:r>
-            <a:r>
-              <a:rPr lang="en-US" sz="1000" b="0" dirty="0">
-                <a:solidFill>
-                  <a:schemeClr val="tx1"/>
-                </a:solidFill>
-                <a:latin typeface="Cambria" pitchFamily="18" charset="0"/>
-                <a:ea typeface="+mn-ea"/>
-              </a:rPr>
-              <a:t>shore experience of 4 years at Brussels including requirement </a:t>
-            </a:r>
-            <a:r>
-              <a:rPr lang="en-US" sz="1000" b="0" dirty="0" smtClean="0">
-                <a:solidFill>
-                  <a:schemeClr val="tx1"/>
-                </a:solidFill>
-                <a:latin typeface="Cambria" pitchFamily="18" charset="0"/>
-                <a:ea typeface="+mn-ea"/>
-              </a:rPr>
-              <a:t>elicitation</a:t>
-            </a:r>
-            <a:r>
-              <a:rPr lang="en-US" sz="1000" b="0" dirty="0">
-                <a:solidFill>
-                  <a:schemeClr val="tx1"/>
-                </a:solidFill>
-                <a:latin typeface="Cambria" pitchFamily="18" charset="0"/>
-                <a:ea typeface="+mn-ea"/>
-              </a:rPr>
-              <a:t>, analysis, design and development, testing, delivery and production support. </a:t>
+              <a:t>Containerizing Spring Boot micro services and JavaScript based SPA with Docker and Kubernetes</a:t>
             </a:r>
           </a:p>
           <a:p>
@@ -9567,24 +9293,14 @@
               <a:buChar char="•"/>
             </a:pPr>
             <a:r>
-              <a:rPr lang="en-US" sz="1000" b="0" dirty="0" smtClean="0">
+              <a:rPr lang="en-US" sz="1000" b="0" dirty="0">
                 <a:solidFill>
                   <a:schemeClr val="tx1"/>
                 </a:solidFill>
                 <a:latin typeface="Cambria" pitchFamily="18" charset="0"/>
                 <a:ea typeface="+mn-ea"/>
               </a:rPr>
-              <a:t>Project </a:t>
-            </a:r>
-            <a:r>
-              <a:rPr lang="en-US" sz="1000" b="0" dirty="0">
-                <a:solidFill>
-                  <a:schemeClr val="tx1"/>
-                </a:solidFill>
-                <a:latin typeface="Cambria" pitchFamily="18" charset="0"/>
-                <a:ea typeface="+mn-ea"/>
-              </a:rPr>
-              <a:t>coordination and onsite coordination for off shore development team (14 members and growing) from TME HO, Brussels, Belgium.</a:t>
+              <a:t>Enabling development teams to implement best practices micro services architecture and development</a:t>
             </a:r>
           </a:p>
           <a:p>
@@ -9600,15 +9316,8 @@
                 <a:latin typeface="Cambria" pitchFamily="18" charset="0"/>
                 <a:ea typeface="+mn-ea"/>
               </a:rPr>
-              <a:t>F2F Client handling at Brussels for the last 4 years </a:t>
-            </a:r>
-            <a:endParaRPr lang="en-US" sz="1000" b="0" dirty="0" smtClean="0">
-              <a:solidFill>
-                <a:schemeClr val="tx1"/>
-              </a:solidFill>
-              <a:latin typeface="Cambria" pitchFamily="18" charset="0"/>
-              <a:ea typeface="+mn-ea"/>
-            </a:endParaRPr>
+              <a:t>Enabling teams to understand and implement JavaScript/HTML5/Node based applications</a:t>
+            </a:r>
           </a:p>
           <a:p>
             <a:pPr marL="171450" indent="-171450" eaLnBrk="0" hangingPunct="0">
@@ -9616,14 +9325,14 @@
               <a:buChar char="•"/>
             </a:pPr>
             <a:r>
-              <a:rPr lang="en-US" sz="1000" b="0" dirty="0" smtClean="0">
+              <a:rPr lang="en-US" sz="1000" b="0" dirty="0">
                 <a:solidFill>
                   <a:schemeClr val="tx1"/>
                 </a:solidFill>
                 <a:latin typeface="Cambria" pitchFamily="18" charset="0"/>
                 <a:ea typeface="+mn-ea"/>
               </a:rPr>
-              <a:t>Online service booking for vehicle owners at the tip of their fingers</a:t>
+              <a:t>Enforcing application, container and orchestration level security for frontend and backend micro services</a:t>
             </a:r>
           </a:p>
           <a:p>
@@ -9632,35 +9341,33 @@
               <a:buChar char="•"/>
             </a:pPr>
             <a:r>
-              <a:rPr lang="en-US" sz="1000" b="0" dirty="0" smtClean="0">
+              <a:rPr lang="en-US" sz="1000" b="0" dirty="0">
                 <a:solidFill>
                   <a:schemeClr val="tx1"/>
                 </a:solidFill>
                 <a:latin typeface="Cambria" pitchFamily="18" charset="0"/>
-                <a:ea typeface="+mn-ea"/>
-              </a:rPr>
-              <a:t>Facilities to select and book appointments with Pan-European dealers to provide hassle free services to vehicle owners</a:t>
-            </a:r>
-            <a:endParaRPr lang="en-US" sz="1000" b="0" dirty="0">
-              <a:solidFill>
-                <a:schemeClr val="tx1"/>
-              </a:solidFill>
-              <a:latin typeface="Cambria" pitchFamily="18" charset="0"/>
-              <a:ea typeface="+mn-ea"/>
-            </a:endParaRPr>
-          </a:p>
-          <a:p>
-            <a:pPr marL="171450" indent="-171450" algn="just" fontAlgn="base">
-              <a:lnSpc>
-                <a:spcPct val="100000"/>
-              </a:lnSpc>
-              <a:spcBef>
-                <a:spcPct val="0"/>
-              </a:spcBef>
-              <a:spcAft>
-                <a:spcPct val="0"/>
-              </a:spcAft>
-              <a:buFont typeface="Arial" pitchFamily="34" charset="0"/>
+              </a:rPr>
+              <a:t>Enabling teams to implement GIT workflow using feature based development</a:t>
+            </a:r>
+          </a:p>
+          <a:p>
+            <a:pPr marL="171450" indent="-171450" eaLnBrk="0" hangingPunct="0">
+              <a:buFont typeface="Arial" panose="020B0604020202020204" pitchFamily="34" charset="0"/>
+              <a:buChar char="•"/>
+            </a:pPr>
+            <a:r>
+              <a:rPr lang="en-US" sz="1000" b="0" dirty="0">
+                <a:solidFill>
+                  <a:schemeClr val="tx1"/>
+                </a:solidFill>
+                <a:latin typeface="Cambria" pitchFamily="18" charset="0"/>
+              </a:rPr>
+              <a:t>Enabling teams to understand and implement DevOps</a:t>
+            </a:r>
+          </a:p>
+          <a:p>
+            <a:pPr marL="171450" indent="-171450" eaLnBrk="0" hangingPunct="0">
+              <a:buFont typeface="Arial" panose="020B0604020202020204" pitchFamily="34" charset="0"/>
               <a:buChar char="•"/>
             </a:pPr>
             <a:endParaRPr lang="en-US" sz="1000" b="0" dirty="0">
@@ -9723,6 +9430,660 @@
             </a:lvl1pPr>
           </a:lstStyle>
           <a:p>
+            <a:pPr marL="171450" indent="-171450" eaLnBrk="0" hangingPunct="0">
+              <a:buFont typeface="Arial" panose="020B0604020202020204" pitchFamily="34" charset="0"/>
+              <a:buChar char="•"/>
+            </a:pPr>
+            <a:r>
+              <a:rPr lang="en-US" sz="1000" b="0" dirty="0">
+                <a:solidFill>
+                  <a:schemeClr val="tx1"/>
+                </a:solidFill>
+                <a:latin typeface="Cambria" pitchFamily="18" charset="0"/>
+                <a:ea typeface="+mn-ea"/>
+              </a:rPr>
+              <a:t>Test engineering enablement for PG micro services and TSP as a product</a:t>
+            </a:r>
+          </a:p>
+          <a:p>
+            <a:pPr marL="171450" indent="-171450" eaLnBrk="0" hangingPunct="0">
+              <a:buFont typeface="Arial" panose="020B0604020202020204" pitchFamily="34" charset="0"/>
+              <a:buChar char="•"/>
+            </a:pPr>
+            <a:r>
+              <a:rPr lang="en-US" sz="1000" b="0" dirty="0">
+                <a:solidFill>
+                  <a:schemeClr val="tx1"/>
+                </a:solidFill>
+                <a:latin typeface="Cambria" pitchFamily="18" charset="0"/>
+                <a:ea typeface="+mn-ea"/>
+              </a:rPr>
+              <a:t>Implementing DevOps best practices for Salesforce CRM applications</a:t>
+            </a:r>
+          </a:p>
+          <a:p>
+            <a:pPr marL="171450" indent="-171450" eaLnBrk="0" hangingPunct="0">
+              <a:buFont typeface="Arial" panose="020B0604020202020204" pitchFamily="34" charset="0"/>
+              <a:buChar char="•"/>
+            </a:pPr>
+            <a:r>
+              <a:rPr lang="en-US" sz="1000" b="0" dirty="0">
+                <a:solidFill>
+                  <a:schemeClr val="tx1"/>
+                </a:solidFill>
+                <a:latin typeface="Cambria" pitchFamily="18" charset="0"/>
+                <a:ea typeface="+mn-ea"/>
+              </a:rPr>
+              <a:t>Production readiness checklist for micro services</a:t>
+            </a:r>
+          </a:p>
+          <a:p>
+            <a:pPr marL="171450" indent="-171450" eaLnBrk="0" hangingPunct="0">
+              <a:buFont typeface="Arial" panose="020B0604020202020204" pitchFamily="34" charset="0"/>
+              <a:buChar char="•"/>
+            </a:pPr>
+            <a:r>
+              <a:rPr lang="en-US" sz="1000" b="0" dirty="0">
+                <a:solidFill>
+                  <a:schemeClr val="tx1"/>
+                </a:solidFill>
+                <a:latin typeface="Cambria" pitchFamily="18" charset="0"/>
+                <a:ea typeface="+mn-ea"/>
+              </a:rPr>
+              <a:t>Implementing SRE best practices for PG micro services</a:t>
+            </a:r>
+          </a:p>
+          <a:p>
+            <a:pPr marL="171450" indent="-171450" eaLnBrk="0" hangingPunct="0">
+              <a:buFont typeface="Arial" panose="020B0604020202020204" pitchFamily="34" charset="0"/>
+              <a:buChar char="•"/>
+            </a:pPr>
+            <a:r>
+              <a:rPr lang="en-US" sz="1000" b="0" dirty="0">
+                <a:solidFill>
+                  <a:schemeClr val="tx1"/>
+                </a:solidFill>
+                <a:latin typeface="Cambria" pitchFamily="18" charset="0"/>
+                <a:ea typeface="+mn-ea"/>
+              </a:rPr>
+              <a:t>Monitoring and reporting for PG micro services</a:t>
+            </a:r>
+          </a:p>
+          <a:p>
+            <a:pPr marL="171450" indent="-171450" eaLnBrk="0" hangingPunct="0">
+              <a:buFont typeface="Arial" panose="020B0604020202020204" pitchFamily="34" charset="0"/>
+              <a:buChar char="•"/>
+            </a:pPr>
+            <a:r>
+              <a:rPr lang="en-US" sz="1000" b="0" dirty="0">
+                <a:solidFill>
+                  <a:schemeClr val="tx1"/>
+                </a:solidFill>
+                <a:latin typeface="Cambria" pitchFamily="18" charset="0"/>
+                <a:ea typeface="+mn-ea"/>
+              </a:rPr>
+              <a:t>Configuring private registries on Microsoft Azure for Docker images</a:t>
+            </a:r>
+          </a:p>
+          <a:p>
+            <a:pPr marL="171450" indent="-171450" eaLnBrk="0" hangingPunct="0">
+              <a:buFont typeface="Arial" panose="020B0604020202020204" pitchFamily="34" charset="0"/>
+              <a:buChar char="•"/>
+            </a:pPr>
+            <a:r>
+              <a:rPr lang="en-US" sz="1000" b="0" dirty="0">
+                <a:solidFill>
+                  <a:schemeClr val="tx1"/>
+                </a:solidFill>
+                <a:latin typeface="Cambria" pitchFamily="18" charset="0"/>
+                <a:ea typeface="+mn-ea"/>
+              </a:rPr>
+              <a:t>Implementing best practices for creating/tagging/maintaining Docker images</a:t>
+            </a:r>
+          </a:p>
+          <a:p>
+            <a:pPr marL="171450" indent="-171450" eaLnBrk="0" hangingPunct="0">
+              <a:buFont typeface="Arial" panose="020B0604020202020204" pitchFamily="34" charset="0"/>
+              <a:buChar char="•"/>
+            </a:pPr>
+            <a:r>
+              <a:rPr lang="en-US" sz="1000" b="0" dirty="0">
+                <a:solidFill>
+                  <a:schemeClr val="tx1"/>
+                </a:solidFill>
+                <a:latin typeface="Cambria" pitchFamily="18" charset="0"/>
+                <a:ea typeface="+mn-ea"/>
+              </a:rPr>
+              <a:t>Implementing code coverage guidelines using SonarQube and </a:t>
+            </a:r>
+            <a:r>
+              <a:rPr lang="en-US" sz="1000" b="0" dirty="0" err="1">
+                <a:solidFill>
+                  <a:schemeClr val="tx1"/>
+                </a:solidFill>
+                <a:latin typeface="Cambria" pitchFamily="18" charset="0"/>
+                <a:ea typeface="+mn-ea"/>
+              </a:rPr>
+              <a:t>JaCoCo</a:t>
+            </a:r>
+            <a:r>
+              <a:rPr lang="en-US" sz="1000" b="0" dirty="0">
+                <a:solidFill>
+                  <a:schemeClr val="tx1"/>
+                </a:solidFill>
+                <a:latin typeface="Cambria" pitchFamily="18" charset="0"/>
+                <a:ea typeface="+mn-ea"/>
+              </a:rPr>
+              <a:t> for Java and JavaScript based applications</a:t>
+            </a:r>
+          </a:p>
+          <a:p>
+            <a:pPr marL="171450" indent="-171450" eaLnBrk="0" hangingPunct="0">
+              <a:buFont typeface="Arial" panose="020B0604020202020204" pitchFamily="34" charset="0"/>
+              <a:buChar char="•"/>
+            </a:pPr>
+            <a:r>
+              <a:rPr lang="en-US" sz="1000" b="0" dirty="0">
+                <a:solidFill>
+                  <a:schemeClr val="tx1"/>
+                </a:solidFill>
+                <a:latin typeface="Cambria" pitchFamily="18" charset="0"/>
+                <a:ea typeface="+mn-ea"/>
+              </a:rPr>
+              <a:t>Implementing cloud based </a:t>
+            </a:r>
+            <a:r>
+              <a:rPr lang="en-US" sz="1000" b="0" dirty="0" err="1">
+                <a:solidFill>
+                  <a:schemeClr val="tx1"/>
+                </a:solidFill>
+                <a:latin typeface="Cambria" pitchFamily="18" charset="0"/>
+                <a:ea typeface="+mn-ea"/>
+              </a:rPr>
+              <a:t>artifactory</a:t>
+            </a:r>
+            <a:r>
+              <a:rPr lang="en-US" sz="1000" b="0" dirty="0">
+                <a:solidFill>
+                  <a:schemeClr val="tx1"/>
+                </a:solidFill>
+                <a:latin typeface="Cambria" pitchFamily="18" charset="0"/>
+                <a:ea typeface="+mn-ea"/>
+              </a:rPr>
+              <a:t> solution using </a:t>
+            </a:r>
+            <a:r>
+              <a:rPr lang="en-US" sz="1000" b="0" dirty="0" err="1">
+                <a:solidFill>
+                  <a:schemeClr val="tx1"/>
+                </a:solidFill>
+                <a:latin typeface="Cambria" pitchFamily="18" charset="0"/>
+                <a:ea typeface="+mn-ea"/>
+              </a:rPr>
+              <a:t>JFrog</a:t>
+            </a:r>
+            <a:endParaRPr lang="en-US" sz="1000" b="0" dirty="0">
+              <a:solidFill>
+                <a:schemeClr val="tx1"/>
+              </a:solidFill>
+              <a:latin typeface="Cambria" pitchFamily="18" charset="0"/>
+              <a:ea typeface="+mn-ea"/>
+            </a:endParaRPr>
+          </a:p>
+          <a:p>
+            <a:pPr marL="171450" indent="-171450" eaLnBrk="0" hangingPunct="0">
+              <a:buFont typeface="Arial" panose="020B0604020202020204" pitchFamily="34" charset="0"/>
+              <a:buChar char="•"/>
+            </a:pPr>
+            <a:r>
+              <a:rPr lang="en-US" sz="1000" b="0" dirty="0">
+                <a:solidFill>
+                  <a:schemeClr val="tx1"/>
+                </a:solidFill>
+                <a:latin typeface="Cambria" pitchFamily="18" charset="0"/>
+                <a:ea typeface="+mn-ea"/>
+              </a:rPr>
+              <a:t>Implementing profile based configuration for Java micro services for multiple deployments on Kubernetes</a:t>
+            </a:r>
+          </a:p>
+          <a:p>
+            <a:pPr marL="171450" indent="-171450" eaLnBrk="0" hangingPunct="0">
+              <a:buFont typeface="Arial" panose="020B0604020202020204" pitchFamily="34" charset="0"/>
+              <a:buChar char="•"/>
+            </a:pPr>
+            <a:r>
+              <a:rPr lang="en-US" sz="1000" b="0" dirty="0">
+                <a:solidFill>
+                  <a:schemeClr val="tx1"/>
+                </a:solidFill>
+                <a:latin typeface="Cambria" pitchFamily="18" charset="0"/>
+                <a:ea typeface="+mn-ea"/>
+              </a:rPr>
+              <a:t>Implementing externalized configuration server for Java micro services for Kubernetes deployment management</a:t>
+            </a:r>
+          </a:p>
+          <a:p>
+            <a:pPr marL="171450" indent="-171450" eaLnBrk="0" hangingPunct="0">
+              <a:buFont typeface="Arial" panose="020B0604020202020204" pitchFamily="34" charset="0"/>
+              <a:buChar char="•"/>
+            </a:pPr>
+            <a:r>
+              <a:rPr lang="en-US" sz="1000" b="0" dirty="0">
+                <a:solidFill>
+                  <a:schemeClr val="tx1"/>
+                </a:solidFill>
+                <a:latin typeface="Cambria" pitchFamily="18" charset="0"/>
+                <a:ea typeface="+mn-ea"/>
+              </a:rPr>
+              <a:t>Configuring Microsoft Azure as a cloud service provider for project requirements</a:t>
+            </a:r>
+          </a:p>
+          <a:p>
+            <a:pPr marL="171450" indent="-171450" eaLnBrk="0" hangingPunct="0">
+              <a:buFont typeface="Arial" panose="020B0604020202020204" pitchFamily="34" charset="0"/>
+              <a:buChar char="•"/>
+            </a:pPr>
+            <a:r>
+              <a:rPr lang="en-US" sz="1000" b="0" dirty="0">
+                <a:solidFill>
+                  <a:schemeClr val="tx1"/>
+                </a:solidFill>
+                <a:latin typeface="Cambria" pitchFamily="18" charset="0"/>
+                <a:ea typeface="+mn-ea"/>
+              </a:rPr>
+              <a:t>Container orchestration using Kubernetes 1.8 and Microsoft Azure</a:t>
+            </a:r>
+          </a:p>
+          <a:p>
+            <a:pPr marL="171450" indent="-171450" eaLnBrk="0" hangingPunct="0">
+              <a:buFont typeface="Arial" panose="020B0604020202020204" pitchFamily="34" charset="0"/>
+              <a:buChar char="•"/>
+            </a:pPr>
+            <a:r>
+              <a:rPr lang="en-US" sz="1000" b="0" dirty="0">
+                <a:solidFill>
+                  <a:schemeClr val="tx1"/>
+                </a:solidFill>
+                <a:latin typeface="Cambria" pitchFamily="18" charset="0"/>
+                <a:ea typeface="+mn-ea"/>
+              </a:rPr>
+              <a:t>Managing Pods, Deployments, Services on Kubernetes</a:t>
+            </a:r>
+          </a:p>
+          <a:p>
+            <a:pPr marL="171450" indent="-171450" eaLnBrk="0" hangingPunct="0">
+              <a:buFont typeface="Arial" panose="020B0604020202020204" pitchFamily="34" charset="0"/>
+              <a:buChar char="•"/>
+            </a:pPr>
+            <a:r>
+              <a:rPr lang="en-US" sz="1000" b="0" dirty="0">
+                <a:solidFill>
+                  <a:schemeClr val="tx1"/>
+                </a:solidFill>
+                <a:latin typeface="Cambria" pitchFamily="18" charset="0"/>
+                <a:ea typeface="+mn-ea"/>
+              </a:rPr>
+              <a:t>Creating and maintaining deployment scripts for Windows and Linux environments for Kubernetes deployments</a:t>
+            </a:r>
+          </a:p>
+          <a:p>
+            <a:pPr marL="171450" indent="-171450" eaLnBrk="0" hangingPunct="0">
+              <a:buFont typeface="Arial" panose="020B0604020202020204" pitchFamily="34" charset="0"/>
+              <a:buChar char="•"/>
+            </a:pPr>
+            <a:r>
+              <a:rPr lang="en-US" sz="1000" b="0" dirty="0">
+                <a:solidFill>
+                  <a:schemeClr val="tx1"/>
+                </a:solidFill>
+                <a:latin typeface="Cambria" pitchFamily="18" charset="0"/>
+                <a:ea typeface="+mn-ea"/>
+              </a:rPr>
+              <a:t>Working on developing optimized CI/CD workflows using latest trends in current technologies</a:t>
+            </a:r>
+          </a:p>
+          <a:p>
+            <a:pPr marL="171450" indent="-171450" eaLnBrk="0" hangingPunct="0">
+              <a:buFont typeface="Arial" panose="020B0604020202020204" pitchFamily="34" charset="0"/>
+              <a:buChar char="•"/>
+            </a:pPr>
+            <a:r>
+              <a:rPr lang="en-US" sz="1000" b="0" dirty="0">
+                <a:solidFill>
+                  <a:schemeClr val="tx1"/>
+                </a:solidFill>
+                <a:latin typeface="Cambria" pitchFamily="18" charset="0"/>
+                <a:ea typeface="+mn-ea"/>
+              </a:rPr>
+              <a:t>Evaluating PaaS, SaaS and IaaS providers to provide the most cost effective solutions</a:t>
+            </a:r>
+          </a:p>
+          <a:p>
+            <a:pPr marL="171450" indent="-171450" algn="just" fontAlgn="base">
+              <a:lnSpc>
+                <a:spcPct val="100000"/>
+              </a:lnSpc>
+              <a:spcBef>
+                <a:spcPct val="0"/>
+              </a:spcBef>
+              <a:spcAft>
+                <a:spcPct val="0"/>
+              </a:spcAft>
+              <a:buFont typeface="Arial" pitchFamily="34" charset="0"/>
+              <a:buChar char="•"/>
+            </a:pPr>
+            <a:endParaRPr lang="en-US" sz="1000" b="0" dirty="0">
+              <a:solidFill>
+                <a:schemeClr val="tx1"/>
+              </a:solidFill>
+              <a:latin typeface="Cambria" pitchFamily="18" charset="0"/>
+              <a:ea typeface="+mn-ea"/>
+            </a:endParaRPr>
+          </a:p>
+        </p:txBody>
+      </p:sp>
+    </p:spTree>
+    <p:extLst>
+      <p:ext uri="{BB962C8B-B14F-4D97-AF65-F5344CB8AC3E}">
+        <p14:creationId xmlns:p14="http://schemas.microsoft.com/office/powerpoint/2010/main" val="720897785"/>
+      </p:ext>
+    </p:extLst>
+  </p:cSld>
+  <p:clrMapOvr>
+    <a:masterClrMapping/>
+  </p:clrMapOvr>
+</p:sld>
+</file>
+
+<file path=ppt/slides/slide3.xml><?xml version="1.0" encoding="utf-8"?>
+<p:sld xmlns:a="http://schemas.openxmlformats.org/drawingml/2006/main" xmlns:r="http://schemas.openxmlformats.org/officeDocument/2006/relationships" xmlns:p="http://schemas.openxmlformats.org/presentationml/2006/main">
+  <p:cSld>
+    <p:spTree>
+      <p:nvGrpSpPr>
+        <p:cNvPr id="1" name=""/>
+        <p:cNvGrpSpPr/>
+        <p:nvPr/>
+      </p:nvGrpSpPr>
+      <p:grpSpPr>
+        <a:xfrm>
+          <a:off x="0" y="0"/>
+          <a:ext cx="0" cy="0"/>
+          <a:chOff x="0" y="0"/>
+          <a:chExt cx="0" cy="0"/>
+        </a:xfrm>
+      </p:grpSpPr>
+      <p:sp>
+        <p:nvSpPr>
+          <p:cNvPr id="10" name="Slide Number Placeholder 5"/>
+          <p:cNvSpPr>
+            <a:spLocks noGrp="1"/>
+          </p:cNvSpPr>
+          <p:nvPr>
+            <p:ph type="sldNum" sz="quarter" idx="4294967295"/>
+          </p:nvPr>
+        </p:nvSpPr>
+        <p:spPr>
+          <a:xfrm>
+            <a:off x="4503840" y="4845863"/>
+            <a:ext cx="136319" cy="252377"/>
+          </a:xfrm>
+          <a:prstGeom prst="rect">
+            <a:avLst/>
+          </a:prstGeom>
+        </p:spPr>
+        <p:txBody>
+          <a:bodyPr/>
+          <a:lstStyle/>
+          <a:p>
+            <a:fld id="{365C6E81-70A9-4564-82B9-6D5B3D5BE91A}" type="slidenum">
+              <a:rPr lang="en-US" sz="1400" smtClean="0">
+                <a:solidFill>
+                  <a:prstClr val="white"/>
+                </a:solidFill>
+              </a:rPr>
+              <a:pPr/>
+              <a:t>3</a:t>
+            </a:fld>
+            <a:endParaRPr lang="en-US" sz="1400" dirty="0">
+              <a:solidFill>
+                <a:prstClr val="white"/>
+              </a:solidFill>
+            </a:endParaRPr>
+          </a:p>
+        </p:txBody>
+      </p:sp>
+      <p:sp>
+        <p:nvSpPr>
+          <p:cNvPr id="11" name="Title 1"/>
+          <p:cNvSpPr txBox="1">
+            <a:spLocks/>
+          </p:cNvSpPr>
+          <p:nvPr/>
+        </p:nvSpPr>
+        <p:spPr>
+          <a:xfrm>
+            <a:off x="381000" y="99290"/>
+            <a:ext cx="8229600" cy="308372"/>
+          </a:xfrm>
+          <a:prstGeom prst="rect">
+            <a:avLst/>
+          </a:prstGeom>
+          <a:noFill/>
+          <a:ln>
+            <a:noFill/>
+          </a:ln>
+          <a:extLst>
+            <a:ext uri="{909E8E84-426E-40DD-AFC4-6F175D3DCCD1}">
+              <a14:hiddenFill xmlns:a14="http://schemas.microsoft.com/office/drawing/2010/main">
+                <a:solidFill>
+                  <a:srgbClr val="FFFFFF"/>
+                </a:solidFill>
+              </a14:hiddenFill>
+            </a:ext>
+            <a:ext uri="{91240B29-F687-4F45-9708-019B960494DF}">
+              <a14:hiddenLine xmlns:a14="http://schemas.microsoft.com/office/drawing/2010/main" w="9525">
+                <a:solidFill>
+                  <a:srgbClr val="000000"/>
+                </a:solidFill>
+                <a:miter lim="800000"/>
+                <a:headEnd/>
+                <a:tailEnd/>
+              </a14:hiddenLine>
+            </a:ext>
+          </a:extLst>
+        </p:spPr>
+        <p:txBody>
+          <a:bodyPr vert="horz" wrap="square" lIns="91440" tIns="45720" rIns="91440" bIns="45720" numCol="1" anchor="t" anchorCtr="0" compatLnSpc="1">
+            <a:prstTxWarp prst="textNoShape">
+              <a:avLst/>
+            </a:prstTxWarp>
+          </a:bodyPr>
+          <a:lstStyle>
+            <a:defPPr>
+              <a:defRPr lang="en-US"/>
+            </a:defPPr>
+            <a:lvl1pPr marL="0" indent="0" eaLnBrk="0" hangingPunct="0">
+              <a:spcBef>
+                <a:spcPct val="20000"/>
+              </a:spcBef>
+              <a:buFont typeface="Arial" charset="0"/>
+              <a:buNone/>
+              <a:defRPr sz="2800" b="1">
+                <a:solidFill>
+                  <a:schemeClr val="tx2"/>
+                </a:solidFill>
+                <a:latin typeface="Calibri" pitchFamily="34" charset="0"/>
+                <a:cs typeface="+mn-cs"/>
+              </a:defRPr>
+            </a:lvl1pPr>
+            <a:lvl2pPr lvl="1" indent="0" eaLnBrk="0" hangingPunct="0">
+              <a:spcBef>
+                <a:spcPct val="20000"/>
+              </a:spcBef>
+              <a:buFont typeface="Arial" charset="0"/>
+              <a:buNone/>
+              <a:defRPr sz="2400">
+                <a:solidFill>
+                  <a:schemeClr val="tx2"/>
+                </a:solidFill>
+                <a:latin typeface="+mn-lt"/>
+                <a:cs typeface="+mn-cs"/>
+              </a:defRPr>
+            </a:lvl2pPr>
+            <a:lvl3pPr marL="1143000" indent="-228600" eaLnBrk="0" hangingPunct="0">
+              <a:spcBef>
+                <a:spcPct val="20000"/>
+              </a:spcBef>
+              <a:buFont typeface="Arial" charset="0"/>
+              <a:buChar char="•"/>
+              <a:defRPr sz="2000">
+                <a:solidFill>
+                  <a:schemeClr val="tx2"/>
+                </a:solidFill>
+                <a:latin typeface="+mn-lt"/>
+                <a:cs typeface="+mn-cs"/>
+              </a:defRPr>
+            </a:lvl3pPr>
+            <a:lvl4pPr marL="1600200" indent="-228600" eaLnBrk="0" hangingPunct="0">
+              <a:spcBef>
+                <a:spcPct val="20000"/>
+              </a:spcBef>
+              <a:buFont typeface="Arial" charset="0"/>
+              <a:buChar char="•"/>
+              <a:defRPr>
+                <a:solidFill>
+                  <a:schemeClr val="tx2"/>
+                </a:solidFill>
+                <a:latin typeface="+mn-lt"/>
+                <a:cs typeface="+mn-cs"/>
+              </a:defRPr>
+            </a:lvl4pPr>
+            <a:lvl5pPr marL="2057400" indent="-228600" eaLnBrk="0" hangingPunct="0">
+              <a:spcBef>
+                <a:spcPct val="20000"/>
+              </a:spcBef>
+              <a:buFont typeface="Arial" charset="0"/>
+              <a:buChar char="•"/>
+              <a:defRPr>
+                <a:solidFill>
+                  <a:schemeClr val="tx2"/>
+                </a:solidFill>
+                <a:latin typeface="+mn-lt"/>
+                <a:cs typeface="+mn-cs"/>
+              </a:defRPr>
+            </a:lvl5pPr>
+            <a:lvl6pPr marL="2514600" indent="-228600">
+              <a:spcBef>
+                <a:spcPct val="20000"/>
+              </a:spcBef>
+              <a:buFont typeface="Arial" pitchFamily="34" charset="0"/>
+              <a:buChar char="•"/>
+              <a:defRPr sz="2000">
+                <a:latin typeface="+mn-lt"/>
+                <a:cs typeface="+mn-cs"/>
+              </a:defRPr>
+            </a:lvl6pPr>
+            <a:lvl7pPr marL="2971800" indent="-228600">
+              <a:spcBef>
+                <a:spcPct val="20000"/>
+              </a:spcBef>
+              <a:buFont typeface="Arial" pitchFamily="34" charset="0"/>
+              <a:buChar char="•"/>
+              <a:defRPr sz="2000">
+                <a:latin typeface="+mn-lt"/>
+                <a:cs typeface="+mn-cs"/>
+              </a:defRPr>
+            </a:lvl7pPr>
+            <a:lvl8pPr marL="3429000" indent="-228600">
+              <a:spcBef>
+                <a:spcPct val="20000"/>
+              </a:spcBef>
+              <a:buFont typeface="Arial" pitchFamily="34" charset="0"/>
+              <a:buChar char="•"/>
+              <a:defRPr sz="2000">
+                <a:latin typeface="+mn-lt"/>
+                <a:cs typeface="+mn-cs"/>
+              </a:defRPr>
+            </a:lvl8pPr>
+            <a:lvl9pPr marL="3886200" indent="-228600">
+              <a:spcBef>
+                <a:spcPct val="20000"/>
+              </a:spcBef>
+              <a:buFont typeface="Arial" pitchFamily="34" charset="0"/>
+              <a:buChar char="•"/>
+              <a:defRPr sz="2000">
+                <a:latin typeface="+mn-lt"/>
+                <a:cs typeface="+mn-cs"/>
+              </a:defRPr>
+            </a:lvl9pPr>
+          </a:lstStyle>
+          <a:p>
+            <a:pPr fontAlgn="base">
+              <a:spcAft>
+                <a:spcPct val="0"/>
+              </a:spcAft>
+            </a:pPr>
+            <a:r>
+              <a:rPr lang="en-US" sz="2000" dirty="0">
+                <a:solidFill>
+                  <a:srgbClr val="000000"/>
+                </a:solidFill>
+              </a:rPr>
+              <a:t>Samir Prakash – Technology Architect (US)</a:t>
+            </a:r>
+          </a:p>
+        </p:txBody>
+      </p:sp>
+      <p:sp>
+        <p:nvSpPr>
+          <p:cNvPr id="7" name="Content Placeholder 2"/>
+          <p:cNvSpPr txBox="1">
+            <a:spLocks/>
+          </p:cNvSpPr>
+          <p:nvPr/>
+        </p:nvSpPr>
+        <p:spPr>
+          <a:xfrm>
+            <a:off x="381000" y="476013"/>
+            <a:ext cx="3962400" cy="4233147"/>
+          </a:xfrm>
+          <a:prstGeom prst="rect">
+            <a:avLst/>
+          </a:prstGeom>
+          <a:noFill/>
+          <a:ln w="9525">
+            <a:solidFill>
+              <a:schemeClr val="tx1"/>
+            </a:solidFill>
+            <a:miter lim="800000"/>
+            <a:headEnd/>
+            <a:tailEnd/>
+          </a:ln>
+        </p:spPr>
+        <p:txBody>
+          <a:bodyPr>
+            <a:noAutofit/>
+          </a:bodyPr>
+          <a:lstStyle>
+            <a:defPPr>
+              <a:defRPr lang="en-US"/>
+            </a:defPPr>
+            <a:lvl1pPr>
+              <a:lnSpc>
+                <a:spcPct val="95000"/>
+              </a:lnSpc>
+              <a:defRPr sz="1200" b="1">
+                <a:solidFill>
+                  <a:schemeClr val="tx1">
+                    <a:lumMod val="75000"/>
+                  </a:schemeClr>
+                </a:solidFill>
+                <a:latin typeface="Arial" charset="0"/>
+                <a:ea typeface="ＭＳ Ｐゴシック" charset="-128"/>
+              </a:defRPr>
+            </a:lvl1pPr>
+          </a:lstStyle>
+          <a:p>
             <a:pPr fontAlgn="base">
               <a:lnSpc>
                 <a:spcPct val="120000"/>
@@ -9738,7 +10099,7 @@
               </a:buClr>
             </a:pPr>
             <a:r>
-              <a:rPr lang="en-US" dirty="0" smtClean="0">
+              <a:rPr lang="en-US" dirty="0">
                 <a:solidFill>
                   <a:schemeClr val="tx1"/>
                 </a:solidFill>
@@ -9776,64 +10137,56 @@
           <a:p>
             <a:pPr eaLnBrk="0" hangingPunct="0"/>
             <a:r>
-              <a:rPr lang="en-US" sz="1050" dirty="0" smtClean="0">
+              <a:rPr lang="en-US" sz="1050" dirty="0">
                 <a:solidFill>
                   <a:schemeClr val="tx1"/>
                 </a:solidFill>
                 <a:latin typeface="Cambria" pitchFamily="18" charset="0"/>
                 <a:ea typeface="+mn-ea"/>
               </a:rPr>
-              <a:t>Telematics REST Services</a:t>
-            </a:r>
-            <a:endParaRPr lang="en-US" sz="1050" dirty="0">
-              <a:solidFill>
-                <a:schemeClr val="tx1"/>
-              </a:solidFill>
-              <a:latin typeface="Cambria" pitchFamily="18" charset="0"/>
-              <a:ea typeface="+mn-ea"/>
-            </a:endParaRPr>
+              <a:t>Toyota One Customer Portal</a:t>
+            </a:r>
           </a:p>
           <a:p>
             <a:pPr eaLnBrk="0" hangingPunct="0"/>
             <a:r>
-              <a:rPr lang="en-US" sz="1000" b="0" dirty="0" smtClean="0">
+              <a:rPr lang="en-US" sz="1000" b="0" dirty="0">
                 <a:solidFill>
                   <a:schemeClr val="tx1"/>
                 </a:solidFill>
                 <a:latin typeface="Cambria" pitchFamily="18" charset="0"/>
                 <a:ea typeface="+mn-ea"/>
               </a:rPr>
-              <a:t>Product </a:t>
-            </a:r>
-            <a:r>
-              <a:rPr lang="en-US" sz="1000" b="0" dirty="0">
+              <a:t>Product Development : </a:t>
+            </a:r>
+          </a:p>
+          <a:p>
+            <a:pPr eaLnBrk="0" hangingPunct="0"/>
+            <a:r>
+              <a:rPr lang="en-US" sz="1000" i="1" dirty="0">
                 <a:solidFill>
                   <a:schemeClr val="tx1"/>
                 </a:solidFill>
                 <a:latin typeface="Cambria" pitchFamily="18" charset="0"/>
                 <a:ea typeface="+mn-ea"/>
               </a:rPr>
-              <a:t>Development : </a:t>
-            </a:r>
-            <a:endParaRPr lang="en-US" sz="1000" b="0" dirty="0" smtClean="0">
-              <a:solidFill>
-                <a:schemeClr val="tx1"/>
-              </a:solidFill>
-              <a:latin typeface="Cambria" pitchFamily="18" charset="0"/>
-              <a:ea typeface="+mn-ea"/>
-            </a:endParaRPr>
-          </a:p>
-          <a:p>
-            <a:pPr eaLnBrk="0" hangingPunct="0"/>
-            <a:r>
-              <a:rPr lang="en-US" sz="1000" b="0" dirty="0" smtClean="0">
+              <a:t>(TME, Brussels – Lead Architect/Developer)</a:t>
+            </a:r>
+          </a:p>
+          <a:p>
+            <a:pPr marL="171450" indent="-171450" eaLnBrk="0" hangingPunct="0">
+              <a:buFont typeface="Arial" panose="020B0604020202020204" pitchFamily="34" charset="0"/>
+              <a:buChar char="•"/>
+            </a:pPr>
+            <a:r>
+              <a:rPr lang="en-US" sz="1000" b="0" dirty="0">
                 <a:solidFill>
                   <a:schemeClr val="tx1"/>
                 </a:solidFill>
                 <a:latin typeface="Cambria" pitchFamily="18" charset="0"/>
                 <a:ea typeface="+mn-ea"/>
               </a:rPr>
-              <a:t>(</a:t>
+              <a:t>Pan-European website for customer facing services: </a:t>
             </a:r>
             <a:r>
               <a:rPr lang="en-US" sz="1000" b="0" dirty="0">
@@ -9842,38 +10195,9 @@
                 </a:solidFill>
                 <a:latin typeface="Cambria" pitchFamily="18" charset="0"/>
                 <a:ea typeface="+mn-ea"/>
-              </a:rPr>
-              <a:t>TME, </a:t>
-            </a:r>
-            <a:r>
-              <a:rPr lang="en-US" sz="1000" b="0" dirty="0" smtClean="0">
-                <a:solidFill>
-                  <a:schemeClr val="tx1"/>
-                </a:solidFill>
-                <a:latin typeface="Cambria" pitchFamily="18" charset="0"/>
-                <a:ea typeface="+mn-ea"/>
-              </a:rPr>
-              <a:t>Brussels </a:t>
-            </a:r>
-            <a:r>
-              <a:rPr lang="en-US" sz="1000" b="0" dirty="0">
-                <a:solidFill>
-                  <a:schemeClr val="tx1"/>
-                </a:solidFill>
-                <a:latin typeface="Cambria" pitchFamily="18" charset="0"/>
-                <a:ea typeface="+mn-ea"/>
-              </a:rPr>
-              <a:t>– </a:t>
-            </a:r>
-            <a:r>
-              <a:rPr lang="en-US" sz="1000" b="0" dirty="0" smtClean="0">
-                <a:solidFill>
-                  <a:schemeClr val="tx1"/>
-                </a:solidFill>
-                <a:latin typeface="Cambria" pitchFamily="18" charset="0"/>
-                <a:ea typeface="+mn-ea"/>
-              </a:rPr>
-              <a:t>Analyst/Developer)</a:t>
+                <a:hlinkClick r:id="rId3"/>
+              </a:rPr>
+              <a:t>www.toyota.co.uk</a:t>
             </a:r>
             <a:endParaRPr lang="en-US" sz="1000" b="0" dirty="0">
               <a:solidFill>
@@ -9889,14 +10213,14 @@
               <a:buChar char="•"/>
             </a:pPr>
             <a:r>
-              <a:rPr lang="en-US" sz="1000" b="0" dirty="0" smtClean="0">
+              <a:rPr lang="en-US" sz="1000" b="0" dirty="0">
                 <a:solidFill>
                   <a:schemeClr val="tx1"/>
                 </a:solidFill>
                 <a:latin typeface="Cambria" pitchFamily="18" charset="0"/>
                 <a:ea typeface="+mn-ea"/>
               </a:rPr>
-              <a:t>JAVA Spring/Hibernate based REST services for providing In-Car services on infotainment devices for Toyota and Lexus vehicles</a:t>
+              <a:t>Live website and web apps for 28 countries over 46 languages for Toyota/Lexus using latest open source client/server technologies like Backbone/React/Node/Express/Angular/Spring/Hibernate</a:t>
             </a:r>
           </a:p>
           <a:p>
@@ -9905,14 +10229,14 @@
               <a:buChar char="•"/>
             </a:pPr>
             <a:r>
-              <a:rPr lang="en-US" sz="1000" b="0" dirty="0" smtClean="0">
+              <a:rPr lang="en-US" sz="1000" b="0" dirty="0">
                 <a:solidFill>
                   <a:schemeClr val="tx1"/>
                 </a:solidFill>
                 <a:latin typeface="Cambria" pitchFamily="18" charset="0"/>
                 <a:ea typeface="+mn-ea"/>
               </a:rPr>
-              <a:t>Collaboration with device manufactures such as Harman and AW for integration with In-Car infotainment systems</a:t>
+              <a:t>Integration with In-Car navigation devices using Telematics services</a:t>
             </a:r>
           </a:p>
           <a:p>
@@ -9921,14 +10245,14 @@
               <a:buChar char="•"/>
             </a:pPr>
             <a:r>
-              <a:rPr lang="en-US" sz="1000" b="0" dirty="0" smtClean="0">
+              <a:rPr lang="en-US" sz="1000" b="0" dirty="0">
                 <a:solidFill>
                   <a:schemeClr val="tx1"/>
                 </a:solidFill>
                 <a:latin typeface="Cambria" pitchFamily="18" charset="0"/>
                 <a:ea typeface="+mn-ea"/>
               </a:rPr>
-              <a:t>Collaboration with service providers such a Google and TomTom to provide real time data feed on route mapping and navigation</a:t>
+              <a:t>Cloud based deployment using AWS and Heroku</a:t>
             </a:r>
           </a:p>
           <a:p>
@@ -9937,14 +10261,14 @@
               <a:buChar char="•"/>
             </a:pPr>
             <a:r>
-              <a:rPr lang="en-US" sz="1000" b="0" dirty="0" smtClean="0">
+              <a:rPr lang="en-US" sz="1000" b="0" dirty="0">
                 <a:solidFill>
                   <a:schemeClr val="tx1"/>
                 </a:solidFill>
                 <a:latin typeface="Cambria" pitchFamily="18" charset="0"/>
                 <a:ea typeface="+mn-ea"/>
               </a:rPr>
-              <a:t>Collaboration with Infosys developed copyrighted FLYPP product to provide app store capabilities on infotainment systems</a:t>
+              <a:t>Continuous integration and deployment process for faster roll-outs</a:t>
             </a:r>
           </a:p>
           <a:p>
@@ -9953,14 +10277,14 @@
               <a:buChar char="•"/>
             </a:pPr>
             <a:r>
-              <a:rPr lang="en-US" sz="1000" b="0" dirty="0" smtClean="0">
+              <a:rPr lang="en-US" sz="1000" b="0" dirty="0">
                 <a:solidFill>
                   <a:schemeClr val="tx1"/>
                 </a:solidFill>
                 <a:latin typeface="Cambria" pitchFamily="18" charset="0"/>
                 <a:ea typeface="+mn-ea"/>
               </a:rPr>
-              <a:t>Single Sign On integration for providing a smooth user experience for vehicle owners</a:t>
+              <a:t>On shore experience of 4 years at Brussels including requirement elicitation, analysis, design and development, testing, delivery and production support. </a:t>
             </a:r>
           </a:p>
           <a:p>
@@ -9969,14 +10293,14 @@
               <a:buChar char="•"/>
             </a:pPr>
             <a:r>
-              <a:rPr lang="en-US" sz="1000" b="0" dirty="0" smtClean="0">
+              <a:rPr lang="en-US" sz="1000" b="0" dirty="0">
                 <a:solidFill>
                   <a:schemeClr val="tx1"/>
                 </a:solidFill>
                 <a:latin typeface="Cambria" pitchFamily="18" charset="0"/>
                 <a:ea typeface="+mn-ea"/>
               </a:rPr>
-              <a:t>Integration with Bluetooth services and mobile internet to provide real time purchase, download and usage of apps on infotainment systems.</a:t>
+              <a:t>Project coordination and onsite coordination for off shore development team (14 members and growing) from TME HO, Brussels, Belgium.</a:t>
             </a:r>
           </a:p>
           <a:p>
@@ -9985,14 +10309,14 @@
               <a:buChar char="•"/>
             </a:pPr>
             <a:r>
-              <a:rPr lang="en-US" sz="1000" b="0" dirty="0" smtClean="0">
+              <a:rPr lang="en-US" sz="1000" b="0" dirty="0">
                 <a:solidFill>
                   <a:schemeClr val="tx1"/>
                 </a:solidFill>
                 <a:latin typeface="Cambria" pitchFamily="18" charset="0"/>
                 <a:ea typeface="+mn-ea"/>
               </a:rPr>
-              <a:t>Monitoring the location, movements, status and behavior of a single owner vehicle or fleet of vehicles to provide real time vehicle tracking</a:t>
+              <a:t>F2F Client handling at Brussels for the last 4 years </a:t>
             </a:r>
           </a:p>
           <a:p>
@@ -10001,14 +10325,14 @@
               <a:buChar char="•"/>
             </a:pPr>
             <a:r>
-              <a:rPr lang="en-US" sz="1000" b="0" dirty="0" smtClean="0">
+              <a:rPr lang="en-US" sz="1000" b="0" dirty="0">
                 <a:solidFill>
                   <a:schemeClr val="tx1"/>
                 </a:solidFill>
                 <a:latin typeface="Cambria" pitchFamily="18" charset="0"/>
                 <a:ea typeface="+mn-ea"/>
               </a:rPr>
-              <a:t>Infrastructure to update a centralized pan-European vehicle database for Toyota and Lexus in order to facilitate one point checkpoint for all consumer related services</a:t>
+              <a:t>Online service booking for vehicle owners at the tip of their fingers</a:t>
             </a:r>
           </a:p>
           <a:p>
@@ -10017,22 +10341,15 @@
               <a:buChar char="•"/>
             </a:pPr>
             <a:r>
-              <a:rPr lang="en-US" sz="1000" b="0" dirty="0" smtClean="0">
+              <a:rPr lang="en-US" sz="1000" b="0" dirty="0">
                 <a:solidFill>
                   <a:schemeClr val="tx1"/>
                 </a:solidFill>
                 <a:latin typeface="Cambria" pitchFamily="18" charset="0"/>
                 <a:ea typeface="+mn-ea"/>
               </a:rPr>
-              <a:t>Distributed application architecture to support in-house and cloud based services</a:t>
-            </a:r>
-            <a:endParaRPr lang="en-US" sz="1000" b="0" dirty="0">
-              <a:solidFill>
-                <a:schemeClr val="tx1"/>
-              </a:solidFill>
-              <a:latin typeface="Cambria" pitchFamily="18" charset="0"/>
-              <a:ea typeface="+mn-ea"/>
-            </a:endParaRPr>
+              <a:t>Facilities to select and book appointments with Pan-European dealers to provide hassle free services to vehicle owners</a:t>
+            </a:r>
           </a:p>
           <a:p>
             <a:pPr marL="171450" indent="-171450" algn="just" fontAlgn="base">
@@ -10058,6 +10375,313 @@
           </a:p>
         </p:txBody>
       </p:sp>
+      <p:sp>
+        <p:nvSpPr>
+          <p:cNvPr id="9" name="Content Placeholder 2"/>
+          <p:cNvSpPr txBox="1">
+            <a:spLocks/>
+          </p:cNvSpPr>
+          <p:nvPr/>
+        </p:nvSpPr>
+        <p:spPr>
+          <a:xfrm>
+            <a:off x="4495800" y="476012"/>
+            <a:ext cx="3962400" cy="4233147"/>
+          </a:xfrm>
+          <a:prstGeom prst="rect">
+            <a:avLst/>
+          </a:prstGeom>
+          <a:noFill/>
+          <a:ln w="9525">
+            <a:solidFill>
+              <a:schemeClr val="tx1"/>
+            </a:solidFill>
+            <a:miter lim="800000"/>
+            <a:headEnd/>
+            <a:tailEnd/>
+          </a:ln>
+        </p:spPr>
+        <p:txBody>
+          <a:bodyPr>
+            <a:noAutofit/>
+          </a:bodyPr>
+          <a:lstStyle>
+            <a:defPPr>
+              <a:defRPr lang="en-US"/>
+            </a:defPPr>
+            <a:lvl1pPr>
+              <a:lnSpc>
+                <a:spcPct val="95000"/>
+              </a:lnSpc>
+              <a:defRPr sz="1200" b="1">
+                <a:solidFill>
+                  <a:schemeClr val="tx1">
+                    <a:lumMod val="75000"/>
+                  </a:schemeClr>
+                </a:solidFill>
+                <a:latin typeface="Arial" charset="0"/>
+                <a:ea typeface="ＭＳ Ｐゴシック" charset="-128"/>
+              </a:defRPr>
+            </a:lvl1pPr>
+          </a:lstStyle>
+          <a:p>
+            <a:pPr fontAlgn="base">
+              <a:lnSpc>
+                <a:spcPct val="120000"/>
+              </a:lnSpc>
+              <a:spcBef>
+                <a:spcPct val="0"/>
+              </a:spcBef>
+              <a:spcAft>
+                <a:spcPct val="0"/>
+              </a:spcAft>
+              <a:buClr>
+                <a:srgbClr val="000000"/>
+              </a:buClr>
+            </a:pPr>
+            <a:r>
+              <a:rPr lang="en-US" dirty="0">
+                <a:solidFill>
+                  <a:schemeClr val="tx1"/>
+                </a:solidFill>
+                <a:latin typeface="+mn-lt"/>
+                <a:ea typeface="Segoe UI" panose="020B0502040204020203" pitchFamily="34" charset="0"/>
+                <a:cs typeface="Segoe UI" panose="020B0502040204020203" pitchFamily="34" charset="0"/>
+              </a:rPr>
+              <a:t>Project Summary:</a:t>
+            </a:r>
+          </a:p>
+          <a:p>
+            <a:pPr fontAlgn="base">
+              <a:lnSpc>
+                <a:spcPct val="120000"/>
+              </a:lnSpc>
+              <a:spcBef>
+                <a:spcPct val="0"/>
+              </a:spcBef>
+              <a:spcAft>
+                <a:spcPct val="0"/>
+              </a:spcAft>
+              <a:buClr>
+                <a:srgbClr val="000000"/>
+              </a:buClr>
+            </a:pPr>
+            <a:endParaRPr lang="en-US" sz="1000" dirty="0">
+              <a:solidFill>
+                <a:schemeClr val="tx1"/>
+              </a:solidFill>
+              <a:latin typeface="+mn-lt"/>
+              <a:ea typeface="Segoe UI" panose="020B0502040204020203" pitchFamily="34" charset="0"/>
+              <a:cs typeface="Segoe UI" panose="020B0502040204020203" pitchFamily="34" charset="0"/>
+            </a:endParaRPr>
+          </a:p>
+          <a:p>
+            <a:pPr eaLnBrk="0" hangingPunct="0"/>
+            <a:r>
+              <a:rPr lang="en-US" sz="1050" dirty="0">
+                <a:solidFill>
+                  <a:schemeClr val="tx1"/>
+                </a:solidFill>
+                <a:latin typeface="Cambria" pitchFamily="18" charset="0"/>
+                <a:ea typeface="+mn-ea"/>
+              </a:rPr>
+              <a:t>Telematics REST Services</a:t>
+            </a:r>
+          </a:p>
+          <a:p>
+            <a:pPr eaLnBrk="0" hangingPunct="0"/>
+            <a:r>
+              <a:rPr lang="en-US" sz="1000" b="0" dirty="0">
+                <a:solidFill>
+                  <a:schemeClr val="tx1"/>
+                </a:solidFill>
+                <a:latin typeface="Cambria" pitchFamily="18" charset="0"/>
+                <a:ea typeface="+mn-ea"/>
+              </a:rPr>
+              <a:t>Product Development : </a:t>
+            </a:r>
+          </a:p>
+          <a:p>
+            <a:pPr eaLnBrk="0" hangingPunct="0"/>
+            <a:r>
+              <a:rPr lang="en-US" sz="1000" i="1" dirty="0">
+                <a:solidFill>
+                  <a:schemeClr val="tx1"/>
+                </a:solidFill>
+                <a:latin typeface="Cambria" pitchFamily="18" charset="0"/>
+                <a:ea typeface="+mn-ea"/>
+              </a:rPr>
+              <a:t>(TME, Brussels – Analyst/Developer)</a:t>
+            </a:r>
+          </a:p>
+          <a:p>
+            <a:pPr marL="171450" indent="-171450" eaLnBrk="0" hangingPunct="0">
+              <a:buFont typeface="Arial" panose="020B0604020202020204" pitchFamily="34" charset="0"/>
+              <a:buChar char="•"/>
+            </a:pPr>
+            <a:r>
+              <a:rPr lang="en-US" sz="1000" b="0" dirty="0">
+                <a:solidFill>
+                  <a:schemeClr val="tx1"/>
+                </a:solidFill>
+                <a:latin typeface="Cambria" pitchFamily="18" charset="0"/>
+                <a:ea typeface="+mn-ea"/>
+              </a:rPr>
+              <a:t>JAVA Spring/Hibernate based REST services for providing In-Car services on infotainment devices for Toyota and Lexus vehicles</a:t>
+            </a:r>
+          </a:p>
+          <a:p>
+            <a:pPr marL="171450" indent="-171450" eaLnBrk="0" hangingPunct="0">
+              <a:buFont typeface="Arial" panose="020B0604020202020204" pitchFamily="34" charset="0"/>
+              <a:buChar char="•"/>
+            </a:pPr>
+            <a:r>
+              <a:rPr lang="en-US" sz="1000" b="0" dirty="0">
+                <a:solidFill>
+                  <a:schemeClr val="tx1"/>
+                </a:solidFill>
+                <a:latin typeface="Cambria" pitchFamily="18" charset="0"/>
+                <a:ea typeface="+mn-ea"/>
+              </a:rPr>
+              <a:t>Collaboration with device manufactures such as Harman and AW for integration with In-Car infotainment systems</a:t>
+            </a:r>
+          </a:p>
+          <a:p>
+            <a:pPr marL="171450" indent="-171450" eaLnBrk="0" hangingPunct="0">
+              <a:buFont typeface="Arial" panose="020B0604020202020204" pitchFamily="34" charset="0"/>
+              <a:buChar char="•"/>
+            </a:pPr>
+            <a:r>
+              <a:rPr lang="en-US" sz="1000" b="0" dirty="0">
+                <a:solidFill>
+                  <a:schemeClr val="tx1"/>
+                </a:solidFill>
+                <a:latin typeface="Cambria" pitchFamily="18" charset="0"/>
+                <a:ea typeface="+mn-ea"/>
+              </a:rPr>
+              <a:t>Collaboration with service providers such a Google and TomTom to provide real time data feed on route mapping and navigation</a:t>
+            </a:r>
+          </a:p>
+          <a:p>
+            <a:pPr marL="171450" indent="-171450" eaLnBrk="0" hangingPunct="0">
+              <a:buFont typeface="Arial" panose="020B0604020202020204" pitchFamily="34" charset="0"/>
+              <a:buChar char="•"/>
+            </a:pPr>
+            <a:r>
+              <a:rPr lang="en-US" sz="1000" b="0" dirty="0">
+                <a:solidFill>
+                  <a:schemeClr val="tx1"/>
+                </a:solidFill>
+                <a:latin typeface="Cambria" pitchFamily="18" charset="0"/>
+                <a:ea typeface="+mn-ea"/>
+              </a:rPr>
+              <a:t>Collaboration with Infosys developed copyrighted FLYPP product to provide app store capabilities on infotainment systems</a:t>
+            </a:r>
+          </a:p>
+          <a:p>
+            <a:pPr marL="171450" indent="-171450" eaLnBrk="0" hangingPunct="0">
+              <a:buFont typeface="Arial" panose="020B0604020202020204" pitchFamily="34" charset="0"/>
+              <a:buChar char="•"/>
+            </a:pPr>
+            <a:r>
+              <a:rPr lang="en-US" sz="1000" b="0" dirty="0">
+                <a:solidFill>
+                  <a:schemeClr val="tx1"/>
+                </a:solidFill>
+                <a:latin typeface="Cambria" pitchFamily="18" charset="0"/>
+                <a:ea typeface="+mn-ea"/>
+              </a:rPr>
+              <a:t>Single Sign On integration for providing a smooth user experience for vehicle owners</a:t>
+            </a:r>
+          </a:p>
+          <a:p>
+            <a:pPr marL="171450" indent="-171450" eaLnBrk="0" hangingPunct="0">
+              <a:buFont typeface="Arial" panose="020B0604020202020204" pitchFamily="34" charset="0"/>
+              <a:buChar char="•"/>
+            </a:pPr>
+            <a:r>
+              <a:rPr lang="en-US" sz="1000" b="0" dirty="0">
+                <a:solidFill>
+                  <a:schemeClr val="tx1"/>
+                </a:solidFill>
+                <a:latin typeface="Cambria" pitchFamily="18" charset="0"/>
+                <a:ea typeface="+mn-ea"/>
+              </a:rPr>
+              <a:t>Integration with Bluetooth services and mobile internet to provide real time purchase, download and usage of apps on infotainment systems.</a:t>
+            </a:r>
+          </a:p>
+          <a:p>
+            <a:pPr marL="171450" indent="-171450" eaLnBrk="0" hangingPunct="0">
+              <a:buFont typeface="Arial" panose="020B0604020202020204" pitchFamily="34" charset="0"/>
+              <a:buChar char="•"/>
+            </a:pPr>
+            <a:r>
+              <a:rPr lang="en-US" sz="1000" b="0" dirty="0">
+                <a:solidFill>
+                  <a:schemeClr val="tx1"/>
+                </a:solidFill>
+                <a:latin typeface="Cambria" pitchFamily="18" charset="0"/>
+                <a:ea typeface="+mn-ea"/>
+              </a:rPr>
+              <a:t>Monitoring the location, movements, status and behavior of a single owner vehicle or fleet of vehicles to provide real time vehicle tracking</a:t>
+            </a:r>
+          </a:p>
+          <a:p>
+            <a:pPr marL="171450" indent="-171450" eaLnBrk="0" hangingPunct="0">
+              <a:buFont typeface="Arial" panose="020B0604020202020204" pitchFamily="34" charset="0"/>
+              <a:buChar char="•"/>
+            </a:pPr>
+            <a:r>
+              <a:rPr lang="en-US" sz="1000" b="0" dirty="0">
+                <a:solidFill>
+                  <a:schemeClr val="tx1"/>
+                </a:solidFill>
+                <a:latin typeface="Cambria" pitchFamily="18" charset="0"/>
+                <a:ea typeface="+mn-ea"/>
+              </a:rPr>
+              <a:t>Infrastructure to update a centralized pan-European vehicle database for Toyota and Lexus in order to facilitate one point checkpoint for all consumer related services</a:t>
+            </a:r>
+          </a:p>
+          <a:p>
+            <a:pPr marL="171450" indent="-171450" eaLnBrk="0" hangingPunct="0">
+              <a:buFont typeface="Arial" panose="020B0604020202020204" pitchFamily="34" charset="0"/>
+              <a:buChar char="•"/>
+            </a:pPr>
+            <a:r>
+              <a:rPr lang="en-US" sz="1000" b="0" dirty="0">
+                <a:solidFill>
+                  <a:schemeClr val="tx1"/>
+                </a:solidFill>
+                <a:latin typeface="Cambria" pitchFamily="18" charset="0"/>
+                <a:ea typeface="+mn-ea"/>
+              </a:rPr>
+              <a:t>Distributed application architecture to support in-house and cloud based services</a:t>
+            </a:r>
+          </a:p>
+          <a:p>
+            <a:pPr marL="171450" indent="-171450" algn="just" fontAlgn="base">
+              <a:lnSpc>
+                <a:spcPct val="100000"/>
+              </a:lnSpc>
+              <a:spcBef>
+                <a:spcPct val="0"/>
+              </a:spcBef>
+              <a:spcAft>
+                <a:spcPct val="0"/>
+              </a:spcAft>
+              <a:buFont typeface="Arial" pitchFamily="34" charset="0"/>
+              <a:buChar char="•"/>
+            </a:pPr>
+            <a:endParaRPr lang="en-US" sz="1000" b="0" dirty="0">
+              <a:solidFill>
+                <a:schemeClr val="tx1"/>
+              </a:solidFill>
+              <a:latin typeface="Cambria" pitchFamily="18" charset="0"/>
+              <a:ea typeface="+mn-ea"/>
+            </a:endParaRPr>
+          </a:p>
+        </p:txBody>
+      </p:sp>
     </p:spTree>
     <p:extLst>
       <p:ext uri="{BB962C8B-B14F-4D97-AF65-F5344CB8AC3E}">
@@ -10068,21 +10692,6 @@
   <p:clrMapOvr>
     <a:masterClrMapping/>
   </p:clrMapOvr>
-  <mc:AlternateContent xmlns:mc="http://schemas.openxmlformats.org/markup-compatibility/2006" xmlns:p14="http://schemas.microsoft.com/office/powerpoint/2010/main">
-    <mc:Choice Requires="p14">
-      <p:transition spd="slow" p14:dur="2000"/>
-    </mc:Choice>
-    <mc:Fallback xmlns="">
-      <p:transition spd="slow"/>
-    </mc:Fallback>
-  </mc:AlternateContent>
-  <p:timing>
-    <p:tnLst>
-      <p:par>
-        <p:cTn id="1" dur="indefinite" restart="never" nodeType="tmRoot"/>
-      </p:par>
-    </p:tnLst>
-  </p:timing>
 </p:sld>
 </file>
 
@@ -11213,9 +11822,12 @@
 </file>
 
 <file path=customXml/item1.xml><?xml version="1.0" encoding="utf-8"?>
-<p:properties xmlns:p="http://schemas.microsoft.com/office/2006/metadata/properties" xmlns:xsi="http://www.w3.org/2001/XMLSchema-instance">
-  <documentManagement/>
-</p:properties>
+<?mso-contentType ?>
+<FormTemplates xmlns="http://schemas.microsoft.com/sharepoint/v3/contenttype/forms">
+  <Display>DocumentLibraryForm</Display>
+  <Edit>DocumentLibraryForm</Edit>
+  <New>DocumentLibraryForm</New>
+</FormTemplates>
 </file>
 
 <file path=customXml/item2.xml><?xml version="1.0" encoding="utf-8"?>
@@ -11268,24 +11880,15 @@
 </file>
 
 <file path=customXml/item3.xml><?xml version="1.0" encoding="utf-8"?>
-<?mso-contentType ?>
-<FormTemplates xmlns="http://schemas.microsoft.com/sharepoint/v3/contenttype/forms">
-  <Display>DocumentLibraryForm</Display>
-  <Edit>DocumentLibraryForm</Edit>
-  <New>DocumentLibraryForm</New>
-</FormTemplates>
+<p:properties xmlns:p="http://schemas.microsoft.com/office/2006/metadata/properties" xmlns:xsi="http://www.w3.org/2001/XMLSchema-instance">
+  <documentManagement/>
+</p:properties>
 </file>
 
 <file path=customXml/itemProps1.xml><?xml version="1.0" encoding="utf-8"?>
-<ds:datastoreItem xmlns:ds="http://schemas.openxmlformats.org/officeDocument/2006/customXml" ds:itemID="{DFA9EBBA-B10B-4CBB-91A9-BFF56A5AC480}">
+<ds:datastoreItem xmlns:ds="http://schemas.openxmlformats.org/officeDocument/2006/customXml" ds:itemID="{7DE6E8B0-4826-4715-8779-E6C67EE66529}">
   <ds:schemaRefs>
-    <ds:schemaRef ds:uri="http://purl.org/dc/terms/"/>
-    <ds:schemaRef ds:uri="http://schemas.microsoft.com/office/2006/documentManagement/types"/>
-    <ds:schemaRef ds:uri="http://www.w3.org/XML/1998/namespace"/>
-    <ds:schemaRef ds:uri="http://schemas.openxmlformats.org/package/2006/metadata/core-properties"/>
-    <ds:schemaRef ds:uri="http://schemas.microsoft.com/office/2006/metadata/properties"/>
-    <ds:schemaRef ds:uri="http://purl.org/dc/elements/1.1/"/>
-    <ds:schemaRef ds:uri="http://purl.org/dc/dcmitype/"/>
+    <ds:schemaRef ds:uri="http://schemas.microsoft.com/sharepoint/v3/contenttype/forms"/>
   </ds:schemaRefs>
 </ds:datastoreItem>
 </file>
@@ -11306,9 +11909,15 @@
 </file>
 
 <file path=customXml/itemProps3.xml><?xml version="1.0" encoding="utf-8"?>
-<ds:datastoreItem xmlns:ds="http://schemas.openxmlformats.org/officeDocument/2006/customXml" ds:itemID="{7DE6E8B0-4826-4715-8779-E6C67EE66529}">
+<ds:datastoreItem xmlns:ds="http://schemas.openxmlformats.org/officeDocument/2006/customXml" ds:itemID="{DFA9EBBA-B10B-4CBB-91A9-BFF56A5AC480}">
   <ds:schemaRefs>
-    <ds:schemaRef ds:uri="http://schemas.microsoft.com/sharepoint/v3/contenttype/forms"/>
+    <ds:schemaRef ds:uri="http://purl.org/dc/terms/"/>
+    <ds:schemaRef ds:uri="http://schemas.microsoft.com/office/2006/documentManagement/types"/>
+    <ds:schemaRef ds:uri="http://www.w3.org/XML/1998/namespace"/>
+    <ds:schemaRef ds:uri="http://schemas.openxmlformats.org/package/2006/metadata/core-properties"/>
+    <ds:schemaRef ds:uri="http://schemas.microsoft.com/office/2006/metadata/properties"/>
+    <ds:schemaRef ds:uri="http://purl.org/dc/elements/1.1/"/>
+    <ds:schemaRef ds:uri="http://purl.org/dc/dcmitype/"/>
   </ds:schemaRefs>
 </ds:datastoreItem>
 </file>
</xml_diff>

<commit_message>
Added overall work experience
</commit_message>
<xml_diff>
--- a/Samir_Prakash.pptx
+++ b/Samir_Prakash.pptx
@@ -7,12 +7,13 @@
     <p:sldMasterId id="2147483816" r:id="rId6"/>
   </p:sldMasterIdLst>
   <p:notesMasterIdLst>
-    <p:notesMasterId r:id="rId10"/>
+    <p:notesMasterId r:id="rId11"/>
   </p:notesMasterIdLst>
   <p:sldIdLst>
     <p:sldId id="584" r:id="rId7"/>
     <p:sldId id="586" r:id="rId8"/>
     <p:sldId id="585" r:id="rId9"/>
+    <p:sldId id="587" r:id="rId10"/>
   </p:sldIdLst>
   <p:sldSz cx="9144000" cy="5143500" type="screen16x9"/>
   <p:notesSz cx="6797675" cy="9928225"/>
@@ -233,7 +234,7 @@
             <a:fld id="{26F8D926-C1B7-448A-BC5F-CA36093C4DF9}" type="datetimeFigureOut">
               <a:rPr lang="en-US" smtClean="0"/>
               <a:pPr/>
-              <a:t>9/14/18</a:t>
+              <a:t>9/17/18</a:t>
             </a:fld>
             <a:endParaRPr lang="en-US" dirty="0"/>
           </a:p>
@@ -996,6 +997,151 @@
 </p:notes>
 </file>
 
+<file path=ppt/notesSlides/notesSlide4.xml><?xml version="1.0" encoding="utf-8"?>
+<p:notes xmlns:a="http://schemas.openxmlformats.org/drawingml/2006/main" xmlns:r="http://schemas.openxmlformats.org/officeDocument/2006/relationships" xmlns:p="http://schemas.openxmlformats.org/presentationml/2006/main">
+  <p:cSld>
+    <p:spTree>
+      <p:nvGrpSpPr>
+        <p:cNvPr id="1" name=""/>
+        <p:cNvGrpSpPr/>
+        <p:nvPr/>
+      </p:nvGrpSpPr>
+      <p:grpSpPr>
+        <a:xfrm>
+          <a:off x="0" y="0"/>
+          <a:ext cx="0" cy="0"/>
+          <a:chOff x="0" y="0"/>
+          <a:chExt cx="0" cy="0"/>
+        </a:xfrm>
+      </p:grpSpPr>
+      <p:sp>
+        <p:nvSpPr>
+          <p:cNvPr id="25602" name="Rectangle 7"/>
+          <p:cNvSpPr txBox="1">
+            <a:spLocks noGrp="1" noChangeArrowheads="1"/>
+          </p:cNvSpPr>
+          <p:nvPr/>
+        </p:nvSpPr>
+        <p:spPr bwMode="auto">
+          <a:xfrm>
+            <a:off x="3852016" y="9433538"/>
+            <a:ext cx="2945659" cy="494687"/>
+          </a:xfrm>
+          <a:prstGeom prst="rect">
+            <a:avLst/>
+          </a:prstGeom>
+          <a:noFill/>
+          <a:ln w="9525">
+            <a:noFill/>
+            <a:miter lim="800000"/>
+            <a:headEnd/>
+            <a:tailEnd/>
+          </a:ln>
+        </p:spPr>
+        <p:txBody>
+          <a:bodyPr lIns="98116" tIns="49059" rIns="98116" bIns="49059" anchor="b"/>
+          <a:lstStyle/>
+          <a:p>
+            <a:pPr algn="r" defTabSz="981429" eaLnBrk="0" fontAlgn="base" hangingPunct="0">
+              <a:spcBef>
+                <a:spcPct val="25000"/>
+              </a:spcBef>
+              <a:spcAft>
+                <a:spcPct val="0"/>
+              </a:spcAft>
+              <a:buFont typeface="Arial" pitchFamily="34" charset="0"/>
+              <a:buChar char="•"/>
+            </a:pPr>
+            <a:fld id="{3B46BCA0-6E0B-4362-81F8-3BC711370199}" type="slidenum">
+              <a:rPr lang="en-US" sz="1200">
+                <a:solidFill>
+                  <a:srgbClr val="FFFFFF"/>
+                </a:solidFill>
+                <a:latin typeface="Arial" charset="0"/>
+                <a:cs typeface="Arial" charset="0"/>
+              </a:rPr>
+              <a:pPr algn="r" defTabSz="981429" eaLnBrk="0" fontAlgn="base" hangingPunct="0">
+                <a:spcBef>
+                  <a:spcPct val="25000"/>
+                </a:spcBef>
+                <a:spcAft>
+                  <a:spcPct val="0"/>
+                </a:spcAft>
+                <a:buFont typeface="Arial" pitchFamily="34" charset="0"/>
+                <a:buChar char="•"/>
+              </a:pPr>
+              <a:t>4</a:t>
+            </a:fld>
+            <a:endParaRPr lang="en-US" sz="1200" dirty="0">
+              <a:solidFill>
+                <a:srgbClr val="FFFFFF"/>
+              </a:solidFill>
+              <a:latin typeface="Arial" charset="0"/>
+              <a:cs typeface="Arial" charset="0"/>
+            </a:endParaRPr>
+          </a:p>
+        </p:txBody>
+      </p:sp>
+      <p:sp>
+        <p:nvSpPr>
+          <p:cNvPr id="25603" name="Rectangle 2"/>
+          <p:cNvSpPr>
+            <a:spLocks noGrp="1" noRot="1" noChangeAspect="1" noChangeArrowheads="1" noTextEdit="1"/>
+          </p:cNvSpPr>
+          <p:nvPr>
+            <p:ph type="sldImg"/>
+          </p:nvPr>
+        </p:nvSpPr>
+        <p:spPr>
+          <a:xfrm>
+            <a:off x="90488" y="746125"/>
+            <a:ext cx="6616700" cy="3722688"/>
+          </a:xfrm>
+          <a:ln/>
+        </p:spPr>
+      </p:sp>
+      <p:sp>
+        <p:nvSpPr>
+          <p:cNvPr id="25604" name="Rectangle 3"/>
+          <p:cNvSpPr>
+            <a:spLocks noGrp="1" noChangeArrowheads="1"/>
+          </p:cNvSpPr>
+          <p:nvPr>
+            <p:ph type="body" idx="1"/>
+          </p:nvPr>
+        </p:nvSpPr>
+        <p:spPr>
+          <a:xfrm>
+            <a:off x="679768" y="4715909"/>
+            <a:ext cx="5438140" cy="4465978"/>
+          </a:xfrm>
+          <a:noFill/>
+          <a:ln/>
+        </p:spPr>
+        <p:txBody>
+          <a:bodyPr lIns="98116" tIns="49059" rIns="98116" bIns="49059"/>
+          <a:lstStyle/>
+          <a:p>
+            <a:pPr eaLnBrk="1" hangingPunct="1"/>
+            <a:endParaRPr lang="en-GB" dirty="0">
+              <a:latin typeface="Arial" pitchFamily="34" charset="0"/>
+            </a:endParaRPr>
+          </a:p>
+        </p:txBody>
+      </p:sp>
+    </p:spTree>
+    <p:extLst>
+      <p:ext uri="{BB962C8B-B14F-4D97-AF65-F5344CB8AC3E}">
+        <p14:creationId xmlns:p14="http://schemas.microsoft.com/office/powerpoint/2010/main" val="3133848380"/>
+      </p:ext>
+    </p:extLst>
+  </p:cSld>
+  <p:clrMapOvr>
+    <a:masterClrMapping/>
+  </p:clrMapOvr>
+</p:notes>
+</file>
+
 <file path=ppt/slideLayouts/slideLayout1.xml><?xml version="1.0" encoding="utf-8"?>
 <p:sldLayout xmlns:a="http://schemas.openxmlformats.org/drawingml/2006/main" xmlns:r="http://schemas.openxmlformats.org/officeDocument/2006/relationships" xmlns:p="http://schemas.openxmlformats.org/presentationml/2006/main" type="title" preserve="1">
   <p:cSld name="Title Slide - no image">
@@ -1614,7 +1760,7 @@
                 </a:solidFill>
               </a:rPr>
               <a:pPr/>
-              <a:t>9/14/18</a:t>
+              <a:t>9/17/18</a:t>
             </a:fld>
             <a:endParaRPr lang="en-US">
               <a:solidFill>
@@ -2425,7 +2571,7 @@
                 </a:solidFill>
               </a:rPr>
               <a:pPr/>
-              <a:t>9/14/18</a:t>
+              <a:t>9/17/18</a:t>
             </a:fld>
             <a:endParaRPr lang="en-US">
               <a:solidFill>
@@ -2882,7 +3028,7 @@
                 </a:solidFill>
               </a:rPr>
               <a:pPr/>
-              <a:t>9/14/18</a:t>
+              <a:t>9/17/18</a:t>
             </a:fld>
             <a:endParaRPr lang="en-US">
               <a:solidFill>
@@ -3021,7 +3167,7 @@
                 </a:solidFill>
               </a:rPr>
               <a:pPr/>
-              <a:t>9/14/18</a:t>
+              <a:t>9/17/18</a:t>
             </a:fld>
             <a:endParaRPr lang="en-US">
               <a:solidFill>
@@ -3138,7 +3284,7 @@
                 </a:solidFill>
               </a:rPr>
               <a:pPr/>
-              <a:t>9/14/18</a:t>
+              <a:t>9/17/18</a:t>
             </a:fld>
             <a:endParaRPr lang="en-US">
               <a:solidFill>
@@ -7254,7 +7400,7 @@
                 </a:solidFill>
               </a:rPr>
               <a:pPr/>
-              <a:t>9/14/18</a:t>
+              <a:t>9/17/18</a:t>
             </a:fld>
             <a:endParaRPr lang="en-US" dirty="0">
               <a:solidFill>
@@ -9095,7 +9241,7 @@
                 <a:ea typeface="Segoe UI" panose="020B0502040204020203" pitchFamily="34" charset="0"/>
                 <a:cs typeface="Segoe UI" panose="020B0502040204020203" pitchFamily="34" charset="0"/>
               </a:rPr>
-              <a:t>Project Summary:</a:t>
+              <a:t>Current Project Summary:</a:t>
             </a:r>
           </a:p>
           <a:p>
@@ -9147,10 +9293,30 @@
               </a:rPr>
               <a:t>Product Development :  </a:t>
             </a:r>
+            <a:r>
+              <a:rPr lang="en-US" sz="1000" i="1" dirty="0">
+                <a:solidFill>
+                  <a:schemeClr val="tx1"/>
+                </a:solidFill>
+                <a:latin typeface="Cambria" pitchFamily="18" charset="0"/>
+                <a:ea typeface="+mn-ea"/>
+              </a:rPr>
+              <a:t>TCNA, Plano– DevOps Engineer</a:t>
+            </a:r>
           </a:p>
           <a:p>
             <a:pPr eaLnBrk="0" hangingPunct="0"/>
             <a:r>
+              <a:rPr lang="en-US" sz="1000" b="0" dirty="0">
+                <a:solidFill>
+                  <a:schemeClr val="tx1"/>
+                </a:solidFill>
+                <a:latin typeface="Cambria" pitchFamily="18" charset="0"/>
+                <a:ea typeface="+mn-ea"/>
+              </a:rPr>
+              <a:t>Date</a:t>
+            </a:r>
+            <a:r>
               <a:rPr lang="en-US" sz="1000" i="1" dirty="0">
                 <a:solidFill>
                   <a:schemeClr val="tx1"/>
@@ -9158,7 +9324,7 @@
                 <a:latin typeface="Cambria" pitchFamily="18" charset="0"/>
                 <a:ea typeface="+mn-ea"/>
               </a:rPr>
-              <a:t>(TCNA, Plano– DevOps Engineer)</a:t>
+              <a:t>: 02/17/2018 – Till Date</a:t>
             </a:r>
           </a:p>
           <a:p>
@@ -10150,6 +10316,16 @@
           <a:p>
             <a:pPr eaLnBrk="0" hangingPunct="0"/>
             <a:r>
+              <a:rPr lang="en-US" sz="1000" dirty="0">
+                <a:solidFill>
+                  <a:schemeClr val="tx1"/>
+                </a:solidFill>
+                <a:latin typeface="Cambria" pitchFamily="18" charset="0"/>
+                <a:ea typeface="+mn-ea"/>
+              </a:rPr>
+              <a:t>Product Development</a:t>
+            </a:r>
+            <a:r>
               <a:rPr lang="en-US" sz="1000" b="0" dirty="0">
                 <a:solidFill>
                   <a:schemeClr val="tx1"/>
@@ -10157,21 +10333,61 @@
                 <a:latin typeface="Cambria" pitchFamily="18" charset="0"/>
                 <a:ea typeface="+mn-ea"/>
               </a:rPr>
-              <a:t>Product Development : </a:t>
+              <a:t>: </a:t>
+            </a:r>
+            <a:r>
+              <a:rPr lang="en-US" sz="1000" b="0" i="1" dirty="0">
+                <a:solidFill>
+                  <a:schemeClr val="tx1"/>
+                </a:solidFill>
+                <a:latin typeface="Cambria" pitchFamily="18" charset="0"/>
+                <a:ea typeface="+mn-ea"/>
+              </a:rPr>
+              <a:t>TME, Brussels – Lead Architect/Developer</a:t>
             </a:r>
           </a:p>
           <a:p>
             <a:pPr eaLnBrk="0" hangingPunct="0"/>
             <a:r>
-              <a:rPr lang="en-US" sz="1000" i="1" dirty="0">
+              <a:rPr lang="en-US" sz="1000" dirty="0">
                 <a:solidFill>
                   <a:schemeClr val="tx1"/>
                 </a:solidFill>
                 <a:latin typeface="Cambria" pitchFamily="18" charset="0"/>
                 <a:ea typeface="+mn-ea"/>
               </a:rPr>
-              <a:t>(TME, Brussels – Lead Architect/Developer)</a:t>
-            </a:r>
+              <a:t>Date</a:t>
+            </a:r>
+            <a:r>
+              <a:rPr lang="en-US" sz="1000" b="0" dirty="0">
+                <a:solidFill>
+                  <a:schemeClr val="tx1"/>
+                </a:solidFill>
+                <a:latin typeface="Cambria" pitchFamily="18" charset="0"/>
+                <a:ea typeface="+mn-ea"/>
+              </a:rPr>
+              <a:t>: </a:t>
+            </a:r>
+            <a:r>
+              <a:rPr lang="en-US" sz="1000" b="0" i="1" dirty="0">
+                <a:solidFill>
+                  <a:schemeClr val="tx1"/>
+                </a:solidFill>
+                <a:latin typeface="Cambria" pitchFamily="18" charset="0"/>
+                <a:ea typeface="+mn-ea"/>
+              </a:rPr>
+              <a:t>April 2013 – November 2016</a:t>
+            </a:r>
+          </a:p>
+          <a:p>
+            <a:pPr eaLnBrk="0" hangingPunct="0"/>
+            <a:endParaRPr lang="en-US" sz="1000" b="0" dirty="0">
+              <a:solidFill>
+                <a:schemeClr val="tx1"/>
+              </a:solidFill>
+              <a:latin typeface="Cambria" pitchFamily="18" charset="0"/>
+              <a:ea typeface="+mn-ea"/>
+            </a:endParaRPr>
           </a:p>
           <a:p>
             <a:pPr marL="171450" indent="-171450" eaLnBrk="0" hangingPunct="0">
@@ -10491,6 +10707,16 @@
           <a:p>
             <a:pPr eaLnBrk="0" hangingPunct="0"/>
             <a:r>
+              <a:rPr lang="en-US" sz="1000" dirty="0">
+                <a:solidFill>
+                  <a:schemeClr val="tx1"/>
+                </a:solidFill>
+                <a:latin typeface="Cambria" pitchFamily="18" charset="0"/>
+                <a:ea typeface="+mn-ea"/>
+              </a:rPr>
+              <a:t>Product Development</a:t>
+            </a:r>
+            <a:r>
               <a:rPr lang="en-US" sz="1000" b="0" dirty="0">
                 <a:solidFill>
                   <a:schemeClr val="tx1"/>
@@ -10498,7 +10724,17 @@
                 <a:latin typeface="Cambria" pitchFamily="18" charset="0"/>
                 <a:ea typeface="+mn-ea"/>
               </a:rPr>
-              <a:t>Product Development : </a:t>
+              <a:t>: </a:t>
+            </a:r>
+            <a:r>
+              <a:rPr lang="en-US" sz="1000" b="0" i="1" dirty="0">
+                <a:solidFill>
+                  <a:schemeClr val="tx1"/>
+                </a:solidFill>
+                <a:latin typeface="Cambria" pitchFamily="18" charset="0"/>
+                <a:ea typeface="+mn-ea"/>
+              </a:rPr>
+              <a:t>TME, Brussels – Analyst/Developer</a:t>
             </a:r>
           </a:p>
           <a:p>
@@ -10511,8 +10747,28 @@
                 <a:latin typeface="Cambria" pitchFamily="18" charset="0"/>
                 <a:ea typeface="+mn-ea"/>
               </a:rPr>
-              <a:t>(TME, Brussels – Analyst/Developer)</a:t>
-            </a:r>
+              <a:t>Date: </a:t>
+            </a:r>
+            <a:r>
+              <a:rPr lang="en-US" sz="1000" b="0" i="1" dirty="0">
+                <a:solidFill>
+                  <a:schemeClr val="tx1"/>
+                </a:solidFill>
+                <a:latin typeface="Cambria" pitchFamily="18" charset="0"/>
+                <a:ea typeface="+mn-ea"/>
+              </a:rPr>
+              <a:t>April 2012 – January 2013</a:t>
+            </a:r>
+          </a:p>
+          <a:p>
+            <a:pPr eaLnBrk="0" hangingPunct="0"/>
+            <a:endParaRPr lang="en-US" sz="1000" i="1" dirty="0">
+              <a:solidFill>
+                <a:schemeClr val="tx1"/>
+              </a:solidFill>
+              <a:latin typeface="Cambria" pitchFamily="18" charset="0"/>
+              <a:ea typeface="+mn-ea"/>
+            </a:endParaRPr>
           </a:p>
           <a:p>
             <a:pPr marL="171450" indent="-171450" eaLnBrk="0" hangingPunct="0">
@@ -10686,6 +10942,1354 @@
     <p:extLst>
       <p:ext uri="{BB962C8B-B14F-4D97-AF65-F5344CB8AC3E}">
         <p14:creationId xmlns:p14="http://schemas.microsoft.com/office/powerpoint/2010/main" val="4054539863"/>
+      </p:ext>
+    </p:extLst>
+  </p:cSld>
+  <p:clrMapOvr>
+    <a:masterClrMapping/>
+  </p:clrMapOvr>
+</p:sld>
+</file>
+
+<file path=ppt/slides/slide4.xml><?xml version="1.0" encoding="utf-8"?>
+<p:sld xmlns:a="http://schemas.openxmlformats.org/drawingml/2006/main" xmlns:r="http://schemas.openxmlformats.org/officeDocument/2006/relationships" xmlns:p="http://schemas.openxmlformats.org/presentationml/2006/main">
+  <p:cSld>
+    <p:spTree>
+      <p:nvGrpSpPr>
+        <p:cNvPr id="1" name=""/>
+        <p:cNvGrpSpPr/>
+        <p:nvPr/>
+      </p:nvGrpSpPr>
+      <p:grpSpPr>
+        <a:xfrm>
+          <a:off x="0" y="0"/>
+          <a:ext cx="0" cy="0"/>
+          <a:chOff x="0" y="0"/>
+          <a:chExt cx="0" cy="0"/>
+        </a:xfrm>
+      </p:grpSpPr>
+      <p:sp>
+        <p:nvSpPr>
+          <p:cNvPr id="10" name="Slide Number Placeholder 5"/>
+          <p:cNvSpPr>
+            <a:spLocks noGrp="1"/>
+          </p:cNvSpPr>
+          <p:nvPr>
+            <p:ph type="sldNum" sz="quarter" idx="4294967295"/>
+          </p:nvPr>
+        </p:nvSpPr>
+        <p:spPr>
+          <a:xfrm>
+            <a:off x="4503840" y="4845863"/>
+            <a:ext cx="136319" cy="252377"/>
+          </a:xfrm>
+          <a:prstGeom prst="rect">
+            <a:avLst/>
+          </a:prstGeom>
+        </p:spPr>
+        <p:txBody>
+          <a:bodyPr/>
+          <a:lstStyle/>
+          <a:p>
+            <a:fld id="{365C6E81-70A9-4564-82B9-6D5B3D5BE91A}" type="slidenum">
+              <a:rPr lang="en-US" sz="1400" smtClean="0">
+                <a:solidFill>
+                  <a:prstClr val="white"/>
+                </a:solidFill>
+              </a:rPr>
+              <a:pPr/>
+              <a:t>4</a:t>
+            </a:fld>
+            <a:endParaRPr lang="en-US" sz="1400" dirty="0">
+              <a:solidFill>
+                <a:prstClr val="white"/>
+              </a:solidFill>
+            </a:endParaRPr>
+          </a:p>
+        </p:txBody>
+      </p:sp>
+      <p:sp>
+        <p:nvSpPr>
+          <p:cNvPr id="11" name="Title 1"/>
+          <p:cNvSpPr txBox="1">
+            <a:spLocks/>
+          </p:cNvSpPr>
+          <p:nvPr/>
+        </p:nvSpPr>
+        <p:spPr>
+          <a:xfrm>
+            <a:off x="381000" y="99290"/>
+            <a:ext cx="8229600" cy="308372"/>
+          </a:xfrm>
+          <a:prstGeom prst="rect">
+            <a:avLst/>
+          </a:prstGeom>
+          <a:noFill/>
+          <a:ln>
+            <a:noFill/>
+          </a:ln>
+          <a:extLst>
+            <a:ext uri="{909E8E84-426E-40DD-AFC4-6F175D3DCCD1}">
+              <a14:hiddenFill xmlns:a14="http://schemas.microsoft.com/office/drawing/2010/main">
+                <a:solidFill>
+                  <a:srgbClr val="FFFFFF"/>
+                </a:solidFill>
+              </a14:hiddenFill>
+            </a:ext>
+            <a:ext uri="{91240B29-F687-4F45-9708-019B960494DF}">
+              <a14:hiddenLine xmlns:a14="http://schemas.microsoft.com/office/drawing/2010/main" w="9525">
+                <a:solidFill>
+                  <a:srgbClr val="000000"/>
+                </a:solidFill>
+                <a:miter lim="800000"/>
+                <a:headEnd/>
+                <a:tailEnd/>
+              </a14:hiddenLine>
+            </a:ext>
+          </a:extLst>
+        </p:spPr>
+        <p:txBody>
+          <a:bodyPr vert="horz" wrap="square" lIns="91440" tIns="45720" rIns="91440" bIns="45720" numCol="1" anchor="t" anchorCtr="0" compatLnSpc="1">
+            <a:prstTxWarp prst="textNoShape">
+              <a:avLst/>
+            </a:prstTxWarp>
+          </a:bodyPr>
+          <a:lstStyle>
+            <a:defPPr>
+              <a:defRPr lang="en-US"/>
+            </a:defPPr>
+            <a:lvl1pPr marL="0" indent="0" eaLnBrk="0" hangingPunct="0">
+              <a:spcBef>
+                <a:spcPct val="20000"/>
+              </a:spcBef>
+              <a:buFont typeface="Arial" charset="0"/>
+              <a:buNone/>
+              <a:defRPr sz="2800" b="1">
+                <a:solidFill>
+                  <a:schemeClr val="tx2"/>
+                </a:solidFill>
+                <a:latin typeface="Calibri" pitchFamily="34" charset="0"/>
+                <a:cs typeface="+mn-cs"/>
+              </a:defRPr>
+            </a:lvl1pPr>
+            <a:lvl2pPr lvl="1" indent="0" eaLnBrk="0" hangingPunct="0">
+              <a:spcBef>
+                <a:spcPct val="20000"/>
+              </a:spcBef>
+              <a:buFont typeface="Arial" charset="0"/>
+              <a:buNone/>
+              <a:defRPr sz="2400">
+                <a:solidFill>
+                  <a:schemeClr val="tx2"/>
+                </a:solidFill>
+                <a:latin typeface="+mn-lt"/>
+                <a:cs typeface="+mn-cs"/>
+              </a:defRPr>
+            </a:lvl2pPr>
+            <a:lvl3pPr marL="1143000" indent="-228600" eaLnBrk="0" hangingPunct="0">
+              <a:spcBef>
+                <a:spcPct val="20000"/>
+              </a:spcBef>
+              <a:buFont typeface="Arial" charset="0"/>
+              <a:buChar char="•"/>
+              <a:defRPr sz="2000">
+                <a:solidFill>
+                  <a:schemeClr val="tx2"/>
+                </a:solidFill>
+                <a:latin typeface="+mn-lt"/>
+                <a:cs typeface="+mn-cs"/>
+              </a:defRPr>
+            </a:lvl3pPr>
+            <a:lvl4pPr marL="1600200" indent="-228600" eaLnBrk="0" hangingPunct="0">
+              <a:spcBef>
+                <a:spcPct val="20000"/>
+              </a:spcBef>
+              <a:buFont typeface="Arial" charset="0"/>
+              <a:buChar char="•"/>
+              <a:defRPr>
+                <a:solidFill>
+                  <a:schemeClr val="tx2"/>
+                </a:solidFill>
+                <a:latin typeface="+mn-lt"/>
+                <a:cs typeface="+mn-cs"/>
+              </a:defRPr>
+            </a:lvl4pPr>
+            <a:lvl5pPr marL="2057400" indent="-228600" eaLnBrk="0" hangingPunct="0">
+              <a:spcBef>
+                <a:spcPct val="20000"/>
+              </a:spcBef>
+              <a:buFont typeface="Arial" charset="0"/>
+              <a:buChar char="•"/>
+              <a:defRPr>
+                <a:solidFill>
+                  <a:schemeClr val="tx2"/>
+                </a:solidFill>
+                <a:latin typeface="+mn-lt"/>
+                <a:cs typeface="+mn-cs"/>
+              </a:defRPr>
+            </a:lvl5pPr>
+            <a:lvl6pPr marL="2514600" indent="-228600">
+              <a:spcBef>
+                <a:spcPct val="20000"/>
+              </a:spcBef>
+              <a:buFont typeface="Arial" pitchFamily="34" charset="0"/>
+              <a:buChar char="•"/>
+              <a:defRPr sz="2000">
+                <a:latin typeface="+mn-lt"/>
+                <a:cs typeface="+mn-cs"/>
+              </a:defRPr>
+            </a:lvl6pPr>
+            <a:lvl7pPr marL="2971800" indent="-228600">
+              <a:spcBef>
+                <a:spcPct val="20000"/>
+              </a:spcBef>
+              <a:buFont typeface="Arial" pitchFamily="34" charset="0"/>
+              <a:buChar char="•"/>
+              <a:defRPr sz="2000">
+                <a:latin typeface="+mn-lt"/>
+                <a:cs typeface="+mn-cs"/>
+              </a:defRPr>
+            </a:lvl7pPr>
+            <a:lvl8pPr marL="3429000" indent="-228600">
+              <a:spcBef>
+                <a:spcPct val="20000"/>
+              </a:spcBef>
+              <a:buFont typeface="Arial" pitchFamily="34" charset="0"/>
+              <a:buChar char="•"/>
+              <a:defRPr sz="2000">
+                <a:latin typeface="+mn-lt"/>
+                <a:cs typeface="+mn-cs"/>
+              </a:defRPr>
+            </a:lvl8pPr>
+            <a:lvl9pPr marL="3886200" indent="-228600">
+              <a:spcBef>
+                <a:spcPct val="20000"/>
+              </a:spcBef>
+              <a:buFont typeface="Arial" pitchFamily="34" charset="0"/>
+              <a:buChar char="•"/>
+              <a:defRPr sz="2000">
+                <a:latin typeface="+mn-lt"/>
+                <a:cs typeface="+mn-cs"/>
+              </a:defRPr>
+            </a:lvl9pPr>
+          </a:lstStyle>
+          <a:p>
+            <a:pPr fontAlgn="base">
+              <a:spcAft>
+                <a:spcPct val="0"/>
+              </a:spcAft>
+            </a:pPr>
+            <a:r>
+              <a:rPr lang="en-US" sz="2000" dirty="0">
+                <a:solidFill>
+                  <a:srgbClr val="000000"/>
+                </a:solidFill>
+              </a:rPr>
+              <a:t>Samir Prakash – Technology Architect (US)</a:t>
+            </a:r>
+          </a:p>
+        </p:txBody>
+      </p:sp>
+      <p:sp>
+        <p:nvSpPr>
+          <p:cNvPr id="7" name="Content Placeholder 2"/>
+          <p:cNvSpPr txBox="1">
+            <a:spLocks/>
+          </p:cNvSpPr>
+          <p:nvPr/>
+        </p:nvSpPr>
+        <p:spPr>
+          <a:xfrm>
+            <a:off x="381000" y="476013"/>
+            <a:ext cx="3898392" cy="4233147"/>
+          </a:xfrm>
+          <a:prstGeom prst="rect">
+            <a:avLst/>
+          </a:prstGeom>
+          <a:noFill/>
+          <a:ln w="9525">
+            <a:solidFill>
+              <a:schemeClr val="tx1"/>
+            </a:solidFill>
+            <a:miter lim="800000"/>
+            <a:headEnd/>
+            <a:tailEnd/>
+          </a:ln>
+        </p:spPr>
+        <p:txBody>
+          <a:bodyPr>
+            <a:noAutofit/>
+          </a:bodyPr>
+          <a:lstStyle>
+            <a:defPPr>
+              <a:defRPr lang="en-US"/>
+            </a:defPPr>
+            <a:lvl1pPr>
+              <a:lnSpc>
+                <a:spcPct val="95000"/>
+              </a:lnSpc>
+              <a:defRPr sz="1200" b="1">
+                <a:solidFill>
+                  <a:schemeClr val="tx1">
+                    <a:lumMod val="75000"/>
+                  </a:schemeClr>
+                </a:solidFill>
+                <a:latin typeface="Arial" charset="0"/>
+                <a:ea typeface="ＭＳ Ｐゴシック" charset="-128"/>
+              </a:defRPr>
+            </a:lvl1pPr>
+          </a:lstStyle>
+          <a:p>
+            <a:pPr fontAlgn="base">
+              <a:lnSpc>
+                <a:spcPct val="120000"/>
+              </a:lnSpc>
+              <a:spcBef>
+                <a:spcPct val="0"/>
+              </a:spcBef>
+              <a:spcAft>
+                <a:spcPct val="0"/>
+              </a:spcAft>
+              <a:buClr>
+                <a:srgbClr val="000000"/>
+              </a:buClr>
+            </a:pPr>
+            <a:r>
+              <a:rPr lang="en-US" dirty="0">
+                <a:solidFill>
+                  <a:schemeClr val="tx1"/>
+                </a:solidFill>
+                <a:latin typeface="+mn-lt"/>
+                <a:ea typeface="Segoe UI" panose="020B0502040204020203" pitchFamily="34" charset="0"/>
+                <a:cs typeface="Segoe UI" panose="020B0502040204020203" pitchFamily="34" charset="0"/>
+              </a:rPr>
+              <a:t>Work Experience:</a:t>
+            </a:r>
+          </a:p>
+          <a:p>
+            <a:pPr eaLnBrk="0" hangingPunct="0"/>
+            <a:endParaRPr lang="en-US" sz="1000" b="0" dirty="0">
+              <a:solidFill>
+                <a:schemeClr val="tx1"/>
+              </a:solidFill>
+              <a:latin typeface="Cambria" pitchFamily="18" charset="0"/>
+              <a:ea typeface="+mn-ea"/>
+            </a:endParaRPr>
+          </a:p>
+          <a:p>
+            <a:pPr eaLnBrk="0" hangingPunct="0"/>
+            <a:endParaRPr lang="en-US" sz="1000" dirty="0">
+              <a:solidFill>
+                <a:schemeClr val="tx1"/>
+              </a:solidFill>
+              <a:latin typeface="Cambria" pitchFamily="18" charset="0"/>
+              <a:ea typeface="+mn-ea"/>
+            </a:endParaRPr>
+          </a:p>
+          <a:p>
+            <a:pPr eaLnBrk="0" hangingPunct="0"/>
+            <a:r>
+              <a:rPr lang="en-US" sz="1000" dirty="0">
+                <a:solidFill>
+                  <a:schemeClr val="tx1"/>
+                </a:solidFill>
+                <a:latin typeface="Cambria" pitchFamily="18" charset="0"/>
+                <a:ea typeface="+mn-ea"/>
+              </a:rPr>
+              <a:t>Client</a:t>
+            </a:r>
+            <a:r>
+              <a:rPr lang="en-US" sz="1000" b="0" dirty="0">
+                <a:solidFill>
+                  <a:schemeClr val="tx1"/>
+                </a:solidFill>
+                <a:latin typeface="Cambria" pitchFamily="18" charset="0"/>
+                <a:ea typeface="+mn-ea"/>
+              </a:rPr>
+              <a:t>: Toyota Connected North America, Texas, USA</a:t>
+            </a:r>
+          </a:p>
+          <a:p>
+            <a:pPr eaLnBrk="0" hangingPunct="0"/>
+            <a:r>
+              <a:rPr lang="en-US" sz="1000" dirty="0">
+                <a:solidFill>
+                  <a:schemeClr val="tx1"/>
+                </a:solidFill>
+                <a:latin typeface="Cambria" pitchFamily="18" charset="0"/>
+                <a:ea typeface="+mn-ea"/>
+              </a:rPr>
+              <a:t>As</a:t>
+            </a:r>
+            <a:r>
+              <a:rPr lang="en-US" sz="1000" b="0" dirty="0">
+                <a:solidFill>
+                  <a:schemeClr val="tx1"/>
+                </a:solidFill>
+                <a:latin typeface="Cambria" pitchFamily="18" charset="0"/>
+                <a:ea typeface="+mn-ea"/>
+              </a:rPr>
+              <a:t>: DevOps Engineer</a:t>
+            </a:r>
+          </a:p>
+          <a:p>
+            <a:pPr eaLnBrk="0" hangingPunct="0"/>
+            <a:r>
+              <a:rPr lang="en-US" sz="1000" dirty="0">
+                <a:solidFill>
+                  <a:schemeClr val="tx1"/>
+                </a:solidFill>
+                <a:latin typeface="Cambria" pitchFamily="18" charset="0"/>
+                <a:ea typeface="+mn-ea"/>
+              </a:rPr>
+              <a:t>Duration</a:t>
+            </a:r>
+            <a:r>
+              <a:rPr lang="en-US" sz="1000" b="0" dirty="0">
+                <a:solidFill>
+                  <a:schemeClr val="tx1"/>
+                </a:solidFill>
+                <a:latin typeface="Cambria" pitchFamily="18" charset="0"/>
+                <a:ea typeface="+mn-ea"/>
+              </a:rPr>
+              <a:t>: January, 2017 – till date</a:t>
+            </a:r>
+          </a:p>
+          <a:p>
+            <a:pPr eaLnBrk="0" hangingPunct="0"/>
+            <a:r>
+              <a:rPr lang="en-US" sz="1000" dirty="0">
+                <a:solidFill>
+                  <a:schemeClr val="tx1"/>
+                </a:solidFill>
+                <a:latin typeface="Cambria" pitchFamily="18" charset="0"/>
+                <a:ea typeface="+mn-ea"/>
+              </a:rPr>
+              <a:t>Project</a:t>
+            </a:r>
+            <a:r>
+              <a:rPr lang="en-US" sz="1000" b="0" dirty="0">
+                <a:solidFill>
+                  <a:schemeClr val="tx1"/>
+                </a:solidFill>
+                <a:latin typeface="Cambria" pitchFamily="18" charset="0"/>
+                <a:ea typeface="+mn-ea"/>
+              </a:rPr>
+              <a:t>: Telematics Service Platform</a:t>
+            </a:r>
+          </a:p>
+          <a:p>
+            <a:pPr eaLnBrk="0" hangingPunct="0"/>
+            <a:r>
+              <a:rPr lang="en-US" sz="1000" dirty="0">
+                <a:solidFill>
+                  <a:schemeClr val="tx1"/>
+                </a:solidFill>
+                <a:latin typeface="Cambria" pitchFamily="18" charset="0"/>
+                <a:ea typeface="+mn-ea"/>
+              </a:rPr>
+              <a:t>Tech Stack: </a:t>
+            </a:r>
+            <a:r>
+              <a:rPr lang="en-US" sz="1000" b="0" dirty="0">
+                <a:solidFill>
+                  <a:schemeClr val="tx1"/>
+                </a:solidFill>
+                <a:latin typeface="Cambria" pitchFamily="18" charset="0"/>
+                <a:ea typeface="+mn-ea"/>
+              </a:rPr>
+              <a:t>Go/Kubernetes/Docker/Azure/Java/JavaScript/Spring</a:t>
+            </a:r>
+          </a:p>
+          <a:p>
+            <a:pPr eaLnBrk="0" hangingPunct="0"/>
+            <a:r>
+              <a:rPr lang="en-US" sz="1000" dirty="0">
+                <a:solidFill>
+                  <a:schemeClr val="tx1"/>
+                </a:solidFill>
+                <a:latin typeface="Cambria" pitchFamily="18" charset="0"/>
+                <a:ea typeface="+mn-ea"/>
+              </a:rPr>
+              <a:t>Domain</a:t>
+            </a:r>
+            <a:r>
+              <a:rPr lang="en-US" sz="1000" b="0" dirty="0">
+                <a:solidFill>
+                  <a:schemeClr val="tx1"/>
+                </a:solidFill>
+                <a:latin typeface="Cambria" pitchFamily="18" charset="0"/>
+                <a:ea typeface="+mn-ea"/>
+              </a:rPr>
+              <a:t>: Telematics Services/Connected Car</a:t>
+            </a:r>
+          </a:p>
+          <a:p>
+            <a:pPr eaLnBrk="0" hangingPunct="0"/>
+            <a:endParaRPr lang="en-US" sz="1000" b="0" dirty="0">
+              <a:solidFill>
+                <a:schemeClr val="tx1"/>
+              </a:solidFill>
+              <a:latin typeface="Cambria" pitchFamily="18" charset="0"/>
+              <a:ea typeface="+mn-ea"/>
+            </a:endParaRPr>
+          </a:p>
+          <a:p>
+            <a:pPr eaLnBrk="0" hangingPunct="0"/>
+            <a:r>
+              <a:rPr lang="en-US" sz="1000" dirty="0">
+                <a:solidFill>
+                  <a:schemeClr val="tx1"/>
+                </a:solidFill>
+                <a:latin typeface="Cambria" pitchFamily="18" charset="0"/>
+              </a:rPr>
+              <a:t>Client</a:t>
+            </a:r>
+            <a:r>
+              <a:rPr lang="en-US" sz="1000" b="0" dirty="0">
+                <a:solidFill>
+                  <a:schemeClr val="tx1"/>
+                </a:solidFill>
+                <a:latin typeface="Cambria" pitchFamily="18" charset="0"/>
+              </a:rPr>
+              <a:t>: Toyota Motors Europe, Brussels, Belgium</a:t>
+            </a:r>
+          </a:p>
+          <a:p>
+            <a:pPr eaLnBrk="0" hangingPunct="0"/>
+            <a:r>
+              <a:rPr lang="en-US" sz="1000" dirty="0">
+                <a:solidFill>
+                  <a:schemeClr val="tx1"/>
+                </a:solidFill>
+                <a:latin typeface="Cambria" pitchFamily="18" charset="0"/>
+              </a:rPr>
+              <a:t>As</a:t>
+            </a:r>
+            <a:r>
+              <a:rPr lang="en-US" sz="1000" b="0" dirty="0">
+                <a:solidFill>
+                  <a:schemeClr val="tx1"/>
+                </a:solidFill>
+                <a:latin typeface="Cambria" pitchFamily="18" charset="0"/>
+              </a:rPr>
+              <a:t>: UX/UI Project Lead </a:t>
+            </a:r>
+          </a:p>
+          <a:p>
+            <a:pPr eaLnBrk="0" hangingPunct="0"/>
+            <a:r>
+              <a:rPr lang="en-US" sz="1000" dirty="0">
+                <a:solidFill>
+                  <a:schemeClr val="tx1"/>
+                </a:solidFill>
+                <a:latin typeface="Cambria" pitchFamily="18" charset="0"/>
+              </a:rPr>
+              <a:t>Duration</a:t>
+            </a:r>
+            <a:r>
+              <a:rPr lang="en-US" sz="1000" b="0" dirty="0">
+                <a:solidFill>
+                  <a:schemeClr val="tx1"/>
+                </a:solidFill>
+                <a:latin typeface="Cambria" pitchFamily="18" charset="0"/>
+              </a:rPr>
+              <a:t>: April, 2013 – November, 2016</a:t>
+            </a:r>
+          </a:p>
+          <a:p>
+            <a:pPr eaLnBrk="0" hangingPunct="0"/>
+            <a:r>
+              <a:rPr lang="en-US" sz="1000" dirty="0">
+                <a:solidFill>
+                  <a:schemeClr val="tx1"/>
+                </a:solidFill>
+                <a:latin typeface="Cambria" pitchFamily="18" charset="0"/>
+              </a:rPr>
+              <a:t>Project</a:t>
+            </a:r>
+            <a:r>
+              <a:rPr lang="en-US" sz="1000" b="0" dirty="0">
+                <a:solidFill>
+                  <a:schemeClr val="tx1"/>
+                </a:solidFill>
+                <a:latin typeface="Cambria" pitchFamily="18" charset="0"/>
+              </a:rPr>
+              <a:t>: Toyota One Customer Portal</a:t>
+            </a:r>
+          </a:p>
+          <a:p>
+            <a:pPr eaLnBrk="0" hangingPunct="0"/>
+            <a:r>
+              <a:rPr lang="en-US" sz="1000" dirty="0">
+                <a:solidFill>
+                  <a:schemeClr val="tx1"/>
+                </a:solidFill>
+                <a:latin typeface="Cambria" pitchFamily="18" charset="0"/>
+              </a:rPr>
+              <a:t>Tech Stack: </a:t>
+            </a:r>
+            <a:r>
+              <a:rPr lang="en-US" sz="1000" b="0" dirty="0">
+                <a:solidFill>
+                  <a:schemeClr val="tx1"/>
+                </a:solidFill>
+                <a:latin typeface="Cambria" pitchFamily="18" charset="0"/>
+              </a:rPr>
+              <a:t>JavaScript/HTML5/CSS3/AWS/Heroku/NodeJS</a:t>
+            </a:r>
+          </a:p>
+          <a:p>
+            <a:pPr eaLnBrk="0" hangingPunct="0"/>
+            <a:r>
+              <a:rPr lang="en-US" sz="1000" dirty="0">
+                <a:solidFill>
+                  <a:schemeClr val="tx1"/>
+                </a:solidFill>
+                <a:latin typeface="Cambria" pitchFamily="18" charset="0"/>
+              </a:rPr>
+              <a:t>Domain</a:t>
+            </a:r>
+            <a:r>
+              <a:rPr lang="en-US" sz="1000" b="0" dirty="0">
+                <a:solidFill>
+                  <a:schemeClr val="tx1"/>
+                </a:solidFill>
+                <a:latin typeface="Cambria" pitchFamily="18" charset="0"/>
+              </a:rPr>
+              <a:t>: Telematics Services/Connected Car</a:t>
+            </a:r>
+          </a:p>
+          <a:p>
+            <a:pPr eaLnBrk="0" hangingPunct="0"/>
+            <a:endParaRPr lang="en-US" sz="1000" b="0" dirty="0">
+              <a:solidFill>
+                <a:schemeClr val="tx1"/>
+              </a:solidFill>
+              <a:latin typeface="Cambria" pitchFamily="18" charset="0"/>
+              <a:ea typeface="+mn-ea"/>
+            </a:endParaRPr>
+          </a:p>
+          <a:p>
+            <a:pPr eaLnBrk="0" hangingPunct="0"/>
+            <a:r>
+              <a:rPr lang="en-US" sz="1000" dirty="0">
+                <a:solidFill>
+                  <a:schemeClr val="tx1"/>
+                </a:solidFill>
+                <a:latin typeface="Cambria" pitchFamily="18" charset="0"/>
+              </a:rPr>
+              <a:t>Client</a:t>
+            </a:r>
+            <a:r>
+              <a:rPr lang="en-US" sz="1000" b="0" dirty="0">
+                <a:solidFill>
+                  <a:schemeClr val="tx1"/>
+                </a:solidFill>
+                <a:latin typeface="Cambria" pitchFamily="18" charset="0"/>
+              </a:rPr>
+              <a:t>: Toyota Motors Europe, Brussels, Belgium</a:t>
+            </a:r>
+          </a:p>
+          <a:p>
+            <a:pPr eaLnBrk="0" hangingPunct="0"/>
+            <a:r>
+              <a:rPr lang="en-US" sz="1000" dirty="0">
+                <a:solidFill>
+                  <a:schemeClr val="tx1"/>
+                </a:solidFill>
+                <a:latin typeface="Cambria" pitchFamily="18" charset="0"/>
+              </a:rPr>
+              <a:t>As</a:t>
+            </a:r>
+            <a:r>
+              <a:rPr lang="en-US" sz="1000" b="0" dirty="0">
+                <a:solidFill>
+                  <a:schemeClr val="tx1"/>
+                </a:solidFill>
+                <a:latin typeface="Cambria" pitchFamily="18" charset="0"/>
+              </a:rPr>
+              <a:t>: Lead Telematics Developer</a:t>
+            </a:r>
+          </a:p>
+          <a:p>
+            <a:pPr eaLnBrk="0" hangingPunct="0"/>
+            <a:r>
+              <a:rPr lang="en-US" sz="1000" dirty="0">
+                <a:solidFill>
+                  <a:schemeClr val="tx1"/>
+                </a:solidFill>
+                <a:latin typeface="Cambria" pitchFamily="18" charset="0"/>
+              </a:rPr>
+              <a:t>Duration</a:t>
+            </a:r>
+            <a:r>
+              <a:rPr lang="en-US" sz="1000" b="0" dirty="0">
+                <a:solidFill>
+                  <a:schemeClr val="tx1"/>
+                </a:solidFill>
+                <a:latin typeface="Cambria" pitchFamily="18" charset="0"/>
+              </a:rPr>
+              <a:t>: April, 2012 – March, 2013</a:t>
+            </a:r>
+          </a:p>
+          <a:p>
+            <a:pPr eaLnBrk="0" hangingPunct="0"/>
+            <a:r>
+              <a:rPr lang="en-US" sz="1000" dirty="0">
+                <a:solidFill>
+                  <a:schemeClr val="tx1"/>
+                </a:solidFill>
+                <a:latin typeface="Cambria" pitchFamily="18" charset="0"/>
+              </a:rPr>
+              <a:t>Project</a:t>
+            </a:r>
+            <a:r>
+              <a:rPr lang="en-US" sz="1000" b="0" dirty="0">
+                <a:solidFill>
+                  <a:schemeClr val="tx1"/>
+                </a:solidFill>
+                <a:latin typeface="Cambria" pitchFamily="18" charset="0"/>
+              </a:rPr>
+              <a:t>: Toyota One Customer Portal</a:t>
+            </a:r>
+          </a:p>
+          <a:p>
+            <a:pPr eaLnBrk="0" hangingPunct="0"/>
+            <a:r>
+              <a:rPr lang="en-US" sz="1000" dirty="0">
+                <a:solidFill>
+                  <a:schemeClr val="tx1"/>
+                </a:solidFill>
+                <a:latin typeface="Cambria" pitchFamily="18" charset="0"/>
+              </a:rPr>
+              <a:t>Tech Stack: </a:t>
+            </a:r>
+            <a:r>
+              <a:rPr lang="en-US" sz="1000" b="0" dirty="0">
+                <a:solidFill>
+                  <a:schemeClr val="tx1"/>
+                </a:solidFill>
+                <a:latin typeface="Cambria" pitchFamily="18" charset="0"/>
+              </a:rPr>
+              <a:t>Java/ JavaScript/Spring/NodeJS/Oracle</a:t>
+            </a:r>
+          </a:p>
+          <a:p>
+            <a:pPr eaLnBrk="0" hangingPunct="0"/>
+            <a:r>
+              <a:rPr lang="en-US" sz="1000" dirty="0">
+                <a:solidFill>
+                  <a:schemeClr val="tx1"/>
+                </a:solidFill>
+                <a:latin typeface="Cambria" pitchFamily="18" charset="0"/>
+              </a:rPr>
+              <a:t>Domain</a:t>
+            </a:r>
+            <a:r>
+              <a:rPr lang="en-US" sz="1000" b="0" dirty="0">
+                <a:solidFill>
+                  <a:schemeClr val="tx1"/>
+                </a:solidFill>
+                <a:latin typeface="Cambria" pitchFamily="18" charset="0"/>
+              </a:rPr>
+              <a:t>: Telematics Services/Connected Car</a:t>
+            </a:r>
+          </a:p>
+          <a:p>
+            <a:pPr eaLnBrk="0" hangingPunct="0"/>
+            <a:endParaRPr lang="en-US" sz="1000" b="0" dirty="0">
+              <a:solidFill>
+                <a:schemeClr val="tx1"/>
+              </a:solidFill>
+              <a:latin typeface="Cambria" pitchFamily="18" charset="0"/>
+            </a:endParaRPr>
+          </a:p>
+          <a:p>
+            <a:pPr eaLnBrk="0" hangingPunct="0"/>
+            <a:endParaRPr lang="en-US" sz="1000" b="0" dirty="0">
+              <a:solidFill>
+                <a:schemeClr val="tx1"/>
+              </a:solidFill>
+              <a:latin typeface="Cambria" pitchFamily="18" charset="0"/>
+            </a:endParaRPr>
+          </a:p>
+          <a:p>
+            <a:pPr eaLnBrk="0" hangingPunct="0"/>
+            <a:endParaRPr lang="en-US" sz="1000" b="0" dirty="0">
+              <a:solidFill>
+                <a:schemeClr val="tx1"/>
+              </a:solidFill>
+              <a:latin typeface="Cambria" pitchFamily="18" charset="0"/>
+              <a:ea typeface="+mn-ea"/>
+            </a:endParaRPr>
+          </a:p>
+        </p:txBody>
+      </p:sp>
+      <p:sp>
+        <p:nvSpPr>
+          <p:cNvPr id="6" name="Content Placeholder 2">
+            <a:extLst>
+              <a:ext uri="{FF2B5EF4-FFF2-40B4-BE49-F238E27FC236}">
+                <a16:creationId xmlns:a16="http://schemas.microsoft.com/office/drawing/2014/main" id="{AB96AAB6-31BE-9547-8479-3F21566CB96C}"/>
+              </a:ext>
+            </a:extLst>
+          </p:cNvPr>
+          <p:cNvSpPr txBox="1">
+            <a:spLocks/>
+          </p:cNvSpPr>
+          <p:nvPr/>
+        </p:nvSpPr>
+        <p:spPr>
+          <a:xfrm>
+            <a:off x="4417770" y="476012"/>
+            <a:ext cx="4016655" cy="4233147"/>
+          </a:xfrm>
+          <a:prstGeom prst="rect">
+            <a:avLst/>
+          </a:prstGeom>
+          <a:noFill/>
+          <a:ln w="9525">
+            <a:solidFill>
+              <a:schemeClr val="tx1"/>
+            </a:solidFill>
+            <a:miter lim="800000"/>
+            <a:headEnd/>
+            <a:tailEnd/>
+          </a:ln>
+        </p:spPr>
+        <p:txBody>
+          <a:bodyPr>
+            <a:noAutofit/>
+          </a:bodyPr>
+          <a:lstStyle>
+            <a:defPPr>
+              <a:defRPr lang="en-US"/>
+            </a:defPPr>
+            <a:lvl1pPr>
+              <a:lnSpc>
+                <a:spcPct val="95000"/>
+              </a:lnSpc>
+              <a:defRPr sz="1200" b="1">
+                <a:solidFill>
+                  <a:schemeClr val="tx1">
+                    <a:lumMod val="75000"/>
+                  </a:schemeClr>
+                </a:solidFill>
+                <a:latin typeface="Arial" charset="0"/>
+                <a:ea typeface="ＭＳ Ｐゴシック" charset="-128"/>
+              </a:defRPr>
+            </a:lvl1pPr>
+          </a:lstStyle>
+          <a:p>
+            <a:pPr fontAlgn="base">
+              <a:lnSpc>
+                <a:spcPct val="120000"/>
+              </a:lnSpc>
+              <a:spcBef>
+                <a:spcPct val="0"/>
+              </a:spcBef>
+              <a:spcAft>
+                <a:spcPct val="0"/>
+              </a:spcAft>
+              <a:buClr>
+                <a:srgbClr val="000000"/>
+              </a:buClr>
+            </a:pPr>
+            <a:r>
+              <a:rPr lang="en-US" dirty="0">
+                <a:solidFill>
+                  <a:schemeClr val="tx1"/>
+                </a:solidFill>
+                <a:latin typeface="+mn-lt"/>
+                <a:ea typeface="Segoe UI" panose="020B0502040204020203" pitchFamily="34" charset="0"/>
+                <a:cs typeface="Segoe UI" panose="020B0502040204020203" pitchFamily="34" charset="0"/>
+              </a:rPr>
+              <a:t>Work Experience:</a:t>
+            </a:r>
+          </a:p>
+          <a:p>
+            <a:pPr eaLnBrk="0" hangingPunct="0"/>
+            <a:endParaRPr lang="en-US" sz="1000" b="0" dirty="0">
+              <a:solidFill>
+                <a:schemeClr val="tx1"/>
+              </a:solidFill>
+              <a:latin typeface="Cambria" pitchFamily="18" charset="0"/>
+              <a:ea typeface="+mn-ea"/>
+            </a:endParaRPr>
+          </a:p>
+          <a:p>
+            <a:pPr eaLnBrk="0" hangingPunct="0"/>
+            <a:endParaRPr lang="en-US" sz="1000" dirty="0">
+              <a:solidFill>
+                <a:schemeClr val="tx1"/>
+              </a:solidFill>
+              <a:latin typeface="Cambria" pitchFamily="18" charset="0"/>
+            </a:endParaRPr>
+          </a:p>
+          <a:p>
+            <a:pPr eaLnBrk="0" hangingPunct="0"/>
+            <a:r>
+              <a:rPr lang="en-US" sz="1000" dirty="0">
+                <a:solidFill>
+                  <a:schemeClr val="tx1"/>
+                </a:solidFill>
+                <a:latin typeface="Cambria" pitchFamily="18" charset="0"/>
+              </a:rPr>
+              <a:t>Client</a:t>
+            </a:r>
+            <a:r>
+              <a:rPr lang="en-US" sz="1000" b="0" dirty="0">
+                <a:solidFill>
+                  <a:schemeClr val="tx1"/>
+                </a:solidFill>
+                <a:latin typeface="Cambria" pitchFamily="18" charset="0"/>
+              </a:rPr>
+              <a:t>: CA Inc., MA, USA</a:t>
+            </a:r>
+          </a:p>
+          <a:p>
+            <a:pPr eaLnBrk="0" hangingPunct="0"/>
+            <a:r>
+              <a:rPr lang="en-US" sz="1000" dirty="0">
+                <a:solidFill>
+                  <a:schemeClr val="tx1"/>
+                </a:solidFill>
+                <a:latin typeface="Cambria" pitchFamily="18" charset="0"/>
+              </a:rPr>
+              <a:t>As</a:t>
+            </a:r>
+            <a:r>
+              <a:rPr lang="en-US" sz="1000" b="0" dirty="0">
+                <a:solidFill>
+                  <a:schemeClr val="tx1"/>
+                </a:solidFill>
+                <a:latin typeface="Cambria" pitchFamily="18" charset="0"/>
+              </a:rPr>
+              <a:t>: Full Stack Developer</a:t>
+            </a:r>
+          </a:p>
+          <a:p>
+            <a:pPr eaLnBrk="0" hangingPunct="0"/>
+            <a:r>
+              <a:rPr lang="en-US" sz="1000" dirty="0">
+                <a:solidFill>
+                  <a:schemeClr val="tx1"/>
+                </a:solidFill>
+                <a:latin typeface="Cambria" pitchFamily="18" charset="0"/>
+              </a:rPr>
+              <a:t>Duration</a:t>
+            </a:r>
+            <a:r>
+              <a:rPr lang="en-US" sz="1000" b="0" dirty="0">
+                <a:solidFill>
+                  <a:schemeClr val="tx1"/>
+                </a:solidFill>
+                <a:latin typeface="Cambria" pitchFamily="18" charset="0"/>
+              </a:rPr>
+              <a:t>: September, 2009 – October, 2011</a:t>
+            </a:r>
+          </a:p>
+          <a:p>
+            <a:pPr eaLnBrk="0" hangingPunct="0"/>
+            <a:r>
+              <a:rPr lang="en-US" sz="1000" dirty="0">
+                <a:solidFill>
+                  <a:schemeClr val="tx1"/>
+                </a:solidFill>
+                <a:latin typeface="Cambria" pitchFamily="18" charset="0"/>
+              </a:rPr>
+              <a:t>Project</a:t>
+            </a:r>
+            <a:r>
+              <a:rPr lang="en-US" sz="1000" b="0" dirty="0">
+                <a:solidFill>
+                  <a:schemeClr val="tx1"/>
+                </a:solidFill>
+                <a:latin typeface="Cambria" pitchFamily="18" charset="0"/>
+              </a:rPr>
+              <a:t>: Toyota One Customer Portal</a:t>
+            </a:r>
+          </a:p>
+          <a:p>
+            <a:pPr eaLnBrk="0" hangingPunct="0"/>
+            <a:r>
+              <a:rPr lang="en-US" sz="1000" dirty="0">
+                <a:solidFill>
+                  <a:schemeClr val="tx1"/>
+                </a:solidFill>
+                <a:latin typeface="Cambria" pitchFamily="18" charset="0"/>
+              </a:rPr>
+              <a:t>Tech Stack: </a:t>
+            </a:r>
+            <a:r>
+              <a:rPr lang="en-US" sz="1000" b="0" dirty="0">
+                <a:solidFill>
+                  <a:schemeClr val="tx1"/>
+                </a:solidFill>
+                <a:latin typeface="Cambria" pitchFamily="18" charset="0"/>
+              </a:rPr>
+              <a:t>Java/JavaScript/Spring/NodeJS/Oracle</a:t>
+            </a:r>
+          </a:p>
+          <a:p>
+            <a:pPr eaLnBrk="0" hangingPunct="0"/>
+            <a:r>
+              <a:rPr lang="en-US" sz="1000" dirty="0">
+                <a:solidFill>
+                  <a:schemeClr val="tx1"/>
+                </a:solidFill>
+                <a:latin typeface="Cambria" pitchFamily="18" charset="0"/>
+              </a:rPr>
+              <a:t>Domain</a:t>
+            </a:r>
+            <a:r>
+              <a:rPr lang="en-US" sz="1000" b="0" dirty="0">
+                <a:solidFill>
+                  <a:schemeClr val="tx1"/>
+                </a:solidFill>
+                <a:latin typeface="Cambria" pitchFamily="18" charset="0"/>
+              </a:rPr>
+              <a:t>: Security</a:t>
+            </a:r>
+            <a:endParaRPr lang="en-US" sz="1000" dirty="0">
+              <a:solidFill>
+                <a:schemeClr val="tx1"/>
+              </a:solidFill>
+              <a:latin typeface="Cambria" pitchFamily="18" charset="0"/>
+              <a:ea typeface="+mn-ea"/>
+            </a:endParaRPr>
+          </a:p>
+          <a:p>
+            <a:pPr eaLnBrk="0" hangingPunct="0"/>
+            <a:endParaRPr lang="en-US" sz="1000" dirty="0">
+              <a:solidFill>
+                <a:schemeClr val="tx1"/>
+              </a:solidFill>
+              <a:latin typeface="Cambria" pitchFamily="18" charset="0"/>
+              <a:ea typeface="+mn-ea"/>
+            </a:endParaRPr>
+          </a:p>
+          <a:p>
+            <a:pPr eaLnBrk="0" hangingPunct="0"/>
+            <a:r>
+              <a:rPr lang="en-US" sz="1000" dirty="0">
+                <a:solidFill>
+                  <a:schemeClr val="tx1"/>
+                </a:solidFill>
+                <a:latin typeface="Cambria" pitchFamily="18" charset="0"/>
+                <a:ea typeface="+mn-ea"/>
+              </a:rPr>
+              <a:t>Client</a:t>
+            </a:r>
+            <a:r>
+              <a:rPr lang="en-US" sz="1000" b="0" dirty="0">
+                <a:solidFill>
+                  <a:schemeClr val="tx1"/>
+                </a:solidFill>
+                <a:latin typeface="Cambria" pitchFamily="18" charset="0"/>
+                <a:ea typeface="+mn-ea"/>
+              </a:rPr>
+              <a:t>: Chubb Insurance, UK and Singapore</a:t>
+            </a:r>
+          </a:p>
+          <a:p>
+            <a:pPr eaLnBrk="0" hangingPunct="0"/>
+            <a:r>
+              <a:rPr lang="en-US" sz="1000" dirty="0">
+                <a:solidFill>
+                  <a:schemeClr val="tx1"/>
+                </a:solidFill>
+                <a:latin typeface="Cambria" pitchFamily="18" charset="0"/>
+                <a:ea typeface="+mn-ea"/>
+              </a:rPr>
+              <a:t>As</a:t>
+            </a:r>
+            <a:r>
+              <a:rPr lang="en-US" sz="1000" b="0" dirty="0">
+                <a:solidFill>
+                  <a:schemeClr val="tx1"/>
+                </a:solidFill>
+                <a:latin typeface="Cambria" pitchFamily="18" charset="0"/>
+                <a:ea typeface="+mn-ea"/>
+              </a:rPr>
+              <a:t>: Backend Developer</a:t>
+            </a:r>
+          </a:p>
+          <a:p>
+            <a:pPr eaLnBrk="0" hangingPunct="0"/>
+            <a:r>
+              <a:rPr lang="en-US" sz="1000" dirty="0">
+                <a:solidFill>
+                  <a:schemeClr val="tx1"/>
+                </a:solidFill>
+                <a:latin typeface="Cambria" pitchFamily="18" charset="0"/>
+                <a:ea typeface="+mn-ea"/>
+              </a:rPr>
+              <a:t>Duration</a:t>
+            </a:r>
+            <a:r>
+              <a:rPr lang="en-US" sz="1000" b="0" dirty="0">
+                <a:solidFill>
+                  <a:schemeClr val="tx1"/>
+                </a:solidFill>
+                <a:latin typeface="Cambria" pitchFamily="18" charset="0"/>
+                <a:ea typeface="+mn-ea"/>
+              </a:rPr>
+              <a:t>: April, 2007 – July, 2009</a:t>
+            </a:r>
+          </a:p>
+          <a:p>
+            <a:pPr eaLnBrk="0" hangingPunct="0"/>
+            <a:r>
+              <a:rPr lang="en-US" sz="1000" dirty="0">
+                <a:solidFill>
+                  <a:schemeClr val="tx1"/>
+                </a:solidFill>
+                <a:latin typeface="Cambria" pitchFamily="18" charset="0"/>
+                <a:ea typeface="+mn-ea"/>
+              </a:rPr>
+              <a:t>Project</a:t>
+            </a:r>
+            <a:r>
+              <a:rPr lang="en-US" sz="1000" b="0" dirty="0">
+                <a:solidFill>
+                  <a:schemeClr val="tx1"/>
+                </a:solidFill>
+                <a:latin typeface="Cambria" pitchFamily="18" charset="0"/>
+                <a:ea typeface="+mn-ea"/>
+              </a:rPr>
+              <a:t>: Chubb Insurance Portal</a:t>
+            </a:r>
+          </a:p>
+          <a:p>
+            <a:pPr eaLnBrk="0" hangingPunct="0"/>
+            <a:r>
+              <a:rPr lang="en-US" sz="1000" dirty="0">
+                <a:solidFill>
+                  <a:schemeClr val="tx1"/>
+                </a:solidFill>
+                <a:latin typeface="Cambria" pitchFamily="18" charset="0"/>
+                <a:ea typeface="+mn-ea"/>
+              </a:rPr>
+              <a:t>Tech Stack: </a:t>
+            </a:r>
+            <a:r>
+              <a:rPr lang="en-US" sz="1000" b="0" dirty="0">
+                <a:solidFill>
+                  <a:schemeClr val="tx1"/>
+                </a:solidFill>
+                <a:latin typeface="Cambria" pitchFamily="18" charset="0"/>
+                <a:ea typeface="+mn-ea"/>
+              </a:rPr>
+              <a:t>Java/Spring/Oracle</a:t>
+            </a:r>
+          </a:p>
+          <a:p>
+            <a:pPr eaLnBrk="0" hangingPunct="0"/>
+            <a:r>
+              <a:rPr lang="en-US" sz="1000" dirty="0">
+                <a:solidFill>
+                  <a:schemeClr val="tx1"/>
+                </a:solidFill>
+                <a:latin typeface="Cambria" pitchFamily="18" charset="0"/>
+              </a:rPr>
+              <a:t>Domain</a:t>
+            </a:r>
+            <a:r>
+              <a:rPr lang="en-US" sz="1000" b="0" dirty="0">
+                <a:solidFill>
+                  <a:schemeClr val="tx1"/>
+                </a:solidFill>
+                <a:latin typeface="Cambria" pitchFamily="18" charset="0"/>
+              </a:rPr>
+              <a:t>: Insurance</a:t>
+            </a:r>
+            <a:endParaRPr lang="en-US" sz="1000" dirty="0">
+              <a:solidFill>
+                <a:schemeClr val="tx1"/>
+              </a:solidFill>
+              <a:latin typeface="Cambria" pitchFamily="18" charset="0"/>
+            </a:endParaRPr>
+          </a:p>
+          <a:p>
+            <a:pPr eaLnBrk="0" hangingPunct="0"/>
+            <a:endParaRPr lang="en-US" sz="1000" b="0" dirty="0">
+              <a:solidFill>
+                <a:schemeClr val="tx1"/>
+              </a:solidFill>
+              <a:latin typeface="Cambria" pitchFamily="18" charset="0"/>
+              <a:ea typeface="+mn-ea"/>
+            </a:endParaRPr>
+          </a:p>
+          <a:p>
+            <a:pPr eaLnBrk="0" hangingPunct="0"/>
+            <a:r>
+              <a:rPr lang="en-US" sz="1000" dirty="0">
+                <a:solidFill>
+                  <a:schemeClr val="tx1"/>
+                </a:solidFill>
+                <a:latin typeface="Cambria" pitchFamily="18" charset="0"/>
+              </a:rPr>
+              <a:t>Client</a:t>
+            </a:r>
+            <a:r>
+              <a:rPr lang="en-US" sz="1000" b="0" dirty="0">
+                <a:solidFill>
+                  <a:schemeClr val="tx1"/>
+                </a:solidFill>
+                <a:latin typeface="Cambria" pitchFamily="18" charset="0"/>
+              </a:rPr>
+              <a:t>: HCL, New Delhi, India</a:t>
+            </a:r>
+          </a:p>
+          <a:p>
+            <a:pPr eaLnBrk="0" hangingPunct="0"/>
+            <a:r>
+              <a:rPr lang="en-US" sz="1000" dirty="0">
+                <a:solidFill>
+                  <a:schemeClr val="tx1"/>
+                </a:solidFill>
+                <a:latin typeface="Cambria" pitchFamily="18" charset="0"/>
+              </a:rPr>
+              <a:t>As</a:t>
+            </a:r>
+            <a:r>
+              <a:rPr lang="en-US" sz="1000" b="0" dirty="0">
+                <a:solidFill>
+                  <a:schemeClr val="tx1"/>
+                </a:solidFill>
+                <a:latin typeface="Cambria" pitchFamily="18" charset="0"/>
+              </a:rPr>
+              <a:t>: Frontend Developer</a:t>
+            </a:r>
+          </a:p>
+          <a:p>
+            <a:pPr eaLnBrk="0" hangingPunct="0"/>
+            <a:r>
+              <a:rPr lang="en-US" sz="1000" dirty="0">
+                <a:solidFill>
+                  <a:schemeClr val="tx1"/>
+                </a:solidFill>
+                <a:latin typeface="Cambria" pitchFamily="18" charset="0"/>
+              </a:rPr>
+              <a:t>Duration</a:t>
+            </a:r>
+            <a:r>
+              <a:rPr lang="en-US" sz="1000" b="0" dirty="0">
+                <a:solidFill>
+                  <a:schemeClr val="tx1"/>
+                </a:solidFill>
+                <a:latin typeface="Cambria" pitchFamily="18" charset="0"/>
+              </a:rPr>
+              <a:t>: January, 2005 – February, 2007</a:t>
+            </a:r>
+          </a:p>
+          <a:p>
+            <a:pPr eaLnBrk="0" hangingPunct="0"/>
+            <a:r>
+              <a:rPr lang="en-US" sz="1000" dirty="0">
+                <a:solidFill>
+                  <a:schemeClr val="tx1"/>
+                </a:solidFill>
+                <a:latin typeface="Cambria" pitchFamily="18" charset="0"/>
+              </a:rPr>
+              <a:t>Project</a:t>
+            </a:r>
+            <a:r>
+              <a:rPr lang="en-US" sz="1000" b="0" dirty="0">
+                <a:solidFill>
+                  <a:schemeClr val="tx1"/>
+                </a:solidFill>
+                <a:latin typeface="Cambria" pitchFamily="18" charset="0"/>
+              </a:rPr>
+              <a:t>: Management Information Services</a:t>
+            </a:r>
+          </a:p>
+          <a:p>
+            <a:pPr eaLnBrk="0" hangingPunct="0"/>
+            <a:r>
+              <a:rPr lang="en-US" sz="1000" dirty="0">
+                <a:solidFill>
+                  <a:schemeClr val="tx1"/>
+                </a:solidFill>
+                <a:latin typeface="Cambria" pitchFamily="18" charset="0"/>
+              </a:rPr>
+              <a:t>Tech Stack: </a:t>
+            </a:r>
+            <a:r>
+              <a:rPr lang="en-US" sz="1000" b="0" dirty="0">
+                <a:solidFill>
+                  <a:schemeClr val="tx1"/>
+                </a:solidFill>
+                <a:latin typeface="Cambria" pitchFamily="18" charset="0"/>
+              </a:rPr>
+              <a:t>JavaScript/Java</a:t>
+            </a:r>
+          </a:p>
+          <a:p>
+            <a:pPr eaLnBrk="0" hangingPunct="0"/>
+            <a:r>
+              <a:rPr lang="en-US" sz="1000" dirty="0">
+                <a:solidFill>
+                  <a:schemeClr val="tx1"/>
+                </a:solidFill>
+                <a:latin typeface="Cambria" pitchFamily="18" charset="0"/>
+              </a:rPr>
+              <a:t>Domain</a:t>
+            </a:r>
+            <a:r>
+              <a:rPr lang="en-US" sz="1000" b="0" dirty="0">
+                <a:solidFill>
+                  <a:schemeClr val="tx1"/>
+                </a:solidFill>
+                <a:latin typeface="Cambria" pitchFamily="18" charset="0"/>
+              </a:rPr>
+              <a:t>: Information services</a:t>
+            </a:r>
+            <a:endParaRPr lang="en-US" sz="1000" dirty="0">
+              <a:solidFill>
+                <a:schemeClr val="tx1"/>
+              </a:solidFill>
+              <a:latin typeface="Cambria" pitchFamily="18" charset="0"/>
+            </a:endParaRPr>
+          </a:p>
+          <a:p>
+            <a:pPr eaLnBrk="0" hangingPunct="0"/>
+            <a:endParaRPr lang="en-US" sz="1000" b="0" dirty="0">
+              <a:solidFill>
+                <a:schemeClr val="tx1"/>
+              </a:solidFill>
+              <a:latin typeface="Cambria" pitchFamily="18" charset="0"/>
+              <a:ea typeface="+mn-ea"/>
+            </a:endParaRPr>
+          </a:p>
+          <a:p>
+            <a:pPr eaLnBrk="0" hangingPunct="0"/>
+            <a:endParaRPr lang="en-US" sz="1000" b="0" dirty="0">
+              <a:solidFill>
+                <a:schemeClr val="tx1"/>
+              </a:solidFill>
+              <a:latin typeface="Cambria" pitchFamily="18" charset="0"/>
+              <a:ea typeface="+mn-ea"/>
+            </a:endParaRPr>
+          </a:p>
+          <a:p>
+            <a:pPr eaLnBrk="0" hangingPunct="0"/>
+            <a:endParaRPr lang="en-US" sz="1000" b="0" dirty="0">
+              <a:solidFill>
+                <a:schemeClr val="tx1"/>
+              </a:solidFill>
+              <a:latin typeface="Cambria" pitchFamily="18" charset="0"/>
+              <a:ea typeface="+mn-ea"/>
+            </a:endParaRPr>
+          </a:p>
+        </p:txBody>
+      </p:sp>
+    </p:spTree>
+    <p:extLst>
+      <p:ext uri="{BB962C8B-B14F-4D97-AF65-F5344CB8AC3E}">
+        <p14:creationId xmlns:p14="http://schemas.microsoft.com/office/powerpoint/2010/main" val="1241925407"/>
       </p:ext>
     </p:extLst>
   </p:cSld>

</xml_diff>